<commit_message>
Removed DecisionTree from Blocked Algorithms
</commit_message>
<xml_diff>
--- a/SAP-Data-MicroHack.pptx
+++ b/SAP-Data-MicroHack.pptx
@@ -10,6 +10,9 @@
     <p:sldId id="259" r:id="rId4"/>
     <p:sldId id="258" r:id="rId5"/>
     <p:sldId id="260" r:id="rId6"/>
+    <p:sldId id="261" r:id="rId7"/>
+    <p:sldId id="262" r:id="rId8"/>
+    <p:sldId id="263" r:id="rId9"/>
   </p:sldIdLst>
   <p:sldSz cx="12192000" cy="6858000"/>
   <p:notesSz cx="6858000" cy="9144000"/>
@@ -128,8 +131,8 @@
 <pc:chgInfo xmlns:a="http://schemas.openxmlformats.org/drawingml/2006/main" xmlns:r="http://schemas.openxmlformats.org/officeDocument/2006/relationships" xmlns:ac="http://schemas.microsoft.com/office/drawing/2013/main/command" xmlns:pc="http://schemas.microsoft.com/office/powerpoint/2013/main/command">
   <pc:docChgLst>
     <pc:chgData name="Bart Delanghe" userId="956f3f6c82133ec8" providerId="LiveId" clId="{099E1954-559E-4CA5-A258-E555D91FCE49}"/>
-    <pc:docChg chg="undo custSel addSld modSld">
-      <pc:chgData name="Bart Delanghe" userId="956f3f6c82133ec8" providerId="LiveId" clId="{099E1954-559E-4CA5-A258-E555D91FCE49}" dt="2021-04-19T07:10:36.938" v="548" actId="1076"/>
+    <pc:docChg chg="undo custSel addSld delSld modSld">
+      <pc:chgData name="Bart Delanghe" userId="956f3f6c82133ec8" providerId="LiveId" clId="{099E1954-559E-4CA5-A258-E555D91FCE49}" dt="2021-04-19T13:38:32.561" v="574" actId="729"/>
       <pc:docMkLst>
         <pc:docMk/>
       </pc:docMkLst>
@@ -589,6 +592,82 @@
             <pc:docMk/>
             <pc:sldMk cId="2715703261" sldId="260"/>
             <ac:spMk id="3" creationId="{F5647B87-B4C6-4254-A96D-80157A201A81}"/>
+          </ac:spMkLst>
+        </pc:spChg>
+      </pc:sldChg>
+      <pc:sldChg chg="addSp delSp modSp new mod modShow">
+        <pc:chgData name="Bart Delanghe" userId="956f3f6c82133ec8" providerId="LiveId" clId="{099E1954-559E-4CA5-A258-E555D91FCE49}" dt="2021-04-19T13:38:26.977" v="572" actId="729"/>
+        <pc:sldMkLst>
+          <pc:docMk/>
+          <pc:sldMk cId="566810426" sldId="261"/>
+        </pc:sldMkLst>
+        <pc:spChg chg="del">
+          <ac:chgData name="Bart Delanghe" userId="956f3f6c82133ec8" providerId="LiveId" clId="{099E1954-559E-4CA5-A258-E555D91FCE49}" dt="2021-04-19T13:32:33.072" v="550" actId="22"/>
+          <ac:spMkLst>
+            <pc:docMk/>
+            <pc:sldMk cId="566810426" sldId="261"/>
+            <ac:spMk id="3" creationId="{E01F6B3C-C90C-44B8-B849-33D833417FA4}"/>
+          </ac:spMkLst>
+        </pc:spChg>
+        <pc:spChg chg="add mod">
+          <ac:chgData name="Bart Delanghe" userId="956f3f6c82133ec8" providerId="LiveId" clId="{099E1954-559E-4CA5-A258-E555D91FCE49}" dt="2021-04-19T13:33:40.442" v="561" actId="1582"/>
+          <ac:spMkLst>
+            <pc:docMk/>
+            <pc:sldMk cId="566810426" sldId="261"/>
+            <ac:spMk id="6" creationId="{6C29472B-90F4-46DC-8A01-1ACB415B4A38}"/>
+          </ac:spMkLst>
+        </pc:spChg>
+        <pc:picChg chg="add mod ord">
+          <ac:chgData name="Bart Delanghe" userId="956f3f6c82133ec8" providerId="LiveId" clId="{099E1954-559E-4CA5-A258-E555D91FCE49}" dt="2021-04-19T13:32:39.889" v="553" actId="1076"/>
+          <ac:picMkLst>
+            <pc:docMk/>
+            <pc:sldMk cId="566810426" sldId="261"/>
+            <ac:picMk id="5" creationId="{A5FD809B-EE93-41E0-85A4-CB2BD7BE3FC5}"/>
+          </ac:picMkLst>
+        </pc:picChg>
+      </pc:sldChg>
+      <pc:sldChg chg="addSp delSp modSp add mod modShow">
+        <pc:chgData name="Bart Delanghe" userId="956f3f6c82133ec8" providerId="LiveId" clId="{099E1954-559E-4CA5-A258-E555D91FCE49}" dt="2021-04-19T13:38:28.634" v="573" actId="729"/>
+        <pc:sldMkLst>
+          <pc:docMk/>
+          <pc:sldMk cId="37632715" sldId="262"/>
+        </pc:sldMkLst>
+        <pc:spChg chg="add del mod">
+          <ac:chgData name="Bart Delanghe" userId="956f3f6c82133ec8" providerId="LiveId" clId="{099E1954-559E-4CA5-A258-E555D91FCE49}" dt="2021-04-19T13:34:21.254" v="571" actId="478"/>
+          <ac:spMkLst>
+            <pc:docMk/>
+            <pc:sldMk cId="37632715" sldId="262"/>
+            <ac:spMk id="3" creationId="{DE8A9355-49CF-47ED-912B-109C9F42F64D}"/>
+          </ac:spMkLst>
+        </pc:spChg>
+        <pc:spChg chg="mod">
+          <ac:chgData name="Bart Delanghe" userId="956f3f6c82133ec8" providerId="LiveId" clId="{099E1954-559E-4CA5-A258-E555D91FCE49}" dt="2021-04-19T13:33:57.450" v="564" actId="1076"/>
+          <ac:spMkLst>
+            <pc:docMk/>
+            <pc:sldMk cId="37632715" sldId="262"/>
+            <ac:spMk id="6" creationId="{6C29472B-90F4-46DC-8A01-1ACB415B4A38}"/>
+          </ac:spMkLst>
+        </pc:spChg>
+      </pc:sldChg>
+      <pc:sldChg chg="add del">
+        <pc:chgData name="Bart Delanghe" userId="956f3f6c82133ec8" providerId="LiveId" clId="{099E1954-559E-4CA5-A258-E555D91FCE49}" dt="2021-04-19T13:33:48.079" v="562" actId="47"/>
+        <pc:sldMkLst>
+          <pc:docMk/>
+          <pc:sldMk cId="2308775273" sldId="262"/>
+        </pc:sldMkLst>
+      </pc:sldChg>
+      <pc:sldChg chg="delSp add mod modShow">
+        <pc:chgData name="Bart Delanghe" userId="956f3f6c82133ec8" providerId="LiveId" clId="{099E1954-559E-4CA5-A258-E555D91FCE49}" dt="2021-04-19T13:38:32.561" v="574" actId="729"/>
+        <pc:sldMkLst>
+          <pc:docMk/>
+          <pc:sldMk cId="296623923" sldId="263"/>
+        </pc:sldMkLst>
+        <pc:spChg chg="del">
+          <ac:chgData name="Bart Delanghe" userId="956f3f6c82133ec8" providerId="LiveId" clId="{099E1954-559E-4CA5-A258-E555D91FCE49}" dt="2021-04-19T13:34:16.716" v="570" actId="478"/>
+          <ac:spMkLst>
+            <pc:docMk/>
+            <pc:sldMk cId="296623923" sldId="263"/>
+            <ac:spMk id="6" creationId="{6C29472B-90F4-46DC-8A01-1ACB415B4A38}"/>
           </ac:spMkLst>
         </pc:spChg>
       </pc:sldChg>
@@ -15858,6 +15937,471 @@
 </p:sld>
 </file>
 
+<file path=ppt/slides/slide6.xml><?xml version="1.0" encoding="utf-8"?>
+<p:sld xmlns:a="http://schemas.openxmlformats.org/drawingml/2006/main" xmlns:r="http://schemas.openxmlformats.org/officeDocument/2006/relationships" xmlns:p="http://schemas.openxmlformats.org/presentationml/2006/main" show="0">
+  <p:cSld>
+    <p:spTree>
+      <p:nvGrpSpPr>
+        <p:cNvPr id="1" name=""/>
+        <p:cNvGrpSpPr/>
+        <p:nvPr/>
+      </p:nvGrpSpPr>
+      <p:grpSpPr>
+        <a:xfrm>
+          <a:off x="0" y="0"/>
+          <a:ext cx="0" cy="0"/>
+          <a:chOff x="0" y="0"/>
+          <a:chExt cx="0" cy="0"/>
+        </a:xfrm>
+      </p:grpSpPr>
+      <p:sp>
+        <p:nvSpPr>
+          <p:cNvPr id="2" name="Title 1">
+            <a:extLst>
+              <a:ext uri="{FF2B5EF4-FFF2-40B4-BE49-F238E27FC236}">
+                <a16:creationId xmlns:a16="http://schemas.microsoft.com/office/drawing/2014/main" id="{CDFD80C6-CC7C-47C3-B307-00114EDC1B4A}"/>
+              </a:ext>
+            </a:extLst>
+          </p:cNvPr>
+          <p:cNvSpPr>
+            <a:spLocks noGrp="1"/>
+          </p:cNvSpPr>
+          <p:nvPr>
+            <p:ph type="title"/>
+          </p:nvPr>
+        </p:nvSpPr>
+        <p:spPr/>
+        <p:txBody>
+          <a:bodyPr/>
+          <a:lstStyle/>
+          <a:p>
+            <a:endParaRPr lang="en-BE"/>
+          </a:p>
+        </p:txBody>
+      </p:sp>
+      <p:pic>
+        <p:nvPicPr>
+          <p:cNvPr id="5" name="Content Placeholder 4">
+            <a:extLst>
+              <a:ext uri="{FF2B5EF4-FFF2-40B4-BE49-F238E27FC236}">
+                <a16:creationId xmlns:a16="http://schemas.microsoft.com/office/drawing/2014/main" id="{A5FD809B-EE93-41E0-85A4-CB2BD7BE3FC5}"/>
+              </a:ext>
+            </a:extLst>
+          </p:cNvPr>
+          <p:cNvPicPr>
+            <a:picLocks noGrp="1" noChangeAspect="1"/>
+          </p:cNvPicPr>
+          <p:nvPr>
+            <p:ph idx="1"/>
+          </p:nvPr>
+        </p:nvPicPr>
+        <p:blipFill>
+          <a:blip r:embed="rId2"/>
+          <a:stretch>
+            <a:fillRect/>
+          </a:stretch>
+        </p:blipFill>
+        <p:spPr>
+          <a:xfrm>
+            <a:off x="1501140" y="1807899"/>
+            <a:ext cx="9189719" cy="2926025"/>
+          </a:xfrm>
+        </p:spPr>
+      </p:pic>
+      <p:sp>
+        <p:nvSpPr>
+          <p:cNvPr id="6" name="Rectangle 5">
+            <a:extLst>
+              <a:ext uri="{FF2B5EF4-FFF2-40B4-BE49-F238E27FC236}">
+                <a16:creationId xmlns:a16="http://schemas.microsoft.com/office/drawing/2014/main" id="{6C29472B-90F4-46DC-8A01-1ACB415B4A38}"/>
+              </a:ext>
+            </a:extLst>
+          </p:cNvPr>
+          <p:cNvSpPr/>
+          <p:nvPr/>
+        </p:nvSpPr>
+        <p:spPr bwMode="auto">
+          <a:xfrm>
+            <a:off x="3524250" y="1823996"/>
+            <a:ext cx="2019300" cy="400050"/>
+          </a:xfrm>
+          <a:prstGeom prst="rect">
+            <a:avLst/>
+          </a:prstGeom>
+          <a:noFill/>
+          <a:ln w="19050">
+            <a:solidFill>
+              <a:srgbClr val="FF0000"/>
+            </a:solidFill>
+            <a:headEnd type="none" w="med" len="med"/>
+            <a:tailEnd type="none" w="med" len="med"/>
+          </a:ln>
+          <a:effectLst/>
+        </p:spPr>
+        <p:style>
+          <a:lnRef idx="1">
+            <a:schemeClr val="accent2"/>
+          </a:lnRef>
+          <a:fillRef idx="3">
+            <a:schemeClr val="accent2"/>
+          </a:fillRef>
+          <a:effectRef idx="2">
+            <a:schemeClr val="accent2"/>
+          </a:effectRef>
+          <a:fontRef idx="minor">
+            <a:schemeClr val="lt1"/>
+          </a:fontRef>
+        </p:style>
+        <p:txBody>
+          <a:bodyPr rot="0" spcFirstLastPara="0" vertOverflow="overflow" horzOverflow="overflow" vert="horz" wrap="square" lIns="182880" tIns="146304" rIns="182880" bIns="146304" numCol="1" spcCol="0" rtlCol="0" fromWordArt="0" anchor="t" anchorCtr="0" forceAA="0" compatLnSpc="1">
+            <a:prstTxWarp prst="textNoShape">
+              <a:avLst/>
+            </a:prstTxWarp>
+            <a:noAutofit/>
+          </a:bodyPr>
+          <a:lstStyle/>
+          <a:p>
+            <a:pPr algn="l" defTabSz="932472" fontAlgn="base">
+              <a:spcBef>
+                <a:spcPct val="0"/>
+              </a:spcBef>
+              <a:spcAft>
+                <a:spcPct val="0"/>
+              </a:spcAft>
+            </a:pPr>
+            <a:endParaRPr lang="en-BE" sz="2000" dirty="0" err="1">
+              <a:solidFill>
+                <a:srgbClr val="FFFFFF"/>
+              </a:solidFill>
+              <a:ea typeface="Segoe UI" pitchFamily="34" charset="0"/>
+              <a:cs typeface="Segoe UI" pitchFamily="34" charset="0"/>
+            </a:endParaRPr>
+          </a:p>
+        </p:txBody>
+      </p:sp>
+    </p:spTree>
+    <p:extLst>
+      <p:ext uri="{BB962C8B-B14F-4D97-AF65-F5344CB8AC3E}">
+        <p14:creationId xmlns:p14="http://schemas.microsoft.com/office/powerpoint/2010/main" val="566810426"/>
+      </p:ext>
+    </p:extLst>
+  </p:cSld>
+  <p:clrMapOvr>
+    <a:masterClrMapping/>
+  </p:clrMapOvr>
+</p:sld>
+</file>
+
+<file path=ppt/slides/slide7.xml><?xml version="1.0" encoding="utf-8"?>
+<p:sld xmlns:a="http://schemas.openxmlformats.org/drawingml/2006/main" xmlns:r="http://schemas.openxmlformats.org/officeDocument/2006/relationships" xmlns:p="http://schemas.openxmlformats.org/presentationml/2006/main" show="0">
+  <p:cSld>
+    <p:spTree>
+      <p:nvGrpSpPr>
+        <p:cNvPr id="1" name=""/>
+        <p:cNvGrpSpPr/>
+        <p:nvPr/>
+      </p:nvGrpSpPr>
+      <p:grpSpPr>
+        <a:xfrm>
+          <a:off x="0" y="0"/>
+          <a:ext cx="0" cy="0"/>
+          <a:chOff x="0" y="0"/>
+          <a:chExt cx="0" cy="0"/>
+        </a:xfrm>
+      </p:grpSpPr>
+      <p:sp>
+        <p:nvSpPr>
+          <p:cNvPr id="2" name="Title 1">
+            <a:extLst>
+              <a:ext uri="{FF2B5EF4-FFF2-40B4-BE49-F238E27FC236}">
+                <a16:creationId xmlns:a16="http://schemas.microsoft.com/office/drawing/2014/main" id="{CDFD80C6-CC7C-47C3-B307-00114EDC1B4A}"/>
+              </a:ext>
+            </a:extLst>
+          </p:cNvPr>
+          <p:cNvSpPr>
+            <a:spLocks noGrp="1"/>
+          </p:cNvSpPr>
+          <p:nvPr>
+            <p:ph type="title"/>
+          </p:nvPr>
+        </p:nvSpPr>
+        <p:spPr/>
+        <p:txBody>
+          <a:bodyPr/>
+          <a:lstStyle/>
+          <a:p>
+            <a:endParaRPr lang="en-BE"/>
+          </a:p>
+        </p:txBody>
+      </p:sp>
+      <p:pic>
+        <p:nvPicPr>
+          <p:cNvPr id="5" name="Content Placeholder 4">
+            <a:extLst>
+              <a:ext uri="{FF2B5EF4-FFF2-40B4-BE49-F238E27FC236}">
+                <a16:creationId xmlns:a16="http://schemas.microsoft.com/office/drawing/2014/main" id="{A5FD809B-EE93-41E0-85A4-CB2BD7BE3FC5}"/>
+              </a:ext>
+            </a:extLst>
+          </p:cNvPr>
+          <p:cNvPicPr>
+            <a:picLocks noGrp="1" noChangeAspect="1"/>
+          </p:cNvPicPr>
+          <p:nvPr>
+            <p:ph idx="1"/>
+          </p:nvPr>
+        </p:nvPicPr>
+        <p:blipFill>
+          <a:blip r:embed="rId2"/>
+          <a:stretch>
+            <a:fillRect/>
+          </a:stretch>
+        </p:blipFill>
+        <p:spPr>
+          <a:xfrm>
+            <a:off x="1501140" y="1807899"/>
+            <a:ext cx="9189719" cy="2926025"/>
+          </a:xfrm>
+        </p:spPr>
+      </p:pic>
+      <p:sp>
+        <p:nvSpPr>
+          <p:cNvPr id="6" name="Rectangle 5">
+            <a:extLst>
+              <a:ext uri="{FF2B5EF4-FFF2-40B4-BE49-F238E27FC236}">
+                <a16:creationId xmlns:a16="http://schemas.microsoft.com/office/drawing/2014/main" id="{6C29472B-90F4-46DC-8A01-1ACB415B4A38}"/>
+              </a:ext>
+            </a:extLst>
+          </p:cNvPr>
+          <p:cNvSpPr/>
+          <p:nvPr/>
+        </p:nvSpPr>
+        <p:spPr bwMode="auto">
+          <a:xfrm>
+            <a:off x="2085064" y="2460100"/>
+            <a:ext cx="2019300" cy="400050"/>
+          </a:xfrm>
+          <a:prstGeom prst="rect">
+            <a:avLst/>
+          </a:prstGeom>
+          <a:noFill/>
+          <a:ln w="19050">
+            <a:solidFill>
+              <a:srgbClr val="FF0000"/>
+            </a:solidFill>
+            <a:headEnd type="none" w="med" len="med"/>
+            <a:tailEnd type="none" w="med" len="med"/>
+          </a:ln>
+          <a:effectLst/>
+        </p:spPr>
+        <p:style>
+          <a:lnRef idx="1">
+            <a:schemeClr val="accent2"/>
+          </a:lnRef>
+          <a:fillRef idx="3">
+            <a:schemeClr val="accent2"/>
+          </a:fillRef>
+          <a:effectRef idx="2">
+            <a:schemeClr val="accent2"/>
+          </a:effectRef>
+          <a:fontRef idx="minor">
+            <a:schemeClr val="lt1"/>
+          </a:fontRef>
+        </p:style>
+        <p:txBody>
+          <a:bodyPr rot="0" spcFirstLastPara="0" vertOverflow="overflow" horzOverflow="overflow" vert="horz" wrap="square" lIns="182880" tIns="146304" rIns="182880" bIns="146304" numCol="1" spcCol="0" rtlCol="0" fromWordArt="0" anchor="t" anchorCtr="0" forceAA="0" compatLnSpc="1">
+            <a:prstTxWarp prst="textNoShape">
+              <a:avLst/>
+            </a:prstTxWarp>
+            <a:noAutofit/>
+          </a:bodyPr>
+          <a:lstStyle/>
+          <a:p>
+            <a:pPr algn="l" defTabSz="932472" fontAlgn="base">
+              <a:spcBef>
+                <a:spcPct val="0"/>
+              </a:spcBef>
+              <a:spcAft>
+                <a:spcPct val="0"/>
+              </a:spcAft>
+            </a:pPr>
+            <a:endParaRPr lang="en-BE" sz="2000" dirty="0" err="1">
+              <a:solidFill>
+                <a:srgbClr val="FFFFFF"/>
+              </a:solidFill>
+              <a:ea typeface="Segoe UI" pitchFamily="34" charset="0"/>
+              <a:cs typeface="Segoe UI" pitchFamily="34" charset="0"/>
+            </a:endParaRPr>
+          </a:p>
+        </p:txBody>
+      </p:sp>
+    </p:spTree>
+    <p:extLst>
+      <p:ext uri="{BB962C8B-B14F-4D97-AF65-F5344CB8AC3E}">
+        <p14:creationId xmlns:p14="http://schemas.microsoft.com/office/powerpoint/2010/main" val="37632715"/>
+      </p:ext>
+    </p:extLst>
+  </p:cSld>
+  <p:clrMapOvr>
+    <a:masterClrMapping/>
+  </p:clrMapOvr>
+</p:sld>
+</file>
+
+<file path=ppt/slides/slide8.xml><?xml version="1.0" encoding="utf-8"?>
+<p:sld xmlns:a="http://schemas.openxmlformats.org/drawingml/2006/main" xmlns:r="http://schemas.openxmlformats.org/officeDocument/2006/relationships" xmlns:p="http://schemas.openxmlformats.org/presentationml/2006/main" show="0">
+  <p:cSld>
+    <p:spTree>
+      <p:nvGrpSpPr>
+        <p:cNvPr id="1" name=""/>
+        <p:cNvGrpSpPr/>
+        <p:nvPr/>
+      </p:nvGrpSpPr>
+      <p:grpSpPr>
+        <a:xfrm>
+          <a:off x="0" y="0"/>
+          <a:ext cx="0" cy="0"/>
+          <a:chOff x="0" y="0"/>
+          <a:chExt cx="0" cy="0"/>
+        </a:xfrm>
+      </p:grpSpPr>
+      <p:sp>
+        <p:nvSpPr>
+          <p:cNvPr id="2" name="Title 1">
+            <a:extLst>
+              <a:ext uri="{FF2B5EF4-FFF2-40B4-BE49-F238E27FC236}">
+                <a16:creationId xmlns:a16="http://schemas.microsoft.com/office/drawing/2014/main" id="{CDFD80C6-CC7C-47C3-B307-00114EDC1B4A}"/>
+              </a:ext>
+            </a:extLst>
+          </p:cNvPr>
+          <p:cNvSpPr>
+            <a:spLocks noGrp="1"/>
+          </p:cNvSpPr>
+          <p:nvPr>
+            <p:ph type="title"/>
+          </p:nvPr>
+        </p:nvSpPr>
+        <p:spPr/>
+        <p:txBody>
+          <a:bodyPr/>
+          <a:lstStyle/>
+          <a:p>
+            <a:endParaRPr lang="en-BE"/>
+          </a:p>
+        </p:txBody>
+      </p:sp>
+      <p:pic>
+        <p:nvPicPr>
+          <p:cNvPr id="5" name="Content Placeholder 4">
+            <a:extLst>
+              <a:ext uri="{FF2B5EF4-FFF2-40B4-BE49-F238E27FC236}">
+                <a16:creationId xmlns:a16="http://schemas.microsoft.com/office/drawing/2014/main" id="{A5FD809B-EE93-41E0-85A4-CB2BD7BE3FC5}"/>
+              </a:ext>
+            </a:extLst>
+          </p:cNvPr>
+          <p:cNvPicPr>
+            <a:picLocks noGrp="1" noChangeAspect="1"/>
+          </p:cNvPicPr>
+          <p:nvPr>
+            <p:ph idx="1"/>
+          </p:nvPr>
+        </p:nvPicPr>
+        <p:blipFill>
+          <a:blip r:embed="rId2"/>
+          <a:stretch>
+            <a:fillRect/>
+          </a:stretch>
+        </p:blipFill>
+        <p:spPr>
+          <a:xfrm>
+            <a:off x="1501140" y="1807899"/>
+            <a:ext cx="9189719" cy="2926025"/>
+          </a:xfrm>
+        </p:spPr>
+      </p:pic>
+      <p:sp>
+        <p:nvSpPr>
+          <p:cNvPr id="3" name="Rectangle 2">
+            <a:extLst>
+              <a:ext uri="{FF2B5EF4-FFF2-40B4-BE49-F238E27FC236}">
+                <a16:creationId xmlns:a16="http://schemas.microsoft.com/office/drawing/2014/main" id="{DE8A9355-49CF-47ED-912B-109C9F42F64D}"/>
+              </a:ext>
+            </a:extLst>
+          </p:cNvPr>
+          <p:cNvSpPr/>
+          <p:nvPr/>
+        </p:nvSpPr>
+        <p:spPr bwMode="auto">
+          <a:xfrm>
+            <a:off x="2512611" y="3212327"/>
+            <a:ext cx="1362489" cy="300024"/>
+          </a:xfrm>
+          <a:prstGeom prst="rect">
+            <a:avLst/>
+          </a:prstGeom>
+          <a:noFill/>
+          <a:ln w="19050">
+            <a:solidFill>
+              <a:srgbClr val="FF0000"/>
+            </a:solidFill>
+            <a:headEnd type="none" w="med" len="med"/>
+            <a:tailEnd type="none" w="med" len="med"/>
+          </a:ln>
+          <a:effectLst/>
+        </p:spPr>
+        <p:style>
+          <a:lnRef idx="1">
+            <a:schemeClr val="accent2"/>
+          </a:lnRef>
+          <a:fillRef idx="3">
+            <a:schemeClr val="accent2"/>
+          </a:fillRef>
+          <a:effectRef idx="2">
+            <a:schemeClr val="accent2"/>
+          </a:effectRef>
+          <a:fontRef idx="minor">
+            <a:schemeClr val="lt1"/>
+          </a:fontRef>
+        </p:style>
+        <p:txBody>
+          <a:bodyPr rot="0" spcFirstLastPara="0" vertOverflow="overflow" horzOverflow="overflow" vert="horz" wrap="square" lIns="182880" tIns="146304" rIns="182880" bIns="146304" numCol="1" spcCol="0" rtlCol="0" fromWordArt="0" anchor="t" anchorCtr="0" forceAA="0" compatLnSpc="1">
+            <a:prstTxWarp prst="textNoShape">
+              <a:avLst/>
+            </a:prstTxWarp>
+            <a:noAutofit/>
+          </a:bodyPr>
+          <a:lstStyle/>
+          <a:p>
+            <a:pPr algn="l" defTabSz="932472" fontAlgn="base">
+              <a:spcBef>
+                <a:spcPct val="0"/>
+              </a:spcBef>
+              <a:spcAft>
+                <a:spcPct val="0"/>
+              </a:spcAft>
+            </a:pPr>
+            <a:endParaRPr lang="en-BE" sz="2000" dirty="0" err="1">
+              <a:solidFill>
+                <a:srgbClr val="FFFFFF"/>
+              </a:solidFill>
+              <a:ea typeface="Segoe UI" pitchFamily="34" charset="0"/>
+              <a:cs typeface="Segoe UI" pitchFamily="34" charset="0"/>
+            </a:endParaRPr>
+          </a:p>
+        </p:txBody>
+      </p:sp>
+    </p:spTree>
+    <p:extLst>
+      <p:ext uri="{BB962C8B-B14F-4D97-AF65-F5344CB8AC3E}">
+        <p14:creationId xmlns:p14="http://schemas.microsoft.com/office/powerpoint/2010/main" val="296623923"/>
+      </p:ext>
+    </p:extLst>
+  </p:cSld>
+  <p:clrMapOvr>
+    <a:masterClrMapping/>
+  </p:clrMapOvr>
+</p:sld>
+</file>
+
 <file path=ppt/theme/theme1.xml><?xml version="1.0" encoding="utf-8"?>
 <a:theme xmlns:a="http://schemas.openxmlformats.org/drawingml/2006/main" name="White Template">
   <a:themeElements>

</xml_diff>

<commit_message>
Updated Overview picture and ppt
</commit_message>
<xml_diff>
--- a/SAP-Data-MicroHack.pptx
+++ b/SAP-Data-MicroHack.pptx
@@ -6,13 +6,15 @@
   </p:sldMasterIdLst>
   <p:sldIdLst>
     <p:sldId id="256" r:id="rId2"/>
-    <p:sldId id="257" r:id="rId3"/>
-    <p:sldId id="259" r:id="rId4"/>
-    <p:sldId id="258" r:id="rId5"/>
-    <p:sldId id="260" r:id="rId6"/>
-    <p:sldId id="261" r:id="rId7"/>
-    <p:sldId id="262" r:id="rId8"/>
-    <p:sldId id="263" r:id="rId9"/>
+    <p:sldId id="265" r:id="rId3"/>
+    <p:sldId id="257" r:id="rId4"/>
+    <p:sldId id="259" r:id="rId5"/>
+    <p:sldId id="270" r:id="rId6"/>
+    <p:sldId id="264" r:id="rId7"/>
+    <p:sldId id="268" r:id="rId8"/>
+    <p:sldId id="258" r:id="rId9"/>
+    <p:sldId id="260" r:id="rId10"/>
+    <p:sldId id="271" r:id="rId11"/>
   </p:sldIdLst>
   <p:sldSz cx="12192000" cy="6858000"/>
   <p:notesSz cx="6858000" cy="9144000"/>
@@ -119,557 +121,21 @@
 </p:presentation>
 </file>
 
-<file path=ppt/revisionInfo.xml><?xml version="1.0" encoding="utf-8"?>
-<p1510:revInfo xmlns:a="http://schemas.openxmlformats.org/drawingml/2006/main" xmlns:r="http://schemas.openxmlformats.org/officeDocument/2006/relationships" xmlns:p1510="http://schemas.microsoft.com/office/powerpoint/2015/10/main">
-  <p1510:revLst>
-    <p1510:client id="{099E1954-559E-4CA5-A258-E555D91FCE49}" v="51" dt="2021-04-19T07:10:36.940"/>
-  </p1510:revLst>
-</p1510:revInfo>
-</file>
-
 <file path=ppt/changesInfos/changesInfo1.xml><?xml version="1.0" encoding="utf-8"?>
 <pc:chgInfo xmlns:a="http://schemas.openxmlformats.org/drawingml/2006/main" xmlns:r="http://schemas.openxmlformats.org/officeDocument/2006/relationships" xmlns:ac="http://schemas.microsoft.com/office/drawing/2013/main/command" xmlns:pc="http://schemas.microsoft.com/office/powerpoint/2013/main/command">
   <pc:docChgLst>
-    <pc:chgData name="Bart Delanghe" userId="956f3f6c82133ec8" providerId="LiveId" clId="{099E1954-559E-4CA5-A258-E555D91FCE49}"/>
-    <pc:docChg chg="undo custSel addSld delSld modSld">
-      <pc:chgData name="Bart Delanghe" userId="956f3f6c82133ec8" providerId="LiveId" clId="{099E1954-559E-4CA5-A258-E555D91FCE49}" dt="2021-05-06T16:37:04.350" v="578" actId="14100"/>
+    <pc:chgData name="Bart Delanghe" userId="956f3f6c82133ec8" providerId="LiveId" clId="{5565C48E-DD9D-4D42-AA34-0333562AE3EF}"/>
+    <pc:docChg chg="delSld">
+      <pc:chgData name="Bart Delanghe" userId="956f3f6c82133ec8" providerId="LiveId" clId="{5565C48E-DD9D-4D42-AA34-0333562AE3EF}" dt="2021-06-10T07:40:24.932" v="0" actId="47"/>
       <pc:docMkLst>
         <pc:docMk/>
       </pc:docMkLst>
-      <pc:sldChg chg="addSp delSp modSp mod modTransition modMedia modClrScheme delAnim chgLayout">
-        <pc:chgData name="Bart Delanghe" userId="956f3f6c82133ec8" providerId="LiveId" clId="{099E1954-559E-4CA5-A258-E555D91FCE49}" dt="2021-04-19T06:48:16.591" v="498" actId="20577"/>
+      <pc:sldChg chg="del">
+        <pc:chgData name="Bart Delanghe" userId="956f3f6c82133ec8" providerId="LiveId" clId="{5565C48E-DD9D-4D42-AA34-0333562AE3EF}" dt="2021-06-10T07:40:24.932" v="0" actId="47"/>
         <pc:sldMkLst>
           <pc:docMk/>
-          <pc:sldMk cId="1991394088" sldId="256"/>
+          <pc:sldMk cId="3282792898" sldId="269"/>
         </pc:sldMkLst>
-        <pc:spChg chg="mod">
-          <ac:chgData name="Bart Delanghe" userId="956f3f6c82133ec8" providerId="LiveId" clId="{099E1954-559E-4CA5-A258-E555D91FCE49}" dt="2021-04-19T06:48:16.591" v="498" actId="20577"/>
-          <ac:spMkLst>
-            <pc:docMk/>
-            <pc:sldMk cId="1991394088" sldId="256"/>
-            <ac:spMk id="2" creationId="{E991427E-A5A5-423A-864A-94730E3DCC8B}"/>
-          </ac:spMkLst>
-        </pc:spChg>
-        <pc:spChg chg="add del mod">
-          <ac:chgData name="Bart Delanghe" userId="956f3f6c82133ec8" providerId="LiveId" clId="{099E1954-559E-4CA5-A258-E555D91FCE49}" dt="2021-04-18T08:09:56.137" v="386" actId="26606"/>
-          <ac:spMkLst>
-            <pc:docMk/>
-            <pc:sldMk cId="1991394088" sldId="256"/>
-            <ac:spMk id="3" creationId="{D94A57FD-D8E4-4AF5-AFD5-EF0801116460}"/>
-          </ac:spMkLst>
-        </pc:spChg>
-        <pc:picChg chg="add del mod">
-          <ac:chgData name="Bart Delanghe" userId="956f3f6c82133ec8" providerId="LiveId" clId="{099E1954-559E-4CA5-A258-E555D91FCE49}" dt="2021-04-18T08:06:45.386" v="269" actId="26606"/>
-          <ac:picMkLst>
-            <pc:docMk/>
-            <pc:sldMk cId="1991394088" sldId="256"/>
-            <ac:picMk id="5" creationId="{CCEA8CDF-EDDC-48B6-8849-16E2B0F8EBD4}"/>
-          </ac:picMkLst>
-        </pc:picChg>
-        <pc:picChg chg="add">
-          <ac:chgData name="Bart Delanghe" userId="956f3f6c82133ec8" providerId="LiveId" clId="{099E1954-559E-4CA5-A258-E555D91FCE49}" dt="2021-04-18T08:09:56.137" v="386" actId="26606"/>
-          <ac:picMkLst>
-            <pc:docMk/>
-            <pc:sldMk cId="1991394088" sldId="256"/>
-            <ac:picMk id="6" creationId="{E583710C-1A11-4361-ABFD-4A3D92126BF4}"/>
-          </ac:picMkLst>
-        </pc:picChg>
-        <pc:picChg chg="add del mod">
-          <ac:chgData name="Bart Delanghe" userId="956f3f6c82133ec8" providerId="LiveId" clId="{099E1954-559E-4CA5-A258-E555D91FCE49}" dt="2021-04-18T08:07:11.522" v="273" actId="26606"/>
-          <ac:picMkLst>
-            <pc:docMk/>
-            <pc:sldMk cId="1991394088" sldId="256"/>
-            <ac:picMk id="7" creationId="{302452AA-75F0-4843-A88F-AE2B21E8F6B2}"/>
-          </ac:picMkLst>
-        </pc:picChg>
-      </pc:sldChg>
-      <pc:sldChg chg="addSp delSp modSp mod">
-        <pc:chgData name="Bart Delanghe" userId="956f3f6c82133ec8" providerId="LiveId" clId="{099E1954-559E-4CA5-A258-E555D91FCE49}" dt="2021-04-19T06:36:20.894" v="466" actId="20577"/>
-        <pc:sldMkLst>
-          <pc:docMk/>
-          <pc:sldMk cId="1874981345" sldId="257"/>
-        </pc:sldMkLst>
-        <pc:spChg chg="mod">
-          <ac:chgData name="Bart Delanghe" userId="956f3f6c82133ec8" providerId="LiveId" clId="{099E1954-559E-4CA5-A258-E555D91FCE49}" dt="2021-04-18T08:09:46.763" v="385"/>
-          <ac:spMkLst>
-            <pc:docMk/>
-            <pc:sldMk cId="1874981345" sldId="257"/>
-            <ac:spMk id="2" creationId="{8DFCECFC-5462-448A-A017-618079AFE906}"/>
-          </ac:spMkLst>
-        </pc:spChg>
-        <pc:spChg chg="add del mod">
-          <ac:chgData name="Bart Delanghe" userId="956f3f6c82133ec8" providerId="LiveId" clId="{099E1954-559E-4CA5-A258-E555D91FCE49}" dt="2021-04-19T06:36:20.894" v="466" actId="20577"/>
-          <ac:spMkLst>
-            <pc:docMk/>
-            <pc:sldMk cId="1874981345" sldId="257"/>
-            <ac:spMk id="3" creationId="{20796AE4-D7EA-4E03-8EDB-5C9379AA3BE2}"/>
-          </ac:spMkLst>
-        </pc:spChg>
-        <pc:spChg chg="mod">
-          <ac:chgData name="Bart Delanghe" userId="956f3f6c82133ec8" providerId="LiveId" clId="{099E1954-559E-4CA5-A258-E555D91FCE49}" dt="2021-04-18T07:55:48.615" v="47" actId="1036"/>
-          <ac:spMkLst>
-            <pc:docMk/>
-            <pc:sldMk cId="1874981345" sldId="257"/>
-            <ac:spMk id="12" creationId="{7E8A18AA-2142-4EE3-8C26-FC5CF556AA5F}"/>
-          </ac:spMkLst>
-        </pc:spChg>
-        <pc:spChg chg="mod">
-          <ac:chgData name="Bart Delanghe" userId="956f3f6c82133ec8" providerId="LiveId" clId="{099E1954-559E-4CA5-A258-E555D91FCE49}" dt="2021-04-18T07:55:48.615" v="47" actId="1036"/>
-          <ac:spMkLst>
-            <pc:docMk/>
-            <pc:sldMk cId="1874981345" sldId="257"/>
-            <ac:spMk id="14" creationId="{41923107-38D7-4A71-B311-A5104127899A}"/>
-          </ac:spMkLst>
-        </pc:spChg>
-        <pc:spChg chg="mod">
-          <ac:chgData name="Bart Delanghe" userId="956f3f6c82133ec8" providerId="LiveId" clId="{099E1954-559E-4CA5-A258-E555D91FCE49}" dt="2021-04-18T07:55:48.615" v="47" actId="1036"/>
-          <ac:spMkLst>
-            <pc:docMk/>
-            <pc:sldMk cId="1874981345" sldId="257"/>
-            <ac:spMk id="17" creationId="{87E8B02A-A68C-49D2-8337-9C024521DBE4}"/>
-          </ac:spMkLst>
-        </pc:spChg>
-        <pc:spChg chg="mod">
-          <ac:chgData name="Bart Delanghe" userId="956f3f6c82133ec8" providerId="LiveId" clId="{099E1954-559E-4CA5-A258-E555D91FCE49}" dt="2021-04-18T07:55:48.615" v="47" actId="1036"/>
-          <ac:spMkLst>
-            <pc:docMk/>
-            <pc:sldMk cId="1874981345" sldId="257"/>
-            <ac:spMk id="19" creationId="{12FD7865-4734-4791-98CE-930C3132A358}"/>
-          </ac:spMkLst>
-        </pc:spChg>
-        <pc:spChg chg="mod">
-          <ac:chgData name="Bart Delanghe" userId="956f3f6c82133ec8" providerId="LiveId" clId="{099E1954-559E-4CA5-A258-E555D91FCE49}" dt="2021-04-18T07:55:48.615" v="47" actId="1036"/>
-          <ac:spMkLst>
-            <pc:docMk/>
-            <pc:sldMk cId="1874981345" sldId="257"/>
-            <ac:spMk id="21" creationId="{9D1E782D-C484-4E03-B055-E8427408AFE1}"/>
-          </ac:spMkLst>
-        </pc:spChg>
-        <pc:spChg chg="mod">
-          <ac:chgData name="Bart Delanghe" userId="956f3f6c82133ec8" providerId="LiveId" clId="{099E1954-559E-4CA5-A258-E555D91FCE49}" dt="2021-04-18T07:55:48.615" v="47" actId="1036"/>
-          <ac:spMkLst>
-            <pc:docMk/>
-            <pc:sldMk cId="1874981345" sldId="257"/>
-            <ac:spMk id="23" creationId="{CADECAF4-B221-4C21-9560-AFAFFFB50C7A}"/>
-          </ac:spMkLst>
-        </pc:spChg>
-        <pc:spChg chg="mod">
-          <ac:chgData name="Bart Delanghe" userId="956f3f6c82133ec8" providerId="LiveId" clId="{099E1954-559E-4CA5-A258-E555D91FCE49}" dt="2021-04-18T07:55:48.615" v="47" actId="1036"/>
-          <ac:spMkLst>
-            <pc:docMk/>
-            <pc:sldMk cId="1874981345" sldId="257"/>
-            <ac:spMk id="25" creationId="{B638B279-8B3A-417B-8E2A-934F20A2E684}"/>
-          </ac:spMkLst>
-        </pc:spChg>
-        <pc:spChg chg="mod">
-          <ac:chgData name="Bart Delanghe" userId="956f3f6c82133ec8" providerId="LiveId" clId="{099E1954-559E-4CA5-A258-E555D91FCE49}" dt="2021-04-18T07:55:48.615" v="47" actId="1036"/>
-          <ac:spMkLst>
-            <pc:docMk/>
-            <pc:sldMk cId="1874981345" sldId="257"/>
-            <ac:spMk id="27" creationId="{3EC7DF82-7DB5-4B30-8556-D6F5E82F39EE}"/>
-          </ac:spMkLst>
-        </pc:spChg>
-        <pc:spChg chg="mod">
-          <ac:chgData name="Bart Delanghe" userId="956f3f6c82133ec8" providerId="LiveId" clId="{099E1954-559E-4CA5-A258-E555D91FCE49}" dt="2021-04-18T07:55:48.615" v="47" actId="1036"/>
-          <ac:spMkLst>
-            <pc:docMk/>
-            <pc:sldMk cId="1874981345" sldId="257"/>
-            <ac:spMk id="28" creationId="{F8CC641A-D302-47FA-80E9-864CC4B6D468}"/>
-          </ac:spMkLst>
-        </pc:spChg>
-        <pc:spChg chg="mod">
-          <ac:chgData name="Bart Delanghe" userId="956f3f6c82133ec8" providerId="LiveId" clId="{099E1954-559E-4CA5-A258-E555D91FCE49}" dt="2021-04-18T07:55:48.615" v="47" actId="1036"/>
-          <ac:spMkLst>
-            <pc:docMk/>
-            <pc:sldMk cId="1874981345" sldId="257"/>
-            <ac:spMk id="30" creationId="{99815AB2-FBC3-473F-BE30-ACA778EF5CB8}"/>
-          </ac:spMkLst>
-        </pc:spChg>
-        <pc:spChg chg="mod">
-          <ac:chgData name="Bart Delanghe" userId="956f3f6c82133ec8" providerId="LiveId" clId="{099E1954-559E-4CA5-A258-E555D91FCE49}" dt="2021-04-18T07:55:48.615" v="47" actId="1036"/>
-          <ac:spMkLst>
-            <pc:docMk/>
-            <pc:sldMk cId="1874981345" sldId="257"/>
-            <ac:spMk id="32" creationId="{AF9336A1-2270-45FA-8D4D-784CCABFEB65}"/>
-          </ac:spMkLst>
-        </pc:spChg>
-        <pc:spChg chg="mod">
-          <ac:chgData name="Bart Delanghe" userId="956f3f6c82133ec8" providerId="LiveId" clId="{099E1954-559E-4CA5-A258-E555D91FCE49}" dt="2021-04-18T07:55:48.615" v="47" actId="1036"/>
-          <ac:spMkLst>
-            <pc:docMk/>
-            <pc:sldMk cId="1874981345" sldId="257"/>
-            <ac:spMk id="34" creationId="{AA048117-F253-4D78-A397-CF7C4A3A035D}"/>
-          </ac:spMkLst>
-        </pc:spChg>
-        <pc:graphicFrameChg chg="add del">
-          <ac:chgData name="Bart Delanghe" userId="956f3f6c82133ec8" providerId="LiveId" clId="{099E1954-559E-4CA5-A258-E555D91FCE49}" dt="2021-04-18T07:57:34.502" v="50" actId="26606"/>
-          <ac:graphicFrameMkLst>
-            <pc:docMk/>
-            <pc:sldMk cId="1874981345" sldId="257"/>
-            <ac:graphicFrameMk id="36" creationId="{58A88CBA-A01F-48D4-B3E7-6669CA020FF7}"/>
-          </ac:graphicFrameMkLst>
-        </pc:graphicFrameChg>
-        <pc:graphicFrameChg chg="add del">
-          <ac:chgData name="Bart Delanghe" userId="956f3f6c82133ec8" providerId="LiveId" clId="{099E1954-559E-4CA5-A258-E555D91FCE49}" dt="2021-04-18T07:57:35.505" v="52" actId="26606"/>
-          <ac:graphicFrameMkLst>
-            <pc:docMk/>
-            <pc:sldMk cId="1874981345" sldId="257"/>
-            <ac:graphicFrameMk id="38" creationId="{9ED503B6-F8E2-4CB0-AA97-A0C12D1D4A14}"/>
-          </ac:graphicFrameMkLst>
-        </pc:graphicFrameChg>
-        <pc:graphicFrameChg chg="add del">
-          <ac:chgData name="Bart Delanghe" userId="956f3f6c82133ec8" providerId="LiveId" clId="{099E1954-559E-4CA5-A258-E555D91FCE49}" dt="2021-04-18T07:57:36.230" v="54" actId="26606"/>
-          <ac:graphicFrameMkLst>
-            <pc:docMk/>
-            <pc:sldMk cId="1874981345" sldId="257"/>
-            <ac:graphicFrameMk id="40" creationId="{72A3197C-7C27-4CEA-9495-1756235CBB55}"/>
-          </ac:graphicFrameMkLst>
-        </pc:graphicFrameChg>
-        <pc:graphicFrameChg chg="add del">
-          <ac:chgData name="Bart Delanghe" userId="956f3f6c82133ec8" providerId="LiveId" clId="{099E1954-559E-4CA5-A258-E555D91FCE49}" dt="2021-04-18T07:57:38.966" v="56" actId="26606"/>
-          <ac:graphicFrameMkLst>
-            <pc:docMk/>
-            <pc:sldMk cId="1874981345" sldId="257"/>
-            <ac:graphicFrameMk id="42" creationId="{3BBF5615-6253-4D6B-BEC0-1BD2D9516D4C}"/>
-          </ac:graphicFrameMkLst>
-        </pc:graphicFrameChg>
-        <pc:cxnChg chg="mod">
-          <ac:chgData name="Bart Delanghe" userId="956f3f6c82133ec8" providerId="LiveId" clId="{099E1954-559E-4CA5-A258-E555D91FCE49}" dt="2021-04-18T07:55:48.615" v="47" actId="1036"/>
-          <ac:cxnSpMkLst>
-            <pc:docMk/>
-            <pc:sldMk cId="1874981345" sldId="257"/>
-            <ac:cxnSpMk id="9" creationId="{6C2BB805-6733-48C3-944D-045FB8E2001F}"/>
-          </ac:cxnSpMkLst>
-        </pc:cxnChg>
-        <pc:cxnChg chg="mod">
-          <ac:chgData name="Bart Delanghe" userId="956f3f6c82133ec8" providerId="LiveId" clId="{099E1954-559E-4CA5-A258-E555D91FCE49}" dt="2021-04-18T07:55:48.615" v="47" actId="1036"/>
-          <ac:cxnSpMkLst>
-            <pc:docMk/>
-            <pc:sldMk cId="1874981345" sldId="257"/>
-            <ac:cxnSpMk id="11" creationId="{29C879C9-4DB9-4B31-BD28-F8150F15DD55}"/>
-          </ac:cxnSpMkLst>
-        </pc:cxnChg>
-      </pc:sldChg>
-      <pc:sldChg chg="addSp delSp modSp mod modTransition modClrScheme chgLayout">
-        <pc:chgData name="Bart Delanghe" userId="956f3f6c82133ec8" providerId="LiveId" clId="{099E1954-559E-4CA5-A258-E555D91FCE49}" dt="2021-04-18T08:14:46.767" v="465" actId="26606"/>
-        <pc:sldMkLst>
-          <pc:docMk/>
-          <pc:sldMk cId="4112841600" sldId="258"/>
-        </pc:sldMkLst>
-        <pc:spChg chg="mod">
-          <ac:chgData name="Bart Delanghe" userId="956f3f6c82133ec8" providerId="LiveId" clId="{099E1954-559E-4CA5-A258-E555D91FCE49}" dt="2021-04-18T08:14:46.767" v="465" actId="26606"/>
-          <ac:spMkLst>
-            <pc:docMk/>
-            <pc:sldMk cId="4112841600" sldId="258"/>
-            <ac:spMk id="2" creationId="{51AD9371-9B27-4D4D-A7F9-0C5690E2FA4F}"/>
-          </ac:spMkLst>
-        </pc:spChg>
-        <pc:spChg chg="add del mod">
-          <ac:chgData name="Bart Delanghe" userId="956f3f6c82133ec8" providerId="LiveId" clId="{099E1954-559E-4CA5-A258-E555D91FCE49}" dt="2021-04-18T08:14:46.767" v="465" actId="26606"/>
-          <ac:spMkLst>
-            <pc:docMk/>
-            <pc:sldMk cId="4112841600" sldId="258"/>
-            <ac:spMk id="3" creationId="{744CA478-4616-4AD1-AC7D-6ED1D3BC8B2A}"/>
-          </ac:spMkLst>
-        </pc:spChg>
-        <pc:graphicFrameChg chg="add del mod">
-          <ac:chgData name="Bart Delanghe" userId="956f3f6c82133ec8" providerId="LiveId" clId="{099E1954-559E-4CA5-A258-E555D91FCE49}" dt="2021-04-18T08:14:46.703" v="464" actId="26606"/>
-          <ac:graphicFrameMkLst>
-            <pc:docMk/>
-            <pc:sldMk cId="4112841600" sldId="258"/>
-            <ac:graphicFrameMk id="5" creationId="{B7F8BACF-0A05-4CCB-A696-52C4E614A7BF}"/>
-          </ac:graphicFrameMkLst>
-        </pc:graphicFrameChg>
-        <pc:graphicFrameChg chg="add mod">
-          <ac:chgData name="Bart Delanghe" userId="956f3f6c82133ec8" providerId="LiveId" clId="{099E1954-559E-4CA5-A258-E555D91FCE49}" dt="2021-04-18T08:14:46.767" v="465" actId="26606"/>
-          <ac:graphicFrameMkLst>
-            <pc:docMk/>
-            <pc:sldMk cId="4112841600" sldId="258"/>
-            <ac:graphicFrameMk id="7" creationId="{7ACAE881-2A15-4EF5-A2E1-95E958C3B748}"/>
-          </ac:graphicFrameMkLst>
-        </pc:graphicFrameChg>
-      </pc:sldChg>
-      <pc:sldChg chg="modSp mod">
-        <pc:chgData name="Bart Delanghe" userId="956f3f6c82133ec8" providerId="LiveId" clId="{099E1954-559E-4CA5-A258-E555D91FCE49}" dt="2021-05-06T16:37:04.350" v="578" actId="14100"/>
-        <pc:sldMkLst>
-          <pc:docMk/>
-          <pc:sldMk cId="3120669869" sldId="259"/>
-        </pc:sldMkLst>
-        <pc:spChg chg="mod">
-          <ac:chgData name="Bart Delanghe" userId="956f3f6c82133ec8" providerId="LiveId" clId="{099E1954-559E-4CA5-A258-E555D91FCE49}" dt="2021-04-18T08:09:46.763" v="385"/>
-          <ac:spMkLst>
-            <pc:docMk/>
-            <pc:sldMk cId="3120669869" sldId="259"/>
-            <ac:spMk id="2" creationId="{AE671CB7-A2BE-41D2-A840-5D91E33AC3CD}"/>
-          </ac:spMkLst>
-        </pc:spChg>
-        <pc:spChg chg="mod">
-          <ac:chgData name="Bart Delanghe" userId="956f3f6c82133ec8" providerId="LiveId" clId="{099E1954-559E-4CA5-A258-E555D91FCE49}" dt="2021-04-19T06:54:35.985" v="539" actId="1038"/>
-          <ac:spMkLst>
-            <pc:docMk/>
-            <pc:sldMk cId="3120669869" sldId="259"/>
-            <ac:spMk id="6" creationId="{C8176678-4B17-4D5A-92C9-3CE652FE4D51}"/>
-          </ac:spMkLst>
-        </pc:spChg>
-        <pc:spChg chg="mod">
-          <ac:chgData name="Bart Delanghe" userId="956f3f6c82133ec8" providerId="LiveId" clId="{099E1954-559E-4CA5-A258-E555D91FCE49}" dt="2021-04-19T06:54:35.985" v="539" actId="1038"/>
-          <ac:spMkLst>
-            <pc:docMk/>
-            <pc:sldMk cId="3120669869" sldId="259"/>
-            <ac:spMk id="12" creationId="{CABBD023-F2DF-4310-AF15-1FA5085761AE}"/>
-          </ac:spMkLst>
-        </pc:spChg>
-        <pc:spChg chg="mod">
-          <ac:chgData name="Bart Delanghe" userId="956f3f6c82133ec8" providerId="LiveId" clId="{099E1954-559E-4CA5-A258-E555D91FCE49}" dt="2021-04-19T06:55:19.102" v="547" actId="404"/>
-          <ac:spMkLst>
-            <pc:docMk/>
-            <pc:sldMk cId="3120669869" sldId="259"/>
-            <ac:spMk id="14" creationId="{0D03AE79-053D-4F15-86BD-8F506B2CD4CC}"/>
-          </ac:spMkLst>
-        </pc:spChg>
-        <pc:spChg chg="mod">
-          <ac:chgData name="Bart Delanghe" userId="956f3f6c82133ec8" providerId="LiveId" clId="{099E1954-559E-4CA5-A258-E555D91FCE49}" dt="2021-04-19T06:55:03.541" v="543" actId="404"/>
-          <ac:spMkLst>
-            <pc:docMk/>
-            <pc:sldMk cId="3120669869" sldId="259"/>
-            <ac:spMk id="17" creationId="{6C0E8E31-DCD4-4BFE-8CBF-79BA58CA270B}"/>
-          </ac:spMkLst>
-        </pc:spChg>
-        <pc:spChg chg="mod">
-          <ac:chgData name="Bart Delanghe" userId="956f3f6c82133ec8" providerId="LiveId" clId="{099E1954-559E-4CA5-A258-E555D91FCE49}" dt="2021-04-19T06:54:57.852" v="541" actId="404"/>
-          <ac:spMkLst>
-            <pc:docMk/>
-            <pc:sldMk cId="3120669869" sldId="259"/>
-            <ac:spMk id="19" creationId="{ABF5D6CA-BB48-4787-93F3-D64602D8F89D}"/>
-          </ac:spMkLst>
-        </pc:spChg>
-        <pc:spChg chg="mod">
-          <ac:chgData name="Bart Delanghe" userId="956f3f6c82133ec8" providerId="LiveId" clId="{099E1954-559E-4CA5-A258-E555D91FCE49}" dt="2021-04-19T06:55:15.089" v="545" actId="404"/>
-          <ac:spMkLst>
-            <pc:docMk/>
-            <pc:sldMk cId="3120669869" sldId="259"/>
-            <ac:spMk id="31" creationId="{9A42F41D-B033-4994-9598-CCCD288CFFBF}"/>
-          </ac:spMkLst>
-        </pc:spChg>
-        <pc:spChg chg="mod">
-          <ac:chgData name="Bart Delanghe" userId="956f3f6c82133ec8" providerId="LiveId" clId="{099E1954-559E-4CA5-A258-E555D91FCE49}" dt="2021-05-06T16:36:37.810" v="575" actId="1076"/>
-          <ac:spMkLst>
-            <pc:docMk/>
-            <pc:sldMk cId="3120669869" sldId="259"/>
-            <ac:spMk id="40" creationId="{0BA8B297-2F45-4376-A4C9-BD6B6BC838C2}"/>
-          </ac:spMkLst>
-        </pc:spChg>
-        <pc:spChg chg="mod">
-          <ac:chgData name="Bart Delanghe" userId="956f3f6c82133ec8" providerId="LiveId" clId="{099E1954-559E-4CA5-A258-E555D91FCE49}" dt="2021-05-06T16:37:04.350" v="578" actId="14100"/>
-          <ac:spMkLst>
-            <pc:docMk/>
-            <pc:sldMk cId="3120669869" sldId="259"/>
-            <ac:spMk id="42" creationId="{4295DCC5-862C-4BF1-B50A-9456B8EF3BD5}"/>
-          </ac:spMkLst>
-        </pc:spChg>
-        <pc:picChg chg="mod">
-          <ac:chgData name="Bart Delanghe" userId="956f3f6c82133ec8" providerId="LiveId" clId="{099E1954-559E-4CA5-A258-E555D91FCE49}" dt="2021-04-19T06:54:35.985" v="539" actId="1038"/>
-          <ac:picMkLst>
-            <pc:docMk/>
-            <pc:sldMk cId="3120669869" sldId="259"/>
-            <ac:picMk id="5" creationId="{525B6682-6972-40DC-AE15-291CADA22428}"/>
-          </ac:picMkLst>
-        </pc:picChg>
-        <pc:picChg chg="mod">
-          <ac:chgData name="Bart Delanghe" userId="956f3f6c82133ec8" providerId="LiveId" clId="{099E1954-559E-4CA5-A258-E555D91FCE49}" dt="2021-04-19T06:54:35.985" v="539" actId="1038"/>
-          <ac:picMkLst>
-            <pc:docMk/>
-            <pc:sldMk cId="3120669869" sldId="259"/>
-            <ac:picMk id="7" creationId="{E28BBEB6-8ADA-435F-8A12-279347D650CD}"/>
-          </ac:picMkLst>
-        </pc:picChg>
-        <pc:picChg chg="mod">
-          <ac:chgData name="Bart Delanghe" userId="956f3f6c82133ec8" providerId="LiveId" clId="{099E1954-559E-4CA5-A258-E555D91FCE49}" dt="2021-04-19T06:54:35.985" v="539" actId="1038"/>
-          <ac:picMkLst>
-            <pc:docMk/>
-            <pc:sldMk cId="3120669869" sldId="259"/>
-            <ac:picMk id="9" creationId="{4C5C1C8C-6095-4CB3-AF30-0A7A163AF85E}"/>
-          </ac:picMkLst>
-        </pc:picChg>
-        <pc:picChg chg="mod">
-          <ac:chgData name="Bart Delanghe" userId="956f3f6c82133ec8" providerId="LiveId" clId="{099E1954-559E-4CA5-A258-E555D91FCE49}" dt="2021-04-19T06:54:35.985" v="539" actId="1038"/>
-          <ac:picMkLst>
-            <pc:docMk/>
-            <pc:sldMk cId="3120669869" sldId="259"/>
-            <ac:picMk id="11" creationId="{B31B5D07-047F-4019-8CD6-576A037A03BB}"/>
-          </ac:picMkLst>
-        </pc:picChg>
-        <pc:picChg chg="mod">
-          <ac:chgData name="Bart Delanghe" userId="956f3f6c82133ec8" providerId="LiveId" clId="{099E1954-559E-4CA5-A258-E555D91FCE49}" dt="2021-04-19T06:54:35.985" v="539" actId="1038"/>
-          <ac:picMkLst>
-            <pc:docMk/>
-            <pc:sldMk cId="3120669869" sldId="259"/>
-            <ac:picMk id="15" creationId="{9D902800-78CD-448D-A222-720D91D24B4D}"/>
-          </ac:picMkLst>
-        </pc:picChg>
-        <pc:picChg chg="mod">
-          <ac:chgData name="Bart Delanghe" userId="956f3f6c82133ec8" providerId="LiveId" clId="{099E1954-559E-4CA5-A258-E555D91FCE49}" dt="2021-04-19T07:10:36.938" v="548" actId="1076"/>
-          <ac:picMkLst>
-            <pc:docMk/>
-            <pc:sldMk cId="3120669869" sldId="259"/>
-            <ac:picMk id="1026" creationId="{F428D0F0-3703-4406-9A71-241FC9B71487}"/>
-          </ac:picMkLst>
-        </pc:picChg>
-        <pc:cxnChg chg="mod">
-          <ac:chgData name="Bart Delanghe" userId="956f3f6c82133ec8" providerId="LiveId" clId="{099E1954-559E-4CA5-A258-E555D91FCE49}" dt="2021-04-19T06:54:35.985" v="539" actId="1038"/>
-          <ac:cxnSpMkLst>
-            <pc:docMk/>
-            <pc:sldMk cId="3120669869" sldId="259"/>
-            <ac:cxnSpMk id="3" creationId="{BCF98339-EA55-4C18-A8BC-6F177E286190}"/>
-          </ac:cxnSpMkLst>
-        </pc:cxnChg>
-        <pc:cxnChg chg="mod">
-          <ac:chgData name="Bart Delanghe" userId="956f3f6c82133ec8" providerId="LiveId" clId="{099E1954-559E-4CA5-A258-E555D91FCE49}" dt="2021-04-19T06:54:35.985" v="539" actId="1038"/>
-          <ac:cxnSpMkLst>
-            <pc:docMk/>
-            <pc:sldMk cId="3120669869" sldId="259"/>
-            <ac:cxnSpMk id="16" creationId="{FA04385A-A26E-4C8E-867B-F155FF40C59D}"/>
-          </ac:cxnSpMkLst>
-        </pc:cxnChg>
-        <pc:cxnChg chg="mod">
-          <ac:chgData name="Bart Delanghe" userId="956f3f6c82133ec8" providerId="LiveId" clId="{099E1954-559E-4CA5-A258-E555D91FCE49}" dt="2021-04-19T06:54:35.985" v="539" actId="1038"/>
-          <ac:cxnSpMkLst>
-            <pc:docMk/>
-            <pc:sldMk cId="3120669869" sldId="259"/>
-            <ac:cxnSpMk id="21" creationId="{F98A8B49-20B0-449A-B055-21FD9BED5009}"/>
-          </ac:cxnSpMkLst>
-        </pc:cxnChg>
-        <pc:cxnChg chg="mod">
-          <ac:chgData name="Bart Delanghe" userId="956f3f6c82133ec8" providerId="LiveId" clId="{099E1954-559E-4CA5-A258-E555D91FCE49}" dt="2021-04-19T06:54:35.985" v="539" actId="1038"/>
-          <ac:cxnSpMkLst>
-            <pc:docMk/>
-            <pc:sldMk cId="3120669869" sldId="259"/>
-            <ac:cxnSpMk id="23" creationId="{3D611F36-D6AC-49EC-8CAC-4B6BA448A953}"/>
-          </ac:cxnSpMkLst>
-        </pc:cxnChg>
-        <pc:cxnChg chg="mod">
-          <ac:chgData name="Bart Delanghe" userId="956f3f6c82133ec8" providerId="LiveId" clId="{099E1954-559E-4CA5-A258-E555D91FCE49}" dt="2021-04-19T06:54:35.985" v="539" actId="1038"/>
-          <ac:cxnSpMkLst>
-            <pc:docMk/>
-            <pc:sldMk cId="3120669869" sldId="259"/>
-            <ac:cxnSpMk id="25" creationId="{B2649238-C306-4DDF-8E5D-6C533EACEFA5}"/>
-          </ac:cxnSpMkLst>
-        </pc:cxnChg>
-        <pc:cxnChg chg="mod">
-          <ac:chgData name="Bart Delanghe" userId="956f3f6c82133ec8" providerId="LiveId" clId="{099E1954-559E-4CA5-A258-E555D91FCE49}" dt="2021-04-19T06:54:35.985" v="539" actId="1038"/>
-          <ac:cxnSpMkLst>
-            <pc:docMk/>
-            <pc:sldMk cId="3120669869" sldId="259"/>
-            <ac:cxnSpMk id="26" creationId="{DEBA1AEB-0DCE-4BA5-83B0-3D14676E7489}"/>
-          </ac:cxnSpMkLst>
-        </pc:cxnChg>
-        <pc:cxnChg chg="mod">
-          <ac:chgData name="Bart Delanghe" userId="956f3f6c82133ec8" providerId="LiveId" clId="{099E1954-559E-4CA5-A258-E555D91FCE49}" dt="2021-04-19T06:54:35.985" v="539" actId="1038"/>
-          <ac:cxnSpMkLst>
-            <pc:docMk/>
-            <pc:sldMk cId="3120669869" sldId="259"/>
-            <ac:cxnSpMk id="30" creationId="{FBA3B752-6A3A-451E-9F70-171C3ED0BC35}"/>
-          </ac:cxnSpMkLst>
-        </pc:cxnChg>
-      </pc:sldChg>
-      <pc:sldChg chg="modSp new mod">
-        <pc:chgData name="Bart Delanghe" userId="956f3f6c82133ec8" providerId="LiveId" clId="{099E1954-559E-4CA5-A258-E555D91FCE49}" dt="2021-04-18T08:09:46.763" v="385"/>
-        <pc:sldMkLst>
-          <pc:docMk/>
-          <pc:sldMk cId="2715703261" sldId="260"/>
-        </pc:sldMkLst>
-        <pc:spChg chg="mod">
-          <ac:chgData name="Bart Delanghe" userId="956f3f6c82133ec8" providerId="LiveId" clId="{099E1954-559E-4CA5-A258-E555D91FCE49}" dt="2021-04-18T08:09:46.763" v="385"/>
-          <ac:spMkLst>
-            <pc:docMk/>
-            <pc:sldMk cId="2715703261" sldId="260"/>
-            <ac:spMk id="2" creationId="{9690280F-D48C-4DA7-83CA-262070D5AD0D}"/>
-          </ac:spMkLst>
-        </pc:spChg>
-        <pc:spChg chg="mod">
-          <ac:chgData name="Bart Delanghe" userId="956f3f6c82133ec8" providerId="LiveId" clId="{099E1954-559E-4CA5-A258-E555D91FCE49}" dt="2021-04-18T08:09:46.763" v="385"/>
-          <ac:spMkLst>
-            <pc:docMk/>
-            <pc:sldMk cId="2715703261" sldId="260"/>
-            <ac:spMk id="3" creationId="{F5647B87-B4C6-4254-A96D-80157A201A81}"/>
-          </ac:spMkLst>
-        </pc:spChg>
-      </pc:sldChg>
-      <pc:sldChg chg="addSp delSp modSp new mod modShow">
-        <pc:chgData name="Bart Delanghe" userId="956f3f6c82133ec8" providerId="LiveId" clId="{099E1954-559E-4CA5-A258-E555D91FCE49}" dt="2021-04-19T13:38:26.977" v="572" actId="729"/>
-        <pc:sldMkLst>
-          <pc:docMk/>
-          <pc:sldMk cId="566810426" sldId="261"/>
-        </pc:sldMkLst>
-        <pc:spChg chg="del">
-          <ac:chgData name="Bart Delanghe" userId="956f3f6c82133ec8" providerId="LiveId" clId="{099E1954-559E-4CA5-A258-E555D91FCE49}" dt="2021-04-19T13:32:33.072" v="550" actId="22"/>
-          <ac:spMkLst>
-            <pc:docMk/>
-            <pc:sldMk cId="566810426" sldId="261"/>
-            <ac:spMk id="3" creationId="{E01F6B3C-C90C-44B8-B849-33D833417FA4}"/>
-          </ac:spMkLst>
-        </pc:spChg>
-        <pc:spChg chg="add mod">
-          <ac:chgData name="Bart Delanghe" userId="956f3f6c82133ec8" providerId="LiveId" clId="{099E1954-559E-4CA5-A258-E555D91FCE49}" dt="2021-04-19T13:33:40.442" v="561" actId="1582"/>
-          <ac:spMkLst>
-            <pc:docMk/>
-            <pc:sldMk cId="566810426" sldId="261"/>
-            <ac:spMk id="6" creationId="{6C29472B-90F4-46DC-8A01-1ACB415B4A38}"/>
-          </ac:spMkLst>
-        </pc:spChg>
-        <pc:picChg chg="add mod ord">
-          <ac:chgData name="Bart Delanghe" userId="956f3f6c82133ec8" providerId="LiveId" clId="{099E1954-559E-4CA5-A258-E555D91FCE49}" dt="2021-04-19T13:32:39.889" v="553" actId="1076"/>
-          <ac:picMkLst>
-            <pc:docMk/>
-            <pc:sldMk cId="566810426" sldId="261"/>
-            <ac:picMk id="5" creationId="{A5FD809B-EE93-41E0-85A4-CB2BD7BE3FC5}"/>
-          </ac:picMkLst>
-        </pc:picChg>
-      </pc:sldChg>
-      <pc:sldChg chg="addSp delSp modSp add mod modShow">
-        <pc:chgData name="Bart Delanghe" userId="956f3f6c82133ec8" providerId="LiveId" clId="{099E1954-559E-4CA5-A258-E555D91FCE49}" dt="2021-04-19T13:38:28.634" v="573" actId="729"/>
-        <pc:sldMkLst>
-          <pc:docMk/>
-          <pc:sldMk cId="37632715" sldId="262"/>
-        </pc:sldMkLst>
-        <pc:spChg chg="add del mod">
-          <ac:chgData name="Bart Delanghe" userId="956f3f6c82133ec8" providerId="LiveId" clId="{099E1954-559E-4CA5-A258-E555D91FCE49}" dt="2021-04-19T13:34:21.254" v="571" actId="478"/>
-          <ac:spMkLst>
-            <pc:docMk/>
-            <pc:sldMk cId="37632715" sldId="262"/>
-            <ac:spMk id="3" creationId="{DE8A9355-49CF-47ED-912B-109C9F42F64D}"/>
-          </ac:spMkLst>
-        </pc:spChg>
-        <pc:spChg chg="mod">
-          <ac:chgData name="Bart Delanghe" userId="956f3f6c82133ec8" providerId="LiveId" clId="{099E1954-559E-4CA5-A258-E555D91FCE49}" dt="2021-04-19T13:33:57.450" v="564" actId="1076"/>
-          <ac:spMkLst>
-            <pc:docMk/>
-            <pc:sldMk cId="37632715" sldId="262"/>
-            <ac:spMk id="6" creationId="{6C29472B-90F4-46DC-8A01-1ACB415B4A38}"/>
-          </ac:spMkLst>
-        </pc:spChg>
-      </pc:sldChg>
-      <pc:sldChg chg="add del">
-        <pc:chgData name="Bart Delanghe" userId="956f3f6c82133ec8" providerId="LiveId" clId="{099E1954-559E-4CA5-A258-E555D91FCE49}" dt="2021-04-19T13:33:48.079" v="562" actId="47"/>
-        <pc:sldMkLst>
-          <pc:docMk/>
-          <pc:sldMk cId="2308775273" sldId="262"/>
-        </pc:sldMkLst>
-      </pc:sldChg>
-      <pc:sldChg chg="delSp add mod modShow">
-        <pc:chgData name="Bart Delanghe" userId="956f3f6c82133ec8" providerId="LiveId" clId="{099E1954-559E-4CA5-A258-E555D91FCE49}" dt="2021-04-19T13:38:32.561" v="574" actId="729"/>
-        <pc:sldMkLst>
-          <pc:docMk/>
-          <pc:sldMk cId="296623923" sldId="263"/>
-        </pc:sldMkLst>
-        <pc:spChg chg="del">
-          <ac:chgData name="Bart Delanghe" userId="956f3f6c82133ec8" providerId="LiveId" clId="{099E1954-559E-4CA5-A258-E555D91FCE49}" dt="2021-04-19T13:34:16.716" v="570" actId="478"/>
-          <ac:spMkLst>
-            <pc:docMk/>
-            <pc:sldMk cId="296623923" sldId="263"/>
-            <ac:spMk id="6" creationId="{6C29472B-90F4-46DC-8A01-1ACB415B4A38}"/>
-          </ac:spMkLst>
-        </pc:spChg>
       </pc:sldChg>
     </pc:docChg>
   </pc:docChgLst>
@@ -1445,13 +911,20 @@
         <a:lstStyle/>
         <a:p>
           <a:pPr>
+            <a:lnSpc>
+              <a:spcPct val="100000"/>
+            </a:lnSpc>
             <a:defRPr b="1"/>
           </a:pPr>
           <a:r>
-            <a:rPr lang="en-BE"/>
-            <a:t>Pre-Installed</a:t>
+            <a:rPr lang="en-BE" dirty="0"/>
+            <a:t>S4HANA/</a:t>
           </a:r>
-          <a:endParaRPr lang="en-US"/>
+          <a:r>
+            <a:rPr lang="en-BE" dirty="0" err="1"/>
+            <a:t>CosmosDB</a:t>
+          </a:r>
+          <a:endParaRPr lang="en-US" dirty="0"/>
         </a:p>
       </dgm:t>
     </dgm:pt>
@@ -1484,11 +957,24 @@
         <a:bodyPr/>
         <a:lstStyle/>
         <a:p>
+          <a:pPr>
+            <a:lnSpc>
+              <a:spcPct val="100000"/>
+            </a:lnSpc>
+          </a:pPr>
+          <a:endParaRPr lang="en-BE" dirty="0"/>
+        </a:p>
+        <a:p>
+          <a:pPr>
+            <a:lnSpc>
+              <a:spcPct val="100000"/>
+            </a:lnSpc>
+          </a:pPr>
           <a:r>
-            <a:rPr lang="en-BE"/>
-            <a:t>SAP S4Hana installed</a:t>
+            <a:rPr lang="en-BE" b="1" i="1" dirty="0"/>
+            <a:t>Option 2 : Own Subscription</a:t>
           </a:r>
-          <a:endParaRPr lang="en-US"/>
+          <a:endParaRPr lang="en-US" b="1" i="1" dirty="0"/>
         </a:p>
       </dgm:t>
     </dgm:pt>
@@ -1514,43 +1000,6 @@
         </a:p>
       </dgm:t>
     </dgm:pt>
-    <dgm:pt modelId="{76BB1FD7-68C3-40C4-9543-76EC3351A4D0}">
-      <dgm:prSet/>
-      <dgm:spPr/>
-      <dgm:t>
-        <a:bodyPr/>
-        <a:lstStyle/>
-        <a:p>
-          <a:r>
-            <a:rPr lang="en-BE"/>
-            <a:t>Cosmos DB deployed</a:t>
-          </a:r>
-          <a:endParaRPr lang="en-US"/>
-        </a:p>
-      </dgm:t>
-    </dgm:pt>
-    <dgm:pt modelId="{B0C32E88-CDBB-44C4-8EC9-37EB162AFE04}" type="parTrans" cxnId="{D7DE1E02-07EA-4211-984C-3DC89B78CE2D}">
-      <dgm:prSet/>
-      <dgm:spPr/>
-      <dgm:t>
-        <a:bodyPr/>
-        <a:lstStyle/>
-        <a:p>
-          <a:endParaRPr lang="en-US"/>
-        </a:p>
-      </dgm:t>
-    </dgm:pt>
-    <dgm:pt modelId="{DE53D4EF-D273-4AFB-B961-AA897AE03833}" type="sibTrans" cxnId="{D7DE1E02-07EA-4211-984C-3DC89B78CE2D}">
-      <dgm:prSet/>
-      <dgm:spPr/>
-      <dgm:t>
-        <a:bodyPr/>
-        <a:lstStyle/>
-        <a:p>
-          <a:endParaRPr lang="en-US"/>
-        </a:p>
-      </dgm:t>
-    </dgm:pt>
     <dgm:pt modelId="{D6C3953A-1DCB-457B-8BCF-9795277DFBD2}">
       <dgm:prSet/>
       <dgm:spPr/>
@@ -1559,13 +1008,16 @@
         <a:lstStyle/>
         <a:p>
           <a:pPr>
+            <a:lnSpc>
+              <a:spcPct val="100000"/>
+            </a:lnSpc>
             <a:defRPr b="1"/>
           </a:pPr>
           <a:r>
-            <a:rPr lang="en-BE"/>
-            <a:t>Your Subscription</a:t>
+            <a:rPr lang="en-BE" dirty="0"/>
+            <a:t>Synapse, Azure ML, ...</a:t>
           </a:r>
-          <a:endParaRPr lang="en-US"/>
+          <a:endParaRPr lang="en-US" dirty="0"/>
         </a:p>
       </dgm:t>
     </dgm:pt>
@@ -1598,11 +1050,16 @@
         <a:bodyPr/>
         <a:lstStyle/>
         <a:p>
+          <a:pPr>
+            <a:lnSpc>
+              <a:spcPct val="100000"/>
+            </a:lnSpc>
+          </a:pPr>
           <a:r>
-            <a:rPr lang="en-BE"/>
-            <a:t>VM for ADF Runtime and SAP .Net Connector</a:t>
+            <a:rPr lang="en-BE" b="1" i="1" dirty="0"/>
+            <a:t>Own Subscription</a:t>
           </a:r>
-          <a:endParaRPr lang="en-US"/>
+          <a:endParaRPr lang="en-US" b="1" i="1" dirty="0"/>
         </a:p>
       </dgm:t>
     </dgm:pt>
@@ -1636,10 +1093,10 @@
         <a:lstStyle/>
         <a:p>
           <a:r>
-            <a:rPr lang="en-BE"/>
-            <a:t>Synapse</a:t>
+            <a:rPr lang="en-BE" dirty="0"/>
+            <a:t>Synapse Workspace</a:t>
           </a:r>
-          <a:endParaRPr lang="en-US"/>
+          <a:endParaRPr lang="en-US" dirty="0"/>
         </a:p>
       </dgm:t>
     </dgm:pt>
@@ -1673,10 +1130,10 @@
         <a:lstStyle/>
         <a:p>
           <a:r>
-            <a:rPr lang="en-BE"/>
+            <a:rPr lang="en-BE" dirty="0"/>
             <a:t>Azure ML</a:t>
           </a:r>
-          <a:endParaRPr lang="en-US"/>
+          <a:endParaRPr lang="en-US" dirty="0"/>
         </a:p>
       </dgm:t>
     </dgm:pt>
@@ -1710,10 +1167,10 @@
         <a:lstStyle/>
         <a:p>
           <a:r>
-            <a:rPr lang="en-BE"/>
-            <a:t>Deployment via Terraform</a:t>
+            <a:rPr lang="en-BE" dirty="0"/>
+            <a:t>Deployment using Terraform</a:t>
           </a:r>
-          <a:endParaRPr lang="en-US"/>
+          <a:endParaRPr lang="en-US" dirty="0"/>
         </a:p>
       </dgm:t>
     </dgm:pt>
@@ -1747,6 +1204,9 @@
         <a:lstStyle/>
         <a:p>
           <a:pPr>
+            <a:lnSpc>
+              <a:spcPct val="100000"/>
+            </a:lnSpc>
             <a:defRPr b="1"/>
           </a:pPr>
           <a:r>
@@ -1786,11 +1246,20 @@
         <a:bodyPr/>
         <a:lstStyle/>
         <a:p>
+          <a:pPr>
+            <a:lnSpc>
+              <a:spcPct val="100000"/>
+            </a:lnSpc>
+          </a:pPr>
           <a:r>
-            <a:rPr lang="en-BE"/>
-            <a:t>PowerBi Desktop</a:t>
+            <a:rPr lang="en-BE" dirty="0" err="1"/>
+            <a:t>PowerBI</a:t>
           </a:r>
-          <a:endParaRPr lang="en-US"/>
+          <a:r>
+            <a:rPr lang="en-BE" dirty="0"/>
+            <a:t> Desktop</a:t>
+          </a:r>
+          <a:endParaRPr lang="en-US" dirty="0"/>
         </a:p>
       </dgm:t>
     </dgm:pt>
@@ -1823,11 +1292,16 @@
         <a:bodyPr/>
         <a:lstStyle/>
         <a:p>
+          <a:pPr>
+            <a:lnSpc>
+              <a:spcPct val="100000"/>
+            </a:lnSpc>
+          </a:pPr>
           <a:r>
-            <a:rPr lang="en-BE"/>
+            <a:rPr lang="en-BE" dirty="0"/>
             <a:t>Azure Storage Explorer</a:t>
           </a:r>
-          <a:endParaRPr lang="en-US"/>
+          <a:endParaRPr lang="en-US" dirty="0"/>
         </a:p>
       </dgm:t>
     </dgm:pt>
@@ -1860,11 +1334,16 @@
         <a:bodyPr/>
         <a:lstStyle/>
         <a:p>
+          <a:pPr>
+            <a:lnSpc>
+              <a:spcPct val="100000"/>
+            </a:lnSpc>
+          </a:pPr>
           <a:r>
-            <a:rPr lang="en-BE"/>
+            <a:rPr lang="en-BE" dirty="0"/>
             <a:t>Azure Data Studio [Optional]</a:t>
           </a:r>
-          <a:endParaRPr lang="en-US"/>
+          <a:endParaRPr lang="en-US" dirty="0"/>
         </a:p>
       </dgm:t>
     </dgm:pt>
@@ -1887,6 +1366,249 @@
         <a:lstStyle/>
         <a:p>
           <a:endParaRPr lang="en-US"/>
+        </a:p>
+      </dgm:t>
+    </dgm:pt>
+    <dgm:pt modelId="{9B571614-7D68-4B28-9A2E-1147F269617A}">
+      <dgm:prSet/>
+      <dgm:spPr/>
+      <dgm:t>
+        <a:bodyPr/>
+        <a:lstStyle/>
+        <a:p>
+          <a:pPr>
+            <a:lnSpc>
+              <a:spcPct val="100000"/>
+            </a:lnSpc>
+          </a:pPr>
+          <a:r>
+            <a:rPr lang="en-BE" b="1" i="1" dirty="0"/>
+            <a:t>Option1 : Pre-Installed</a:t>
+          </a:r>
+          <a:endParaRPr lang="en-US" b="1" i="1" dirty="0"/>
+        </a:p>
+      </dgm:t>
+    </dgm:pt>
+    <dgm:pt modelId="{13C65017-A721-456D-86DF-037533122979}" type="parTrans" cxnId="{8862072C-D945-4C32-A590-9E43ADEF92FA}">
+      <dgm:prSet/>
+      <dgm:spPr/>
+      <dgm:t>
+        <a:bodyPr/>
+        <a:lstStyle/>
+        <a:p>
+          <a:endParaRPr lang="en-BE"/>
+        </a:p>
+      </dgm:t>
+    </dgm:pt>
+    <dgm:pt modelId="{BEA60C4C-075B-4C30-9E09-D98EE33686D6}" type="sibTrans" cxnId="{8862072C-D945-4C32-A590-9E43ADEF92FA}">
+      <dgm:prSet/>
+      <dgm:spPr/>
+      <dgm:t>
+        <a:bodyPr/>
+        <a:lstStyle/>
+        <a:p>
+          <a:endParaRPr lang="en-BE"/>
+        </a:p>
+      </dgm:t>
+    </dgm:pt>
+    <dgm:pt modelId="{66BFCE93-2B6A-4E9C-B5A1-134B27044516}">
+      <dgm:prSet/>
+      <dgm:spPr/>
+      <dgm:t>
+        <a:bodyPr/>
+        <a:lstStyle/>
+        <a:p>
+          <a:r>
+            <a:rPr lang="en-BE" dirty="0"/>
+            <a:t>S4HANA -SAP CAL deployment</a:t>
+          </a:r>
+          <a:endParaRPr lang="en-US" dirty="0"/>
+        </a:p>
+      </dgm:t>
+    </dgm:pt>
+    <dgm:pt modelId="{7265CA7A-5CCE-4DEB-8B2B-8961DA5BF79B}" type="parTrans" cxnId="{701FC0A3-B135-43EB-A57E-E8231C1FF0CC}">
+      <dgm:prSet/>
+      <dgm:spPr/>
+      <dgm:t>
+        <a:bodyPr/>
+        <a:lstStyle/>
+        <a:p>
+          <a:endParaRPr lang="en-BE"/>
+        </a:p>
+      </dgm:t>
+    </dgm:pt>
+    <dgm:pt modelId="{C0B3EB61-053B-4277-874D-DDA0CCAB6E43}" type="sibTrans" cxnId="{701FC0A3-B135-43EB-A57E-E8231C1FF0CC}">
+      <dgm:prSet/>
+      <dgm:spPr/>
+      <dgm:t>
+        <a:bodyPr/>
+        <a:lstStyle/>
+        <a:p>
+          <a:endParaRPr lang="en-BE"/>
+        </a:p>
+      </dgm:t>
+    </dgm:pt>
+    <dgm:pt modelId="{F2B3F7F4-232D-4F57-B072-CEA6174D87A0}">
+      <dgm:prSet/>
+      <dgm:spPr/>
+      <dgm:t>
+        <a:bodyPr/>
+        <a:lstStyle/>
+        <a:p>
+          <a:r>
+            <a:rPr lang="en-BE" dirty="0" err="1"/>
+            <a:t>CosmosDB</a:t>
+          </a:r>
+          <a:r>
+            <a:rPr lang="en-BE" dirty="0"/>
+            <a:t> - deployment using Terraform</a:t>
+          </a:r>
+          <a:endParaRPr lang="en-US" dirty="0"/>
+        </a:p>
+      </dgm:t>
+    </dgm:pt>
+    <dgm:pt modelId="{8799731B-4D6C-422A-82BD-D86CA3AE8D0C}" type="parTrans" cxnId="{7F3D3D75-615B-4D54-AEB2-F9F89B3EFC87}">
+      <dgm:prSet/>
+      <dgm:spPr/>
+      <dgm:t>
+        <a:bodyPr/>
+        <a:lstStyle/>
+        <a:p>
+          <a:endParaRPr lang="en-BE"/>
+        </a:p>
+      </dgm:t>
+    </dgm:pt>
+    <dgm:pt modelId="{F8CCCD78-7106-4663-8315-EE37EE9BE249}" type="sibTrans" cxnId="{7F3D3D75-615B-4D54-AEB2-F9F89B3EFC87}">
+      <dgm:prSet/>
+      <dgm:spPr/>
+      <dgm:t>
+        <a:bodyPr/>
+        <a:lstStyle/>
+        <a:p>
+          <a:endParaRPr lang="en-BE"/>
+        </a:p>
+      </dgm:t>
+    </dgm:pt>
+    <dgm:pt modelId="{7BF0E8CC-F085-4530-BC0B-622034216352}">
+      <dgm:prSet/>
+      <dgm:spPr/>
+      <dgm:t>
+        <a:bodyPr/>
+        <a:lstStyle/>
+        <a:p>
+          <a:r>
+            <a:rPr lang="en-BE" dirty="0"/>
+            <a:t>Connection details on request</a:t>
+          </a:r>
+          <a:endParaRPr lang="en-US" dirty="0"/>
+        </a:p>
+      </dgm:t>
+    </dgm:pt>
+    <dgm:pt modelId="{A7AACC53-604F-47EC-BF60-EC9EA6124FB6}" type="parTrans" cxnId="{FF80C73F-1E78-470D-934C-F3C5EC19ED6D}">
+      <dgm:prSet/>
+      <dgm:spPr/>
+      <dgm:t>
+        <a:bodyPr/>
+        <a:lstStyle/>
+        <a:p>
+          <a:endParaRPr lang="en-BE"/>
+        </a:p>
+      </dgm:t>
+    </dgm:pt>
+    <dgm:pt modelId="{F0F385B5-2F28-4D3F-99AE-10E1B5384DE0}" type="sibTrans" cxnId="{FF80C73F-1E78-470D-934C-F3C5EC19ED6D}">
+      <dgm:prSet/>
+      <dgm:spPr/>
+      <dgm:t>
+        <a:bodyPr/>
+        <a:lstStyle/>
+        <a:p>
+          <a:endParaRPr lang="en-BE"/>
+        </a:p>
+      </dgm:t>
+    </dgm:pt>
+    <dgm:pt modelId="{04B4225B-E069-4108-BF9E-EB04A733BF3D}">
+      <dgm:prSet/>
+      <dgm:spPr/>
+      <dgm:t>
+        <a:bodyPr/>
+        <a:lstStyle/>
+        <a:p>
+          <a:r>
+            <a:rPr lang="en-BE" dirty="0"/>
+            <a:t>Payment Generation &amp; upload to </a:t>
+          </a:r>
+          <a:r>
+            <a:rPr lang="en-BE" dirty="0" err="1"/>
+            <a:t>CosmosDB</a:t>
+          </a:r>
+          <a:endParaRPr lang="en-US" dirty="0"/>
+        </a:p>
+      </dgm:t>
+    </dgm:pt>
+    <dgm:pt modelId="{F51A2569-51D2-4963-A88E-4F30E58248A0}" type="parTrans" cxnId="{38BFD6C6-0C72-436C-89A4-A490DFF075C6}">
+      <dgm:prSet/>
+      <dgm:spPr/>
+      <dgm:t>
+        <a:bodyPr/>
+        <a:lstStyle/>
+        <a:p>
+          <a:endParaRPr lang="en-BE"/>
+        </a:p>
+      </dgm:t>
+    </dgm:pt>
+    <dgm:pt modelId="{F3FFA884-9E34-48EA-B6D4-860244D6C347}" type="sibTrans" cxnId="{38BFD6C6-0C72-436C-89A4-A490DFF075C6}">
+      <dgm:prSet/>
+      <dgm:spPr/>
+      <dgm:t>
+        <a:bodyPr/>
+        <a:lstStyle/>
+        <a:p>
+          <a:endParaRPr lang="en-BE"/>
+        </a:p>
+      </dgm:t>
+    </dgm:pt>
+    <dgm:pt modelId="{E581B580-090B-4772-84AF-8DB4E9D7F9C1}">
+      <dgm:prSet/>
+      <dgm:spPr/>
+      <dgm:t>
+        <a:bodyPr/>
+        <a:lstStyle/>
+        <a:p>
+          <a:r>
+            <a:rPr lang="en-BE" dirty="0"/>
+            <a:t>VM for Integration Runtime and SAP </a:t>
+          </a:r>
+          <a:r>
+            <a:rPr lang="en-BE" dirty="0" err="1"/>
+            <a:t>.Net</a:t>
+          </a:r>
+          <a:r>
+            <a:rPr lang="en-BE" dirty="0"/>
+            <a:t> Connector</a:t>
+          </a:r>
+          <a:endParaRPr lang="en-US" dirty="0"/>
+        </a:p>
+      </dgm:t>
+    </dgm:pt>
+    <dgm:pt modelId="{353A629C-0E70-4B24-9E07-27FC1F7AA199}" type="parTrans" cxnId="{D5823E8D-0D6E-43D0-9C61-14EB2FB47170}">
+      <dgm:prSet/>
+      <dgm:spPr/>
+      <dgm:t>
+        <a:bodyPr/>
+        <a:lstStyle/>
+        <a:p>
+          <a:endParaRPr lang="en-BE"/>
+        </a:p>
+      </dgm:t>
+    </dgm:pt>
+    <dgm:pt modelId="{89EDF47B-47AA-4999-A6B6-DC4270F481AC}" type="sibTrans" cxnId="{D5823E8D-0D6E-43D0-9C61-14EB2FB47170}">
+      <dgm:prSet/>
+      <dgm:spPr/>
+      <dgm:t>
+        <a:bodyPr/>
+        <a:lstStyle/>
+        <a:p>
+          <a:endParaRPr lang="en-BE"/>
         </a:p>
       </dgm:t>
     </dgm:pt>
@@ -2008,7 +1730,7 @@
       <dgm:spPr/>
     </dgm:pt>
     <dgm:pt modelId="{6B1AB5AF-609F-4791-90A6-52781A362FCE}" type="pres">
-      <dgm:prSet presAssocID="{D6C3953A-1DCB-457B-8BCF-9795277DFBD2}" presName="desTx" presStyleLbl="revTx" presStyleIdx="3" presStyleCnt="6">
+      <dgm:prSet presAssocID="{D6C3953A-1DCB-457B-8BCF-9795277DFBD2}" presName="desTx" presStyleLbl="revTx" presStyleIdx="3" presStyleCnt="6" custLinFactNeighborX="73" custLinFactNeighborY="-895">
         <dgm:presLayoutVars/>
       </dgm:prSet>
       <dgm:spPr/>
@@ -2067,58 +1789,68 @@
       <dgm:spPr/>
     </dgm:pt>
     <dgm:pt modelId="{AA2F476E-B46E-4EA2-9DB6-9F07658585DF}" type="pres">
-      <dgm:prSet presAssocID="{662A27ED-0A5B-4F50-B92D-E1716143FFC7}" presName="desTx" presStyleLbl="revTx" presStyleIdx="5" presStyleCnt="6">
+      <dgm:prSet presAssocID="{662A27ED-0A5B-4F50-B92D-E1716143FFC7}" presName="desTx" presStyleLbl="revTx" presStyleIdx="5" presStyleCnt="6" custLinFactNeighborX="421" custLinFactNeighborY="4626">
         <dgm:presLayoutVars/>
       </dgm:prSet>
       <dgm:spPr/>
     </dgm:pt>
   </dgm:ptLst>
   <dgm:cxnLst>
-    <dgm:cxn modelId="{D7DE1E02-07EA-4211-984C-3DC89B78CE2D}" srcId="{76B79C84-FBCC-4CFD-8C21-03343CAB73F3}" destId="{76BB1FD7-68C3-40C4-9543-76EC3351A4D0}" srcOrd="1" destOrd="0" parTransId="{B0C32E88-CDBB-44C4-8EC9-37EB162AFE04}" sibTransId="{DE53D4EF-D273-4AFB-B961-AA897AE03833}"/>
-    <dgm:cxn modelId="{7A57BE09-5E08-46E3-94E2-F2AD2C2D17A4}" type="presOf" srcId="{76BB1FD7-68C3-40C4-9543-76EC3351A4D0}" destId="{027E07CE-20CB-43D2-B627-A4C6E3DEE763}" srcOrd="0" destOrd="1" presId="urn:microsoft.com/office/officeart/2018/2/layout/IconLabelDescriptionList"/>
-    <dgm:cxn modelId="{385C020D-B613-4557-91CB-F78DC093AAB3}" type="presOf" srcId="{ED9788C6-28F2-4B2C-892A-B7E575CD6ECF}" destId="{027E07CE-20CB-43D2-B627-A4C6E3DEE763}" srcOrd="0" destOrd="0" presId="urn:microsoft.com/office/officeart/2018/2/layout/IconLabelDescriptionList"/>
-    <dgm:cxn modelId="{672D480E-0E54-4DD7-9507-9AE502429914}" type="presOf" srcId="{E0E5773F-2ACA-472C-BFE1-2546D505CFD7}" destId="{AA2F476E-B46E-4EA2-9DB6-9F07658585DF}" srcOrd="0" destOrd="0" presId="urn:microsoft.com/office/officeart/2018/2/layout/IconLabelDescriptionList"/>
+    <dgm:cxn modelId="{1EA1340A-10D9-4F76-BBAF-443B1FF54065}" type="presOf" srcId="{F2B3F7F4-232D-4F57-B072-CEA6174D87A0}" destId="{027E07CE-20CB-43D2-B627-A4C6E3DEE763}" srcOrd="0" destOrd="4" presId="urn:microsoft.com/office/officeart/2018/2/layout/IconLabelDescriptionList"/>
     <dgm:cxn modelId="{F6793610-EEE2-47EA-A903-3D9336F76B72}" srcId="{D6C3953A-1DCB-457B-8BCF-9795277DFBD2}" destId="{EB31B7B6-E843-4D91-BD59-CB4B4CECA10A}" srcOrd="0" destOrd="0" parTransId="{DE8C2615-C85C-4E55-BEE5-107DB244EF36}" sibTransId="{DD8E161E-4FA3-4436-9981-389ADA0BFBE3}"/>
-    <dgm:cxn modelId="{45A00B13-382D-4A07-B018-2F142D31886A}" type="presOf" srcId="{79CC0CFF-4852-431C-A3C5-1CA8CD94621C}" destId="{6B1AB5AF-609F-4791-90A6-52781A362FCE}" srcOrd="0" destOrd="3" presId="urn:microsoft.com/office/officeart/2018/2/layout/IconLabelDescriptionList"/>
-    <dgm:cxn modelId="{4DD09A1D-A3FF-4412-9FD7-579445B8D30C}" type="presOf" srcId="{F4286FE5-E129-4D40-9387-04098A84B8FD}" destId="{AA2F476E-B46E-4EA2-9DB6-9F07658585DF}" srcOrd="0" destOrd="1" presId="urn:microsoft.com/office/officeart/2018/2/layout/IconLabelDescriptionList"/>
-    <dgm:cxn modelId="{AAFEE224-6A6A-4522-8C39-571E4F2E2FE9}" srcId="{76B79C84-FBCC-4CFD-8C21-03343CAB73F3}" destId="{ED9788C6-28F2-4B2C-892A-B7E575CD6ECF}" srcOrd="0" destOrd="0" parTransId="{F0B26526-E3C4-4774-AADA-E5E505FA93A1}" sibTransId="{54DBA284-808A-4D94-B735-61D0BA420943}"/>
-    <dgm:cxn modelId="{1CC22D3B-FD33-4031-8BC4-D29159C4C56B}" srcId="{D6C3953A-1DCB-457B-8BCF-9795277DFBD2}" destId="{79CC0CFF-4852-431C-A3C5-1CA8CD94621C}" srcOrd="3" destOrd="0" parTransId="{37865F65-5987-4A54-A3B9-C7DE46251528}" sibTransId="{06ED1D33-1FD9-48C5-BA58-C180E81387E4}"/>
+    <dgm:cxn modelId="{1E37DE17-93BE-41A2-A3C3-E8DEED86918A}" type="presOf" srcId="{E581B580-090B-4772-84AF-8DB4E9D7F9C1}" destId="{6B1AB5AF-609F-4791-90A6-52781A362FCE}" srcOrd="0" destOrd="1" presId="urn:microsoft.com/office/officeart/2018/2/layout/IconLabelDescriptionList"/>
+    <dgm:cxn modelId="{FB0B5D19-3225-4FD6-BA2B-B63AF4F79491}" type="presOf" srcId="{79CC0CFF-4852-431C-A3C5-1CA8CD94621C}" destId="{6B1AB5AF-609F-4791-90A6-52781A362FCE}" srcOrd="0" destOrd="4" presId="urn:microsoft.com/office/officeart/2018/2/layout/IconLabelDescriptionList"/>
+    <dgm:cxn modelId="{9B9E281E-3ADC-4855-BFDA-C045A43CFDC4}" type="presOf" srcId="{9B571614-7D68-4B28-9A2E-1147F269617A}" destId="{027E07CE-20CB-43D2-B627-A4C6E3DEE763}" srcOrd="0" destOrd="0" presId="urn:microsoft.com/office/officeart/2018/2/layout/IconLabelDescriptionList"/>
+    <dgm:cxn modelId="{AAFEE224-6A6A-4522-8C39-571E4F2E2FE9}" srcId="{76B79C84-FBCC-4CFD-8C21-03343CAB73F3}" destId="{ED9788C6-28F2-4B2C-892A-B7E575CD6ECF}" srcOrd="1" destOrd="0" parTransId="{F0B26526-E3C4-4774-AADA-E5E505FA93A1}" sibTransId="{54DBA284-808A-4D94-B735-61D0BA420943}"/>
+    <dgm:cxn modelId="{BE2F8D29-A52F-45DF-A954-E8A91A5067CD}" type="presOf" srcId="{ED9788C6-28F2-4B2C-892A-B7E575CD6ECF}" destId="{027E07CE-20CB-43D2-B627-A4C6E3DEE763}" srcOrd="0" destOrd="2" presId="urn:microsoft.com/office/officeart/2018/2/layout/IconLabelDescriptionList"/>
+    <dgm:cxn modelId="{8862072C-D945-4C32-A590-9E43ADEF92FA}" srcId="{76B79C84-FBCC-4CFD-8C21-03343CAB73F3}" destId="{9B571614-7D68-4B28-9A2E-1147F269617A}" srcOrd="0" destOrd="0" parTransId="{13C65017-A721-456D-86DF-037533122979}" sibTransId="{BEA60C4C-075B-4C30-9E09-D98EE33686D6}"/>
+    <dgm:cxn modelId="{E6DB0835-7446-404B-9B87-A454D0AA1D89}" type="presOf" srcId="{66BFCE93-2B6A-4E9C-B5A1-134B27044516}" destId="{027E07CE-20CB-43D2-B627-A4C6E3DEE763}" srcOrd="0" destOrd="3" presId="urn:microsoft.com/office/officeart/2018/2/layout/IconLabelDescriptionList"/>
+    <dgm:cxn modelId="{1CC22D3B-FD33-4031-8BC4-D29159C4C56B}" srcId="{EB31B7B6-E843-4D91-BD59-CB4B4CECA10A}" destId="{79CC0CFF-4852-431C-A3C5-1CA8CD94621C}" srcOrd="3" destOrd="0" parTransId="{37865F65-5987-4A54-A3B9-C7DE46251528}" sibTransId="{06ED1D33-1FD9-48C5-BA58-C180E81387E4}"/>
+    <dgm:cxn modelId="{FF80C73F-1E78-470D-934C-F3C5EC19ED6D}" srcId="{9B571614-7D68-4B28-9A2E-1147F269617A}" destId="{7BF0E8CC-F085-4530-BC0B-622034216352}" srcOrd="0" destOrd="0" parTransId="{A7AACC53-604F-47EC-BF60-EC9EA6124FB6}" sibTransId="{F0F385B5-2F28-4D3F-99AE-10E1B5384DE0}"/>
     <dgm:cxn modelId="{8D8A1844-E1F8-4946-A888-CCE1946A3EB8}" type="presOf" srcId="{951A2093-8451-448B-AA7F-9032B0991BF8}" destId="{F70D8A9B-820A-47F4-AE49-962F0914C3A2}" srcOrd="0" destOrd="0" presId="urn:microsoft.com/office/officeart/2018/2/layout/IconLabelDescriptionList"/>
     <dgm:cxn modelId="{E7E36548-B764-4743-A4AE-7B1E1F97A818}" srcId="{662A27ED-0A5B-4F50-B92D-E1716143FFC7}" destId="{71DC36A4-3A76-4BDF-B531-F664282D0E2C}" srcOrd="2" destOrd="0" parTransId="{2535DA36-82A0-4B03-A6FA-7B2E743F4132}" sibTransId="{815A9930-355F-41C6-9036-17174806194E}"/>
-    <dgm:cxn modelId="{43011850-05C7-44D1-A201-B548569549D6}" type="presOf" srcId="{140277EC-AD2C-4528-B56F-9F5D9C053560}" destId="{6B1AB5AF-609F-4791-90A6-52781A362FCE}" srcOrd="0" destOrd="2" presId="urn:microsoft.com/office/officeart/2018/2/layout/IconLabelDescriptionList"/>
-    <dgm:cxn modelId="{16991387-3CA9-4781-84F4-046B8D3526D3}" srcId="{D6C3953A-1DCB-457B-8BCF-9795277DFBD2}" destId="{8A768285-DEBD-40AE-A9CF-308346B449EE}" srcOrd="1" destOrd="0" parTransId="{8D9065CF-28BA-4F3A-BE20-494C4A0F4C17}" sibTransId="{8F4C9BA4-2B40-4AA6-B8D3-9770EAE79A92}"/>
-    <dgm:cxn modelId="{07EFE288-14CF-4A12-BD1B-4006BEC60AF6}" type="presOf" srcId="{EB31B7B6-E843-4D91-BD59-CB4B4CECA10A}" destId="{6B1AB5AF-609F-4791-90A6-52781A362FCE}" srcOrd="0" destOrd="0" presId="urn:microsoft.com/office/officeart/2018/2/layout/IconLabelDescriptionList"/>
-    <dgm:cxn modelId="{28D79789-94D8-48D2-8825-51F05A43EB66}" srcId="{D6C3953A-1DCB-457B-8BCF-9795277DFBD2}" destId="{140277EC-AD2C-4528-B56F-9F5D9C053560}" srcOrd="2" destOrd="0" parTransId="{E3EF04FF-3D23-4E07-8F23-0D722DACA2F9}" sibTransId="{C0022F6A-C484-40B5-A9AA-BF8C30921D16}"/>
-    <dgm:cxn modelId="{5604338C-8872-46F2-9220-B0EC1008BC47}" type="presOf" srcId="{76B79C84-FBCC-4CFD-8C21-03343CAB73F3}" destId="{D10411E2-1031-4C84-9855-B4EA386133BC}" srcOrd="0" destOrd="0" presId="urn:microsoft.com/office/officeart/2018/2/layout/IconLabelDescriptionList"/>
-    <dgm:cxn modelId="{4EA2CC8D-0CCE-4454-B7ED-CCC056E2240F}" type="presOf" srcId="{8A768285-DEBD-40AE-A9CF-308346B449EE}" destId="{6B1AB5AF-609F-4791-90A6-52781A362FCE}" srcOrd="0" destOrd="1" presId="urn:microsoft.com/office/officeart/2018/2/layout/IconLabelDescriptionList"/>
-    <dgm:cxn modelId="{46D5FF90-BA4B-4ABB-9F30-504B41DE1133}" type="presOf" srcId="{71DC36A4-3A76-4BDF-B531-F664282D0E2C}" destId="{AA2F476E-B46E-4EA2-9DB6-9F07658585DF}" srcOrd="0" destOrd="2" presId="urn:microsoft.com/office/officeart/2018/2/layout/IconLabelDescriptionList"/>
+    <dgm:cxn modelId="{368F4E70-0D27-488C-AE16-7DC3B6177971}" type="presOf" srcId="{140277EC-AD2C-4528-B56F-9F5D9C053560}" destId="{6B1AB5AF-609F-4791-90A6-52781A362FCE}" srcOrd="0" destOrd="3" presId="urn:microsoft.com/office/officeart/2018/2/layout/IconLabelDescriptionList"/>
+    <dgm:cxn modelId="{5A16AF54-98B6-48C0-B32B-80E56AEB9739}" type="presOf" srcId="{662A27ED-0A5B-4F50-B92D-E1716143FFC7}" destId="{103BEB87-8C1D-4A21-9364-CD058028B6D4}" srcOrd="0" destOrd="0" presId="urn:microsoft.com/office/officeart/2018/2/layout/IconLabelDescriptionList"/>
+    <dgm:cxn modelId="{7F3D3D75-615B-4D54-AEB2-F9F89B3EFC87}" srcId="{ED9788C6-28F2-4B2C-892A-B7E575CD6ECF}" destId="{F2B3F7F4-232D-4F57-B072-CEA6174D87A0}" srcOrd="1" destOrd="0" parTransId="{8799731B-4D6C-422A-82BD-D86CA3AE8D0C}" sibTransId="{F8CCCD78-7106-4663-8315-EE37EE9BE249}"/>
+    <dgm:cxn modelId="{DBB84584-C3F3-4201-BB8E-B5982C524323}" type="presOf" srcId="{76B79C84-FBCC-4CFD-8C21-03343CAB73F3}" destId="{D10411E2-1031-4C84-9855-B4EA386133BC}" srcOrd="0" destOrd="0" presId="urn:microsoft.com/office/officeart/2018/2/layout/IconLabelDescriptionList"/>
+    <dgm:cxn modelId="{EBFC9D84-F990-4EC5-9424-5866E2495EC1}" type="presOf" srcId="{F4286FE5-E129-4D40-9387-04098A84B8FD}" destId="{AA2F476E-B46E-4EA2-9DB6-9F07658585DF}" srcOrd="0" destOrd="1" presId="urn:microsoft.com/office/officeart/2018/2/layout/IconLabelDescriptionList"/>
+    <dgm:cxn modelId="{16991387-3CA9-4781-84F4-046B8D3526D3}" srcId="{EB31B7B6-E843-4D91-BD59-CB4B4CECA10A}" destId="{8A768285-DEBD-40AE-A9CF-308346B449EE}" srcOrd="1" destOrd="0" parTransId="{8D9065CF-28BA-4F3A-BE20-494C4A0F4C17}" sibTransId="{8F4C9BA4-2B40-4AA6-B8D3-9770EAE79A92}"/>
+    <dgm:cxn modelId="{28D79789-94D8-48D2-8825-51F05A43EB66}" srcId="{EB31B7B6-E843-4D91-BD59-CB4B4CECA10A}" destId="{140277EC-AD2C-4528-B56F-9F5D9C053560}" srcOrd="2" destOrd="0" parTransId="{E3EF04FF-3D23-4E07-8F23-0D722DACA2F9}" sibTransId="{C0022F6A-C484-40B5-A9AA-BF8C30921D16}"/>
+    <dgm:cxn modelId="{D5823E8D-0D6E-43D0-9C61-14EB2FB47170}" srcId="{EB31B7B6-E843-4D91-BD59-CB4B4CECA10A}" destId="{E581B580-090B-4772-84AF-8DB4E9D7F9C1}" srcOrd="0" destOrd="0" parTransId="{353A629C-0E70-4B24-9E07-27FC1F7AA199}" sibTransId="{89EDF47B-47AA-4999-A6B6-DC4270F481AC}"/>
     <dgm:cxn modelId="{5A390692-9239-4DE8-BFBE-8A2500DA664F}" srcId="{951A2093-8451-448B-AA7F-9032B0991BF8}" destId="{662A27ED-0A5B-4F50-B92D-E1716143FFC7}" srcOrd="2" destOrd="0" parTransId="{315A2067-1BF6-440D-BFD2-FFE5AC6F2CA1}" sibTransId="{290D74C7-B9BD-45E7-BE6C-0D83E0434983}"/>
+    <dgm:cxn modelId="{FC0C7F92-446D-4183-B4EA-EC5ABE574211}" type="presOf" srcId="{D6C3953A-1DCB-457B-8BCF-9795277DFBD2}" destId="{D574FB6C-CF43-4D58-9D83-07C46FD22E37}" srcOrd="0" destOrd="0" presId="urn:microsoft.com/office/officeart/2018/2/layout/IconLabelDescriptionList"/>
     <dgm:cxn modelId="{46EE2093-D919-4C80-91C3-5B1C4E221C28}" srcId="{662A27ED-0A5B-4F50-B92D-E1716143FFC7}" destId="{E0E5773F-2ACA-472C-BFE1-2546D505CFD7}" srcOrd="0" destOrd="0" parTransId="{C12E88FD-0719-4D66-9785-DBC075DECE42}" sibTransId="{EA0DE095-2EC2-448B-B4B3-5F2575BDBEC8}"/>
-    <dgm:cxn modelId="{8AF67F94-432E-47DA-A98B-F0DC2BA7D204}" type="presOf" srcId="{662A27ED-0A5B-4F50-B92D-E1716143FFC7}" destId="{103BEB87-8C1D-4A21-9364-CD058028B6D4}" srcOrd="0" destOrd="0" presId="urn:microsoft.com/office/officeart/2018/2/layout/IconLabelDescriptionList"/>
+    <dgm:cxn modelId="{D790CF95-15BC-467F-A46D-7B5E94BEA84D}" type="presOf" srcId="{71DC36A4-3A76-4BDF-B531-F664282D0E2C}" destId="{AA2F476E-B46E-4EA2-9DB6-9F07658585DF}" srcOrd="0" destOrd="2" presId="urn:microsoft.com/office/officeart/2018/2/layout/IconLabelDescriptionList"/>
+    <dgm:cxn modelId="{701FC0A3-B135-43EB-A57E-E8231C1FF0CC}" srcId="{ED9788C6-28F2-4B2C-892A-B7E575CD6ECF}" destId="{66BFCE93-2B6A-4E9C-B5A1-134B27044516}" srcOrd="0" destOrd="0" parTransId="{7265CA7A-5CCE-4DEB-8B2B-8961DA5BF79B}" sibTransId="{C0B3EB61-053B-4277-874D-DDA0CCAB6E43}"/>
+    <dgm:cxn modelId="{80EAE3A4-DF94-43C0-BBD2-1D7151B35DF4}" type="presOf" srcId="{7BF0E8CC-F085-4530-BC0B-622034216352}" destId="{027E07CE-20CB-43D2-B627-A4C6E3DEE763}" srcOrd="0" destOrd="1" presId="urn:microsoft.com/office/officeart/2018/2/layout/IconLabelDescriptionList"/>
     <dgm:cxn modelId="{8F94A6A9-89FB-452B-AAA1-AB3065A4E155}" srcId="{951A2093-8451-448B-AA7F-9032B0991BF8}" destId="{D6C3953A-1DCB-457B-8BCF-9795277DFBD2}" srcOrd="1" destOrd="0" parTransId="{55632D81-BE6C-439E-BCB7-4CEE57A11B02}" sibTransId="{0CF3925A-5F94-4CE2-A193-A2E326F4AB20}"/>
-    <dgm:cxn modelId="{559B8DAB-A6EF-4CB5-BBB2-B6136E37A659}" type="presOf" srcId="{D6C3953A-1DCB-457B-8BCF-9795277DFBD2}" destId="{D574FB6C-CF43-4D58-9D83-07C46FD22E37}" srcOrd="0" destOrd="0" presId="urn:microsoft.com/office/officeart/2018/2/layout/IconLabelDescriptionList"/>
+    <dgm:cxn modelId="{D4DB91C0-4723-4B76-8189-B17BBA455EFB}" type="presOf" srcId="{EB31B7B6-E843-4D91-BD59-CB4B4CECA10A}" destId="{6B1AB5AF-609F-4791-90A6-52781A362FCE}" srcOrd="0" destOrd="0" presId="urn:microsoft.com/office/officeart/2018/2/layout/IconLabelDescriptionList"/>
+    <dgm:cxn modelId="{38BFD6C6-0C72-436C-89A4-A490DFF075C6}" srcId="{ED9788C6-28F2-4B2C-892A-B7E575CD6ECF}" destId="{04B4225B-E069-4108-BF9E-EB04A733BF3D}" srcOrd="2" destOrd="0" parTransId="{F51A2569-51D2-4963-A88E-4F30E58248A0}" sibTransId="{F3FFA884-9E34-48EA-B6D4-860244D6C347}"/>
     <dgm:cxn modelId="{227ED1C7-E2A0-4F90-882E-4231DE14954A}" srcId="{662A27ED-0A5B-4F50-B92D-E1716143FFC7}" destId="{F4286FE5-E129-4D40-9387-04098A84B8FD}" srcOrd="1" destOrd="0" parTransId="{AB12CC3A-B950-4220-BFA1-2291A15726D4}" sibTransId="{74186AF9-81A5-4991-A5A6-E1861D9C4AA0}"/>
+    <dgm:cxn modelId="{039672DE-DA91-4F78-997F-F6A6BBACD76E}" type="presOf" srcId="{04B4225B-E069-4108-BF9E-EB04A733BF3D}" destId="{027E07CE-20CB-43D2-B627-A4C6E3DEE763}" srcOrd="0" destOrd="5" presId="urn:microsoft.com/office/officeart/2018/2/layout/IconLabelDescriptionList"/>
+    <dgm:cxn modelId="{5A2AFFEC-295F-4DCF-8EFC-F5A6755FF74D}" type="presOf" srcId="{8A768285-DEBD-40AE-A9CF-308346B449EE}" destId="{6B1AB5AF-609F-4791-90A6-52781A362FCE}" srcOrd="0" destOrd="2" presId="urn:microsoft.com/office/officeart/2018/2/layout/IconLabelDescriptionList"/>
+    <dgm:cxn modelId="{92EF80F3-D03C-4031-86DE-AE37C1CC5EC7}" type="presOf" srcId="{E0E5773F-2ACA-472C-BFE1-2546D505CFD7}" destId="{AA2F476E-B46E-4EA2-9DB6-9F07658585DF}" srcOrd="0" destOrd="0" presId="urn:microsoft.com/office/officeart/2018/2/layout/IconLabelDescriptionList"/>
     <dgm:cxn modelId="{25DE12FD-C900-40CE-9CE3-EE8C6F2836CC}" srcId="{951A2093-8451-448B-AA7F-9032B0991BF8}" destId="{76B79C84-FBCC-4CFD-8C21-03343CAB73F3}" srcOrd="0" destOrd="0" parTransId="{4266B0D2-486F-49F0-A73B-592145E4F906}" sibTransId="{82BAE700-3383-4139-BA50-A62F3F134B69}"/>
-    <dgm:cxn modelId="{A35E77F3-CCFA-401F-A5BB-5B7B9250FEE1}" type="presParOf" srcId="{F70D8A9B-820A-47F4-AE49-962F0914C3A2}" destId="{1C24B1E2-BB33-452C-B133-C983FB6FCCAB}" srcOrd="0" destOrd="0" presId="urn:microsoft.com/office/officeart/2018/2/layout/IconLabelDescriptionList"/>
-    <dgm:cxn modelId="{3369463A-8619-4696-809F-8A693483C773}" type="presParOf" srcId="{1C24B1E2-BB33-452C-B133-C983FB6FCCAB}" destId="{E81638AE-D259-4C0F-A739-EFB1BA5C6848}" srcOrd="0" destOrd="0" presId="urn:microsoft.com/office/officeart/2018/2/layout/IconLabelDescriptionList"/>
-    <dgm:cxn modelId="{432B1CA9-3B51-4B6D-8BF4-D059CF1B96D9}" type="presParOf" srcId="{1C24B1E2-BB33-452C-B133-C983FB6FCCAB}" destId="{56FAB130-6E50-4F90-84E0-FBB163EEBDC6}" srcOrd="1" destOrd="0" presId="urn:microsoft.com/office/officeart/2018/2/layout/IconLabelDescriptionList"/>
-    <dgm:cxn modelId="{E999E290-7484-4C41-964E-478294E3DE71}" type="presParOf" srcId="{1C24B1E2-BB33-452C-B133-C983FB6FCCAB}" destId="{D10411E2-1031-4C84-9855-B4EA386133BC}" srcOrd="2" destOrd="0" presId="urn:microsoft.com/office/officeart/2018/2/layout/IconLabelDescriptionList"/>
-    <dgm:cxn modelId="{8F6B0BA5-3FD0-4AFF-AF13-A8566BFDA1F7}" type="presParOf" srcId="{1C24B1E2-BB33-452C-B133-C983FB6FCCAB}" destId="{DB360FCA-F29F-4EA5-9C32-991B1E94767B}" srcOrd="3" destOrd="0" presId="urn:microsoft.com/office/officeart/2018/2/layout/IconLabelDescriptionList"/>
-    <dgm:cxn modelId="{BE7873E0-81BD-4CEE-ABFA-AF3EC6083D31}" type="presParOf" srcId="{1C24B1E2-BB33-452C-B133-C983FB6FCCAB}" destId="{027E07CE-20CB-43D2-B627-A4C6E3DEE763}" srcOrd="4" destOrd="0" presId="urn:microsoft.com/office/officeart/2018/2/layout/IconLabelDescriptionList"/>
-    <dgm:cxn modelId="{4F3D7FF4-1A83-4778-A66F-BE0464C5B050}" type="presParOf" srcId="{F70D8A9B-820A-47F4-AE49-962F0914C3A2}" destId="{A22F0484-815E-4277-A686-FF9A51DB29CB}" srcOrd="1" destOrd="0" presId="urn:microsoft.com/office/officeart/2018/2/layout/IconLabelDescriptionList"/>
-    <dgm:cxn modelId="{952BCB2D-30B5-4131-97FE-FF7E0CB06CE3}" type="presParOf" srcId="{F70D8A9B-820A-47F4-AE49-962F0914C3A2}" destId="{C23DD7DF-3C2B-4588-9EC2-F98378C334DD}" srcOrd="2" destOrd="0" presId="urn:microsoft.com/office/officeart/2018/2/layout/IconLabelDescriptionList"/>
-    <dgm:cxn modelId="{205DA03C-4DF1-41F2-AC37-B615411A7764}" type="presParOf" srcId="{C23DD7DF-3C2B-4588-9EC2-F98378C334DD}" destId="{BB835347-83F6-4C18-AC1D-49ACCA3855B7}" srcOrd="0" destOrd="0" presId="urn:microsoft.com/office/officeart/2018/2/layout/IconLabelDescriptionList"/>
-    <dgm:cxn modelId="{85FFF8C7-511C-41AB-A688-C3AA334FF352}" type="presParOf" srcId="{C23DD7DF-3C2B-4588-9EC2-F98378C334DD}" destId="{5B0076A3-E6CC-467D-A250-607DD0C1835C}" srcOrd="1" destOrd="0" presId="urn:microsoft.com/office/officeart/2018/2/layout/IconLabelDescriptionList"/>
-    <dgm:cxn modelId="{DD353AFE-6728-4C4C-8636-D8C9C98229FD}" type="presParOf" srcId="{C23DD7DF-3C2B-4588-9EC2-F98378C334DD}" destId="{D574FB6C-CF43-4D58-9D83-07C46FD22E37}" srcOrd="2" destOrd="0" presId="urn:microsoft.com/office/officeart/2018/2/layout/IconLabelDescriptionList"/>
-    <dgm:cxn modelId="{A196EBA4-F6C9-4F93-B11B-195FFC0ACA1D}" type="presParOf" srcId="{C23DD7DF-3C2B-4588-9EC2-F98378C334DD}" destId="{27B2B2F4-C77B-47E6-BCAA-AA870BC687D7}" srcOrd="3" destOrd="0" presId="urn:microsoft.com/office/officeart/2018/2/layout/IconLabelDescriptionList"/>
-    <dgm:cxn modelId="{C000FA1F-588D-4E1A-92B6-EEDFBAD862DD}" type="presParOf" srcId="{C23DD7DF-3C2B-4588-9EC2-F98378C334DD}" destId="{6B1AB5AF-609F-4791-90A6-52781A362FCE}" srcOrd="4" destOrd="0" presId="urn:microsoft.com/office/officeart/2018/2/layout/IconLabelDescriptionList"/>
-    <dgm:cxn modelId="{A5DC6031-B843-48D7-8330-59570712B4EE}" type="presParOf" srcId="{F70D8A9B-820A-47F4-AE49-962F0914C3A2}" destId="{EA54BB1C-9F60-42C9-AF60-F5672BFABB1A}" srcOrd="3" destOrd="0" presId="urn:microsoft.com/office/officeart/2018/2/layout/IconLabelDescriptionList"/>
-    <dgm:cxn modelId="{956A3240-25F0-4E0E-B845-A7A00F4E4ED9}" type="presParOf" srcId="{F70D8A9B-820A-47F4-AE49-962F0914C3A2}" destId="{B383FD70-93A3-4B12-A562-E0EE19099E72}" srcOrd="4" destOrd="0" presId="urn:microsoft.com/office/officeart/2018/2/layout/IconLabelDescriptionList"/>
-    <dgm:cxn modelId="{77779D28-7638-4A34-A8F2-FA37EE1BDA31}" type="presParOf" srcId="{B383FD70-93A3-4B12-A562-E0EE19099E72}" destId="{D22EE512-028F-4964-819B-788F8E536CD4}" srcOrd="0" destOrd="0" presId="urn:microsoft.com/office/officeart/2018/2/layout/IconLabelDescriptionList"/>
-    <dgm:cxn modelId="{68EEED5C-8B00-48A7-89CD-8E0994057E4A}" type="presParOf" srcId="{B383FD70-93A3-4B12-A562-E0EE19099E72}" destId="{C2D2F78C-0269-4EBD-AF63-A997AD8FE2BE}" srcOrd="1" destOrd="0" presId="urn:microsoft.com/office/officeart/2018/2/layout/IconLabelDescriptionList"/>
-    <dgm:cxn modelId="{AA11835E-B831-49A8-BEFA-A876F2059189}" type="presParOf" srcId="{B383FD70-93A3-4B12-A562-E0EE19099E72}" destId="{103BEB87-8C1D-4A21-9364-CD058028B6D4}" srcOrd="2" destOrd="0" presId="urn:microsoft.com/office/officeart/2018/2/layout/IconLabelDescriptionList"/>
-    <dgm:cxn modelId="{BAA73DAA-D063-46FC-9199-C290175A6E4B}" type="presParOf" srcId="{B383FD70-93A3-4B12-A562-E0EE19099E72}" destId="{6DCA3C90-7945-4D26-8C5E-99638A2F0EBC}" srcOrd="3" destOrd="0" presId="urn:microsoft.com/office/officeart/2018/2/layout/IconLabelDescriptionList"/>
-    <dgm:cxn modelId="{2053D866-F761-494E-830A-AFD5BDD63A4D}" type="presParOf" srcId="{B383FD70-93A3-4B12-A562-E0EE19099E72}" destId="{AA2F476E-B46E-4EA2-9DB6-9F07658585DF}" srcOrd="4" destOrd="0" presId="urn:microsoft.com/office/officeart/2018/2/layout/IconLabelDescriptionList"/>
+    <dgm:cxn modelId="{53C5D433-E174-486B-A4C1-2C1674A0CEBA}" type="presParOf" srcId="{F70D8A9B-820A-47F4-AE49-962F0914C3A2}" destId="{1C24B1E2-BB33-452C-B133-C983FB6FCCAB}" srcOrd="0" destOrd="0" presId="urn:microsoft.com/office/officeart/2018/2/layout/IconLabelDescriptionList"/>
+    <dgm:cxn modelId="{2B4849E7-B04A-4985-B565-4315510BE133}" type="presParOf" srcId="{1C24B1E2-BB33-452C-B133-C983FB6FCCAB}" destId="{E81638AE-D259-4C0F-A739-EFB1BA5C6848}" srcOrd="0" destOrd="0" presId="urn:microsoft.com/office/officeart/2018/2/layout/IconLabelDescriptionList"/>
+    <dgm:cxn modelId="{341A0296-464B-4740-9921-2520530229A4}" type="presParOf" srcId="{1C24B1E2-BB33-452C-B133-C983FB6FCCAB}" destId="{56FAB130-6E50-4F90-84E0-FBB163EEBDC6}" srcOrd="1" destOrd="0" presId="urn:microsoft.com/office/officeart/2018/2/layout/IconLabelDescriptionList"/>
+    <dgm:cxn modelId="{4B0B1B28-BF3E-4E67-A331-3A28BF83D69F}" type="presParOf" srcId="{1C24B1E2-BB33-452C-B133-C983FB6FCCAB}" destId="{D10411E2-1031-4C84-9855-B4EA386133BC}" srcOrd="2" destOrd="0" presId="urn:microsoft.com/office/officeart/2018/2/layout/IconLabelDescriptionList"/>
+    <dgm:cxn modelId="{330DC7AE-A586-464F-BDF4-2D974C331C1D}" type="presParOf" srcId="{1C24B1E2-BB33-452C-B133-C983FB6FCCAB}" destId="{DB360FCA-F29F-4EA5-9C32-991B1E94767B}" srcOrd="3" destOrd="0" presId="urn:microsoft.com/office/officeart/2018/2/layout/IconLabelDescriptionList"/>
+    <dgm:cxn modelId="{77B5FA4B-36F1-482E-ACEB-DD88EF9E1E46}" type="presParOf" srcId="{1C24B1E2-BB33-452C-B133-C983FB6FCCAB}" destId="{027E07CE-20CB-43D2-B627-A4C6E3DEE763}" srcOrd="4" destOrd="0" presId="urn:microsoft.com/office/officeart/2018/2/layout/IconLabelDescriptionList"/>
+    <dgm:cxn modelId="{2B70409C-5A1F-43CF-B045-7EE4F46DCB1F}" type="presParOf" srcId="{F70D8A9B-820A-47F4-AE49-962F0914C3A2}" destId="{A22F0484-815E-4277-A686-FF9A51DB29CB}" srcOrd="1" destOrd="0" presId="urn:microsoft.com/office/officeart/2018/2/layout/IconLabelDescriptionList"/>
+    <dgm:cxn modelId="{C564D18A-441C-4C08-87B5-16FC13B29B51}" type="presParOf" srcId="{F70D8A9B-820A-47F4-AE49-962F0914C3A2}" destId="{C23DD7DF-3C2B-4588-9EC2-F98378C334DD}" srcOrd="2" destOrd="0" presId="urn:microsoft.com/office/officeart/2018/2/layout/IconLabelDescriptionList"/>
+    <dgm:cxn modelId="{2E1FD4AF-C50C-49CC-938A-317DB419E7D9}" type="presParOf" srcId="{C23DD7DF-3C2B-4588-9EC2-F98378C334DD}" destId="{BB835347-83F6-4C18-AC1D-49ACCA3855B7}" srcOrd="0" destOrd="0" presId="urn:microsoft.com/office/officeart/2018/2/layout/IconLabelDescriptionList"/>
+    <dgm:cxn modelId="{ABB08984-2365-4BAD-8202-D33D37E1F3C0}" type="presParOf" srcId="{C23DD7DF-3C2B-4588-9EC2-F98378C334DD}" destId="{5B0076A3-E6CC-467D-A250-607DD0C1835C}" srcOrd="1" destOrd="0" presId="urn:microsoft.com/office/officeart/2018/2/layout/IconLabelDescriptionList"/>
+    <dgm:cxn modelId="{AA361757-A796-45D3-AAA9-674D9AC8E3DD}" type="presParOf" srcId="{C23DD7DF-3C2B-4588-9EC2-F98378C334DD}" destId="{D574FB6C-CF43-4D58-9D83-07C46FD22E37}" srcOrd="2" destOrd="0" presId="urn:microsoft.com/office/officeart/2018/2/layout/IconLabelDescriptionList"/>
+    <dgm:cxn modelId="{C276D4D7-9F60-4969-92CE-C1BABEEFA9A6}" type="presParOf" srcId="{C23DD7DF-3C2B-4588-9EC2-F98378C334DD}" destId="{27B2B2F4-C77B-47E6-BCAA-AA870BC687D7}" srcOrd="3" destOrd="0" presId="urn:microsoft.com/office/officeart/2018/2/layout/IconLabelDescriptionList"/>
+    <dgm:cxn modelId="{C897680F-8A91-4BAF-9EF1-2DD39A3F2A96}" type="presParOf" srcId="{C23DD7DF-3C2B-4588-9EC2-F98378C334DD}" destId="{6B1AB5AF-609F-4791-90A6-52781A362FCE}" srcOrd="4" destOrd="0" presId="urn:microsoft.com/office/officeart/2018/2/layout/IconLabelDescriptionList"/>
+    <dgm:cxn modelId="{38E1F8C8-E948-4BBB-B50A-8D60DCA88619}" type="presParOf" srcId="{F70D8A9B-820A-47F4-AE49-962F0914C3A2}" destId="{EA54BB1C-9F60-42C9-AF60-F5672BFABB1A}" srcOrd="3" destOrd="0" presId="urn:microsoft.com/office/officeart/2018/2/layout/IconLabelDescriptionList"/>
+    <dgm:cxn modelId="{B5E656EE-B163-42C2-B38F-B7158B8FF25F}" type="presParOf" srcId="{F70D8A9B-820A-47F4-AE49-962F0914C3A2}" destId="{B383FD70-93A3-4B12-A562-E0EE19099E72}" srcOrd="4" destOrd="0" presId="urn:microsoft.com/office/officeart/2018/2/layout/IconLabelDescriptionList"/>
+    <dgm:cxn modelId="{DA3AA134-4709-465A-8A26-421B1C88F0CE}" type="presParOf" srcId="{B383FD70-93A3-4B12-A562-E0EE19099E72}" destId="{D22EE512-028F-4964-819B-788F8E536CD4}" srcOrd="0" destOrd="0" presId="urn:microsoft.com/office/officeart/2018/2/layout/IconLabelDescriptionList"/>
+    <dgm:cxn modelId="{D247D591-8CF5-49D0-B55E-AE53C7B0FB6E}" type="presParOf" srcId="{B383FD70-93A3-4B12-A562-E0EE19099E72}" destId="{C2D2F78C-0269-4EBD-AF63-A997AD8FE2BE}" srcOrd="1" destOrd="0" presId="urn:microsoft.com/office/officeart/2018/2/layout/IconLabelDescriptionList"/>
+    <dgm:cxn modelId="{2D5026BA-1BA6-4229-A750-D26A65411517}" type="presParOf" srcId="{B383FD70-93A3-4B12-A562-E0EE19099E72}" destId="{103BEB87-8C1D-4A21-9364-CD058028B6D4}" srcOrd="2" destOrd="0" presId="urn:microsoft.com/office/officeart/2018/2/layout/IconLabelDescriptionList"/>
+    <dgm:cxn modelId="{11277513-C648-40ED-A167-5B3AC847CD7D}" type="presParOf" srcId="{B383FD70-93A3-4B12-A562-E0EE19099E72}" destId="{6DCA3C90-7945-4D26-8C5E-99638A2F0EBC}" srcOrd="3" destOrd="0" presId="urn:microsoft.com/office/officeart/2018/2/layout/IconLabelDescriptionList"/>
+    <dgm:cxn modelId="{D2CC6059-7B40-4E8D-9587-7921EC119B52}" type="presParOf" srcId="{B383FD70-93A3-4B12-A562-E0EE19099E72}" destId="{AA2F476E-B46E-4EA2-9DB6-9F07658585DF}" srcOrd="4" destOrd="0" presId="urn:microsoft.com/office/officeart/2018/2/layout/IconLabelDescriptionList"/>
   </dgm:cxnLst>
   <dgm:bg/>
   <dgm:whole/>
@@ -2145,8 +1877,8 @@
       </dsp:nvSpPr>
       <dsp:spPr>
         <a:xfrm>
-          <a:off x="4688" y="682989"/>
-          <a:ext cx="1150242" cy="1150242"/>
+          <a:off x="10064" y="5900"/>
+          <a:ext cx="1149118" cy="1149118"/>
         </a:xfrm>
         <a:prstGeom prst="rect">
           <a:avLst/>
@@ -2194,8 +1926,8 @@
       </dsp:nvSpPr>
       <dsp:spPr>
         <a:xfrm>
-          <a:off x="4688" y="1982353"/>
-          <a:ext cx="3286406" cy="492960"/>
+          <a:off x="10064" y="1362371"/>
+          <a:ext cx="3283196" cy="492479"/>
         </a:xfrm>
         <a:prstGeom prst="rect">
           <a:avLst/>
@@ -2224,9 +1956,9 @@
         </a:bodyPr>
         <a:lstStyle/>
         <a:p>
-          <a:pPr marL="0" lvl="0" indent="0" algn="l" defTabSz="1377950">
+          <a:pPr marL="0" lvl="0" indent="0" algn="l" defTabSz="1111250">
             <a:lnSpc>
-              <a:spcPct val="90000"/>
+              <a:spcPct val="100000"/>
             </a:lnSpc>
             <a:spcBef>
               <a:spcPct val="0"/>
@@ -2238,15 +1970,19 @@
             <a:defRPr b="1"/>
           </a:pPr>
           <a:r>
-            <a:rPr lang="en-BE" sz="3100" kern="1200"/>
-            <a:t>Pre-Installed</a:t>
+            <a:rPr lang="en-BE" sz="2500" kern="1200" dirty="0"/>
+            <a:t>S4HANA/</a:t>
           </a:r>
-          <a:endParaRPr lang="en-US" sz="3100" kern="1200"/>
+          <a:r>
+            <a:rPr lang="en-BE" sz="2500" kern="1200" dirty="0" err="1"/>
+            <a:t>CosmosDB</a:t>
+          </a:r>
+          <a:endParaRPr lang="en-US" sz="2500" kern="1200" dirty="0"/>
         </a:p>
       </dsp:txBody>
       <dsp:txXfrm>
-        <a:off x="4688" y="1982353"/>
-        <a:ext cx="3286406" cy="492960"/>
+        <a:off x="10064" y="1362371"/>
+        <a:ext cx="3283196" cy="492479"/>
       </dsp:txXfrm>
     </dsp:sp>
     <dsp:sp modelId="{027E07CE-20CB-43D2-B627-A4C6E3DEE763}">
@@ -2256,8 +1992,8 @@
       </dsp:nvSpPr>
       <dsp:spPr>
         <a:xfrm>
-          <a:off x="4688" y="2544673"/>
-          <a:ext cx="3286406" cy="1606274"/>
+          <a:off x="10064" y="1951293"/>
+          <a:ext cx="3283196" cy="2876743"/>
         </a:xfrm>
         <a:prstGeom prst="rect">
           <a:avLst/>
@@ -2288,7 +2024,7 @@
         <a:p>
           <a:pPr marL="0" lvl="0" indent="0" algn="l" defTabSz="755650">
             <a:lnSpc>
-              <a:spcPct val="90000"/>
+              <a:spcPct val="100000"/>
             </a:lnSpc>
             <a:spcBef>
               <a:spcPct val="0"/>
@@ -2299,15 +2035,49 @@
             <a:buNone/>
           </a:pPr>
           <a:r>
-            <a:rPr lang="en-BE" sz="1700" kern="1200"/>
-            <a:t>SAP S4Hana installed</a:t>
+            <a:rPr lang="en-BE" sz="1700" b="1" i="1" kern="1200" dirty="0"/>
+            <a:t>Option1 : Pre-Installed</a:t>
           </a:r>
-          <a:endParaRPr lang="en-US" sz="1700" kern="1200"/>
+          <a:endParaRPr lang="en-US" sz="1700" b="1" i="1" kern="1200" dirty="0"/>
+        </a:p>
+        <a:p>
+          <a:pPr marL="171450" lvl="1" indent="-171450" algn="l" defTabSz="755650">
+            <a:lnSpc>
+              <a:spcPct val="90000"/>
+            </a:lnSpc>
+            <a:spcBef>
+              <a:spcPct val="0"/>
+            </a:spcBef>
+            <a:spcAft>
+              <a:spcPct val="15000"/>
+            </a:spcAft>
+            <a:buChar char="•"/>
+          </a:pPr>
+          <a:r>
+            <a:rPr lang="en-BE" sz="1700" kern="1200" dirty="0"/>
+            <a:t>Connection details on request</a:t>
+          </a:r>
+          <a:endParaRPr lang="en-US" sz="1700" kern="1200" dirty="0"/>
         </a:p>
         <a:p>
           <a:pPr marL="0" lvl="0" indent="0" algn="l" defTabSz="755650">
             <a:lnSpc>
-              <a:spcPct val="90000"/>
+              <a:spcPct val="100000"/>
+            </a:lnSpc>
+            <a:spcBef>
+              <a:spcPct val="0"/>
+            </a:spcBef>
+            <a:spcAft>
+              <a:spcPct val="35000"/>
+            </a:spcAft>
+            <a:buNone/>
+          </a:pPr>
+          <a:endParaRPr lang="en-BE" sz="1700" kern="1200" dirty="0"/>
+        </a:p>
+        <a:p>
+          <a:pPr marL="0" lvl="0" indent="0" algn="l" defTabSz="755650">
+            <a:lnSpc>
+              <a:spcPct val="100000"/>
             </a:lnSpc>
             <a:spcBef>
               <a:spcPct val="0"/>
@@ -2318,15 +2088,80 @@
             <a:buNone/>
           </a:pPr>
           <a:r>
-            <a:rPr lang="en-BE" sz="1700" kern="1200"/>
-            <a:t>Cosmos DB deployed</a:t>
+            <a:rPr lang="en-BE" sz="1700" b="1" i="1" kern="1200" dirty="0"/>
+            <a:t>Option 2 : Own Subscription</a:t>
           </a:r>
-          <a:endParaRPr lang="en-US" sz="1700" kern="1200"/>
+          <a:endParaRPr lang="en-US" sz="1700" b="1" i="1" kern="1200" dirty="0"/>
+        </a:p>
+        <a:p>
+          <a:pPr marL="171450" lvl="1" indent="-171450" algn="l" defTabSz="755650">
+            <a:lnSpc>
+              <a:spcPct val="90000"/>
+            </a:lnSpc>
+            <a:spcBef>
+              <a:spcPct val="0"/>
+            </a:spcBef>
+            <a:spcAft>
+              <a:spcPct val="15000"/>
+            </a:spcAft>
+            <a:buChar char="•"/>
+          </a:pPr>
+          <a:r>
+            <a:rPr lang="en-BE" sz="1700" kern="1200" dirty="0"/>
+            <a:t>S4HANA -SAP CAL deployment</a:t>
+          </a:r>
+          <a:endParaRPr lang="en-US" sz="1700" kern="1200" dirty="0"/>
+        </a:p>
+        <a:p>
+          <a:pPr marL="171450" lvl="1" indent="-171450" algn="l" defTabSz="755650">
+            <a:lnSpc>
+              <a:spcPct val="90000"/>
+            </a:lnSpc>
+            <a:spcBef>
+              <a:spcPct val="0"/>
+            </a:spcBef>
+            <a:spcAft>
+              <a:spcPct val="15000"/>
+            </a:spcAft>
+            <a:buChar char="•"/>
+          </a:pPr>
+          <a:r>
+            <a:rPr lang="en-BE" sz="1700" kern="1200" dirty="0" err="1"/>
+            <a:t>CosmosDB</a:t>
+          </a:r>
+          <a:r>
+            <a:rPr lang="en-BE" sz="1700" kern="1200" dirty="0"/>
+            <a:t> - deployment using Terraform</a:t>
+          </a:r>
+          <a:endParaRPr lang="en-US" sz="1700" kern="1200" dirty="0"/>
+        </a:p>
+        <a:p>
+          <a:pPr marL="171450" lvl="1" indent="-171450" algn="l" defTabSz="755650">
+            <a:lnSpc>
+              <a:spcPct val="90000"/>
+            </a:lnSpc>
+            <a:spcBef>
+              <a:spcPct val="0"/>
+            </a:spcBef>
+            <a:spcAft>
+              <a:spcPct val="15000"/>
+            </a:spcAft>
+            <a:buChar char="•"/>
+          </a:pPr>
+          <a:r>
+            <a:rPr lang="en-BE" sz="1700" kern="1200" dirty="0"/>
+            <a:t>Payment Generation &amp; upload to </a:t>
+          </a:r>
+          <a:r>
+            <a:rPr lang="en-BE" sz="1700" kern="1200" dirty="0" err="1"/>
+            <a:t>CosmosDB</a:t>
+          </a:r>
+          <a:endParaRPr lang="en-US" sz="1700" kern="1200" dirty="0"/>
         </a:p>
       </dsp:txBody>
       <dsp:txXfrm>
-        <a:off x="4688" y="2544673"/>
-        <a:ext cx="3286406" cy="1606274"/>
+        <a:off x="10064" y="1951293"/>
+        <a:ext cx="3283196" cy="2876743"/>
       </dsp:txXfrm>
     </dsp:sp>
     <dsp:sp modelId="{BB835347-83F6-4C18-AC1D-49ACCA3855B7}">
@@ -2336,8 +2171,8 @@
       </dsp:nvSpPr>
       <dsp:spPr>
         <a:xfrm>
-          <a:off x="3866215" y="682989"/>
-          <a:ext cx="1150242" cy="1150242"/>
+          <a:off x="3867820" y="5900"/>
+          <a:ext cx="1149118" cy="1149118"/>
         </a:xfrm>
         <a:prstGeom prst="rect">
           <a:avLst/>
@@ -2385,8 +2220,8 @@
       </dsp:nvSpPr>
       <dsp:spPr>
         <a:xfrm>
-          <a:off x="3866215" y="1982353"/>
-          <a:ext cx="3286406" cy="492960"/>
+          <a:off x="3867820" y="1362371"/>
+          <a:ext cx="3283196" cy="492479"/>
         </a:xfrm>
         <a:prstGeom prst="rect">
           <a:avLst/>
@@ -2415,9 +2250,9 @@
         </a:bodyPr>
         <a:lstStyle/>
         <a:p>
-          <a:pPr marL="0" lvl="0" indent="0" algn="l" defTabSz="1377950">
+          <a:pPr marL="0" lvl="0" indent="0" algn="l" defTabSz="1111250">
             <a:lnSpc>
-              <a:spcPct val="90000"/>
+              <a:spcPct val="100000"/>
             </a:lnSpc>
             <a:spcBef>
               <a:spcPct val="0"/>
@@ -2429,15 +2264,15 @@
             <a:defRPr b="1"/>
           </a:pPr>
           <a:r>
-            <a:rPr lang="en-BE" sz="3100" kern="1200"/>
-            <a:t>Your Subscription</a:t>
+            <a:rPr lang="en-BE" sz="2500" kern="1200" dirty="0"/>
+            <a:t>Synapse, Azure ML, ...</a:t>
           </a:r>
-          <a:endParaRPr lang="en-US" sz="3100" kern="1200"/>
+          <a:endParaRPr lang="en-US" sz="2500" kern="1200" dirty="0"/>
         </a:p>
       </dsp:txBody>
       <dsp:txXfrm>
-        <a:off x="3866215" y="1982353"/>
-        <a:ext cx="3286406" cy="492960"/>
+        <a:off x="3867820" y="1362371"/>
+        <a:ext cx="3283196" cy="492479"/>
       </dsp:txXfrm>
     </dsp:sp>
     <dsp:sp modelId="{6B1AB5AF-609F-4791-90A6-52781A362FCE}">
@@ -2447,8 +2282,8 @@
       </dsp:nvSpPr>
       <dsp:spPr>
         <a:xfrm>
-          <a:off x="3866215" y="2544673"/>
-          <a:ext cx="3286406" cy="1606274"/>
+          <a:off x="3870217" y="1925546"/>
+          <a:ext cx="3283196" cy="2876743"/>
         </a:xfrm>
         <a:prstGeom prst="rect">
           <a:avLst/>
@@ -2479,7 +2314,7 @@
         <a:p>
           <a:pPr marL="0" lvl="0" indent="0" algn="l" defTabSz="755650">
             <a:lnSpc>
-              <a:spcPct val="90000"/>
+              <a:spcPct val="100000"/>
             </a:lnSpc>
             <a:spcBef>
               <a:spcPct val="0"/>
@@ -2490,13 +2325,13 @@
             <a:buNone/>
           </a:pPr>
           <a:r>
-            <a:rPr lang="en-BE" sz="1700" kern="1200"/>
-            <a:t>VM for ADF Runtime and SAP .Net Connector</a:t>
+            <a:rPr lang="en-BE" sz="1700" b="1" i="1" kern="1200" dirty="0"/>
+            <a:t>Own Subscription</a:t>
           </a:r>
-          <a:endParaRPr lang="en-US" sz="1700" kern="1200"/>
+          <a:endParaRPr lang="en-US" sz="1700" b="1" i="1" kern="1200" dirty="0"/>
         </a:p>
         <a:p>
-          <a:pPr marL="0" lvl="0" indent="0" algn="l" defTabSz="755650">
+          <a:pPr marL="171450" lvl="1" indent="-171450" algn="l" defTabSz="755650">
             <a:lnSpc>
               <a:spcPct val="90000"/>
             </a:lnSpc>
@@ -2504,18 +2339,26 @@
               <a:spcPct val="0"/>
             </a:spcBef>
             <a:spcAft>
-              <a:spcPct val="35000"/>
+              <a:spcPct val="15000"/>
             </a:spcAft>
-            <a:buNone/>
+            <a:buChar char="•"/>
           </a:pPr>
           <a:r>
-            <a:rPr lang="en-BE" sz="1700" kern="1200"/>
-            <a:t>Synapse</a:t>
+            <a:rPr lang="en-BE" sz="1700" kern="1200" dirty="0"/>
+            <a:t>VM for Integration Runtime and SAP </a:t>
           </a:r>
-          <a:endParaRPr lang="en-US" sz="1700" kern="1200"/>
+          <a:r>
+            <a:rPr lang="en-BE" sz="1700" kern="1200" dirty="0" err="1"/>
+            <a:t>.Net</a:t>
+          </a:r>
+          <a:r>
+            <a:rPr lang="en-BE" sz="1700" kern="1200" dirty="0"/>
+            <a:t> Connector</a:t>
+          </a:r>
+          <a:endParaRPr lang="en-US" sz="1700" kern="1200" dirty="0"/>
         </a:p>
         <a:p>
-          <a:pPr marL="0" lvl="0" indent="0" algn="l" defTabSz="755650">
+          <a:pPr marL="171450" lvl="1" indent="-171450" algn="l" defTabSz="755650">
             <a:lnSpc>
               <a:spcPct val="90000"/>
             </a:lnSpc>
@@ -2523,18 +2366,18 @@
               <a:spcPct val="0"/>
             </a:spcBef>
             <a:spcAft>
-              <a:spcPct val="35000"/>
+              <a:spcPct val="15000"/>
             </a:spcAft>
-            <a:buNone/>
+            <a:buChar char="•"/>
           </a:pPr>
           <a:r>
-            <a:rPr lang="en-BE" sz="1700" kern="1200"/>
-            <a:t>Azure ML</a:t>
+            <a:rPr lang="en-BE" sz="1700" kern="1200" dirty="0"/>
+            <a:t>Synapse Workspace</a:t>
           </a:r>
-          <a:endParaRPr lang="en-US" sz="1700" kern="1200"/>
+          <a:endParaRPr lang="en-US" sz="1700" kern="1200" dirty="0"/>
         </a:p>
         <a:p>
-          <a:pPr marL="0" lvl="0" indent="0" algn="l" defTabSz="755650">
+          <a:pPr marL="171450" lvl="1" indent="-171450" algn="l" defTabSz="755650">
             <a:lnSpc>
               <a:spcPct val="90000"/>
             </a:lnSpc>
@@ -2542,20 +2385,39 @@
               <a:spcPct val="0"/>
             </a:spcBef>
             <a:spcAft>
-              <a:spcPct val="35000"/>
+              <a:spcPct val="15000"/>
             </a:spcAft>
-            <a:buNone/>
+            <a:buChar char="•"/>
           </a:pPr>
           <a:r>
-            <a:rPr lang="en-BE" sz="1700" kern="1200"/>
-            <a:t>Deployment via Terraform</a:t>
+            <a:rPr lang="en-BE" sz="1700" kern="1200" dirty="0"/>
+            <a:t>Azure ML</a:t>
           </a:r>
-          <a:endParaRPr lang="en-US" sz="1700" kern="1200"/>
+          <a:endParaRPr lang="en-US" sz="1700" kern="1200" dirty="0"/>
+        </a:p>
+        <a:p>
+          <a:pPr marL="171450" lvl="1" indent="-171450" algn="l" defTabSz="755650">
+            <a:lnSpc>
+              <a:spcPct val="90000"/>
+            </a:lnSpc>
+            <a:spcBef>
+              <a:spcPct val="0"/>
+            </a:spcBef>
+            <a:spcAft>
+              <a:spcPct val="15000"/>
+            </a:spcAft>
+            <a:buChar char="•"/>
+          </a:pPr>
+          <a:r>
+            <a:rPr lang="en-BE" sz="1700" kern="1200" dirty="0"/>
+            <a:t>Deployment using Terraform</a:t>
+          </a:r>
+          <a:endParaRPr lang="en-US" sz="1700" kern="1200" dirty="0"/>
         </a:p>
       </dsp:txBody>
       <dsp:txXfrm>
-        <a:off x="3866215" y="2544673"/>
-        <a:ext cx="3286406" cy="1606274"/>
+        <a:off x="3870217" y="1925546"/>
+        <a:ext cx="3283196" cy="2876743"/>
       </dsp:txXfrm>
     </dsp:sp>
     <dsp:sp modelId="{D22EE512-028F-4964-819B-788F8E536CD4}">
@@ -2565,8 +2427,8 @@
       </dsp:nvSpPr>
       <dsp:spPr>
         <a:xfrm>
-          <a:off x="7727743" y="682989"/>
-          <a:ext cx="1150242" cy="1150242"/>
+          <a:off x="7725576" y="5900"/>
+          <a:ext cx="1149118" cy="1149118"/>
         </a:xfrm>
         <a:prstGeom prst="rect">
           <a:avLst/>
@@ -2614,8 +2476,8 @@
       </dsp:nvSpPr>
       <dsp:spPr>
         <a:xfrm>
-          <a:off x="7727743" y="1982353"/>
-          <a:ext cx="3286406" cy="492960"/>
+          <a:off x="7725576" y="1362371"/>
+          <a:ext cx="3283196" cy="492479"/>
         </a:xfrm>
         <a:prstGeom prst="rect">
           <a:avLst/>
@@ -2644,9 +2506,9 @@
         </a:bodyPr>
         <a:lstStyle/>
         <a:p>
-          <a:pPr marL="0" lvl="0" indent="0" algn="l" defTabSz="1377950">
+          <a:pPr marL="0" lvl="0" indent="0" algn="l" defTabSz="1111250">
             <a:lnSpc>
-              <a:spcPct val="90000"/>
+              <a:spcPct val="100000"/>
             </a:lnSpc>
             <a:spcBef>
               <a:spcPct val="0"/>
@@ -2658,15 +2520,15 @@
             <a:defRPr b="1"/>
           </a:pPr>
           <a:r>
-            <a:rPr lang="en-BE" sz="3100" kern="1200"/>
+            <a:rPr lang="en-BE" sz="2500" kern="1200"/>
             <a:t>Tooling</a:t>
           </a:r>
-          <a:endParaRPr lang="en-US" sz="3100" kern="1200"/>
+          <a:endParaRPr lang="en-US" sz="2500" kern="1200"/>
         </a:p>
       </dsp:txBody>
       <dsp:txXfrm>
-        <a:off x="7727743" y="1982353"/>
-        <a:ext cx="3286406" cy="492960"/>
+        <a:off x="7725576" y="1362371"/>
+        <a:ext cx="3283196" cy="492479"/>
       </dsp:txXfrm>
     </dsp:sp>
     <dsp:sp modelId="{AA2F476E-B46E-4EA2-9DB6-9F07658585DF}">
@@ -2676,8 +2538,8 @@
       </dsp:nvSpPr>
       <dsp:spPr>
         <a:xfrm>
-          <a:off x="7727743" y="2544673"/>
-          <a:ext cx="3286406" cy="1606274"/>
+          <a:off x="7735641" y="1957194"/>
+          <a:ext cx="3283196" cy="2876743"/>
         </a:xfrm>
         <a:prstGeom prst="rect">
           <a:avLst/>
@@ -2708,7 +2570,7 @@
         <a:p>
           <a:pPr marL="0" lvl="0" indent="0" algn="l" defTabSz="755650">
             <a:lnSpc>
-              <a:spcPct val="90000"/>
+              <a:spcPct val="100000"/>
             </a:lnSpc>
             <a:spcBef>
               <a:spcPct val="0"/>
@@ -2719,15 +2581,19 @@
             <a:buNone/>
           </a:pPr>
           <a:r>
-            <a:rPr lang="en-BE" sz="1700" kern="1200"/>
-            <a:t>PowerBi Desktop</a:t>
+            <a:rPr lang="en-BE" sz="1700" kern="1200" dirty="0" err="1"/>
+            <a:t>PowerBI</a:t>
           </a:r>
-          <a:endParaRPr lang="en-US" sz="1700" kern="1200"/>
+          <a:r>
+            <a:rPr lang="en-BE" sz="1700" kern="1200" dirty="0"/>
+            <a:t> Desktop</a:t>
+          </a:r>
+          <a:endParaRPr lang="en-US" sz="1700" kern="1200" dirty="0"/>
         </a:p>
         <a:p>
           <a:pPr marL="0" lvl="0" indent="0" algn="l" defTabSz="755650">
             <a:lnSpc>
-              <a:spcPct val="90000"/>
+              <a:spcPct val="100000"/>
             </a:lnSpc>
             <a:spcBef>
               <a:spcPct val="0"/>
@@ -2738,15 +2604,15 @@
             <a:buNone/>
           </a:pPr>
           <a:r>
-            <a:rPr lang="en-BE" sz="1700" kern="1200"/>
+            <a:rPr lang="en-BE" sz="1700" kern="1200" dirty="0"/>
             <a:t>Azure Storage Explorer</a:t>
           </a:r>
-          <a:endParaRPr lang="en-US" sz="1700" kern="1200"/>
+          <a:endParaRPr lang="en-US" sz="1700" kern="1200" dirty="0"/>
         </a:p>
         <a:p>
           <a:pPr marL="0" lvl="0" indent="0" algn="l" defTabSz="755650">
             <a:lnSpc>
-              <a:spcPct val="90000"/>
+              <a:spcPct val="100000"/>
             </a:lnSpc>
             <a:spcBef>
               <a:spcPct val="0"/>
@@ -2757,15 +2623,15 @@
             <a:buNone/>
           </a:pPr>
           <a:r>
-            <a:rPr lang="en-BE" sz="1700" kern="1200"/>
+            <a:rPr lang="en-BE" sz="1700" kern="1200" dirty="0"/>
             <a:t>Azure Data Studio [Optional]</a:t>
           </a:r>
-          <a:endParaRPr lang="en-US" sz="1700" kern="1200"/>
+          <a:endParaRPr lang="en-US" sz="1700" kern="1200" dirty="0"/>
         </a:p>
       </dsp:txBody>
       <dsp:txXfrm>
-        <a:off x="7727743" y="2544673"/>
-        <a:ext cx="3286406" cy="1606274"/>
+        <a:off x="7735641" y="1957194"/>
+        <a:ext cx="3283196" cy="2876743"/>
       </dsp:txXfrm>
     </dsp:sp>
   </dsp:spTree>
@@ -10130,7 +9996,7 @@
           <a:p>
             <a:fld id="{52886E62-62E8-476F-BA0C-83330FBF2326}" type="datetimeFigureOut">
               <a:rPr lang="en-BE" smtClean="0"/>
-              <a:t>06/05/2021</a:t>
+              <a:t>10/06/2021</a:t>
             </a:fld>
             <a:endParaRPr lang="en-BE"/>
           </a:p>
@@ -10300,7 +10166,7 @@
           <a:p>
             <a:fld id="{52886E62-62E8-476F-BA0C-83330FBF2326}" type="datetimeFigureOut">
               <a:rPr lang="en-BE" smtClean="0"/>
-              <a:t>06/05/2021</a:t>
+              <a:t>10/06/2021</a:t>
             </a:fld>
             <a:endParaRPr lang="en-BE"/>
           </a:p>
@@ -13962,36 +13828,6 @@
           <a:chExt cx="0" cy="0"/>
         </a:xfrm>
       </p:grpSpPr>
-      <p:pic>
-        <p:nvPicPr>
-          <p:cNvPr id="6" name="Picture 4">
-            <a:extLst>
-              <a:ext uri="{FF2B5EF4-FFF2-40B4-BE49-F238E27FC236}">
-                <a16:creationId xmlns:a16="http://schemas.microsoft.com/office/drawing/2014/main" id="{E583710C-1A11-4361-ABFD-4A3D92126BF4}"/>
-              </a:ext>
-            </a:extLst>
-          </p:cNvPr>
-          <p:cNvPicPr>
-            <a:picLocks noChangeAspect="1"/>
-          </p:cNvPicPr>
-          <p:nvPr/>
-        </p:nvPicPr>
-        <p:blipFill rotWithShape="1">
-          <a:blip r:embed="rId2"/>
-          <a:srcRect t="1510" b="14220"/>
-          <a:stretch/>
-        </p:blipFill>
-        <p:spPr>
-          <a:xfrm>
-            <a:off x="20" y="10"/>
-            <a:ext cx="12191980" cy="6857990"/>
-          </a:xfrm>
-          <a:prstGeom prst="rect">
-            <a:avLst/>
-          </a:prstGeom>
-          <a:noFill/>
-        </p:spPr>
-      </p:pic>
       <p:sp>
         <p:nvSpPr>
           <p:cNvPr id="2" name="Title 1">
@@ -14010,12 +13846,12 @@
         </p:nvSpPr>
         <p:spPr>
           <a:xfrm>
-            <a:off x="0" y="3657600"/>
-            <a:ext cx="12192000" cy="3200400"/>
+            <a:off x="588263" y="5157216"/>
+            <a:ext cx="11018520" cy="1111822"/>
           </a:xfrm>
         </p:spPr>
         <p:txBody>
-          <a:bodyPr wrap="square" anchor="b">
+          <a:bodyPr wrap="square" anchor="ctr">
             <a:normAutofit/>
           </a:bodyPr>
           <a:lstStyle/>
@@ -14024,24 +13860,50 @@
               <a:rPr lang="en-BE" dirty="0" err="1"/>
               <a:t>MicroHack</a:t>
             </a:r>
+            <a:r>
+              <a:rPr lang="en-BE" dirty="0"/>
+              <a:t> SAP + Data &amp; AI</a:t>
+            </a:r>
             <a:br>
               <a:rPr lang="en-BE" dirty="0"/>
             </a:br>
             <a:r>
               <a:rPr lang="en-BE" dirty="0"/>
-              <a:t>SAP + Data</a:t>
-            </a:r>
-            <a:br>
-              <a:rPr lang="en-BE" dirty="0"/>
-            </a:br>
-            <a:r>
-              <a:rPr lang="en-BE" sz="1400" dirty="0"/>
               <a:t>Thijs Zandvliet / Julien Michel / Bart Delanghe</a:t>
             </a:r>
-            <a:endParaRPr lang="en-BE" dirty="0"/>
           </a:p>
         </p:txBody>
       </p:sp>
+      <p:pic>
+        <p:nvPicPr>
+          <p:cNvPr id="6" name="Picture 4">
+            <a:extLst>
+              <a:ext uri="{FF2B5EF4-FFF2-40B4-BE49-F238E27FC236}">
+                <a16:creationId xmlns:a16="http://schemas.microsoft.com/office/drawing/2014/main" id="{E583710C-1A11-4361-ABFD-4A3D92126BF4}"/>
+              </a:ext>
+            </a:extLst>
+          </p:cNvPr>
+          <p:cNvPicPr>
+            <a:picLocks noChangeAspect="1"/>
+          </p:cNvPicPr>
+          <p:nvPr/>
+        </p:nvPicPr>
+        <p:blipFill rotWithShape="1">
+          <a:blip r:embed="rId2"/>
+          <a:srcRect t="15555" b="28265"/>
+          <a:stretch/>
+        </p:blipFill>
+        <p:spPr>
+          <a:xfrm>
+            <a:off x="20" y="10"/>
+            <a:ext cx="12191980" cy="4571990"/>
+          </a:xfrm>
+          <a:prstGeom prst="rect">
+            <a:avLst/>
+          </a:prstGeom>
+          <a:noFill/>
+        </p:spPr>
+      </p:pic>
     </p:spTree>
     <p:extLst>
       <p:ext uri="{BB962C8B-B14F-4D97-AF65-F5344CB8AC3E}">
@@ -14058,7 +13920,301 @@
 </p:sld>
 </file>
 
+<file path=ppt/slides/slide10.xml><?xml version="1.0" encoding="utf-8"?>
+<p:sld xmlns:a="http://schemas.openxmlformats.org/drawingml/2006/main" xmlns:r="http://schemas.openxmlformats.org/officeDocument/2006/relationships" xmlns:p="http://schemas.openxmlformats.org/presentationml/2006/main">
+  <p:cSld>
+    <p:spTree>
+      <p:nvGrpSpPr>
+        <p:cNvPr id="1" name=""/>
+        <p:cNvGrpSpPr/>
+        <p:nvPr/>
+      </p:nvGrpSpPr>
+      <p:grpSpPr>
+        <a:xfrm>
+          <a:off x="0" y="0"/>
+          <a:ext cx="0" cy="0"/>
+          <a:chOff x="0" y="0"/>
+          <a:chExt cx="0" cy="0"/>
+        </a:xfrm>
+      </p:grpSpPr>
+      <p:sp>
+        <p:nvSpPr>
+          <p:cNvPr id="4" name="Title 3">
+            <a:extLst>
+              <a:ext uri="{FF2B5EF4-FFF2-40B4-BE49-F238E27FC236}">
+                <a16:creationId xmlns:a16="http://schemas.microsoft.com/office/drawing/2014/main" id="{FE0E2C30-221C-41AD-AE3A-673565168243}"/>
+              </a:ext>
+            </a:extLst>
+          </p:cNvPr>
+          <p:cNvSpPr>
+            <a:spLocks noGrp="1"/>
+          </p:cNvSpPr>
+          <p:nvPr>
+            <p:ph type="title"/>
+          </p:nvPr>
+        </p:nvSpPr>
+        <p:spPr/>
+        <p:txBody>
+          <a:bodyPr/>
+          <a:lstStyle/>
+          <a:p>
+            <a:r>
+              <a:rPr lang="en-BE" dirty="0"/>
+              <a:t>Thank You</a:t>
+            </a:r>
+          </a:p>
+        </p:txBody>
+      </p:sp>
+      <p:sp>
+        <p:nvSpPr>
+          <p:cNvPr id="5" name="Text Placeholder 4">
+            <a:extLst>
+              <a:ext uri="{FF2B5EF4-FFF2-40B4-BE49-F238E27FC236}">
+                <a16:creationId xmlns:a16="http://schemas.microsoft.com/office/drawing/2014/main" id="{9862B69E-D5BF-4E11-8BD5-32AFDE7612D7}"/>
+              </a:ext>
+            </a:extLst>
+          </p:cNvPr>
+          <p:cNvSpPr>
+            <a:spLocks noGrp="1"/>
+          </p:cNvSpPr>
+          <p:nvPr>
+            <p:ph type="body" sz="quarter" idx="12"/>
+          </p:nvPr>
+        </p:nvSpPr>
+        <p:spPr>
+          <a:xfrm>
+            <a:off x="584200" y="3962400"/>
+            <a:ext cx="9144000" cy="1015663"/>
+          </a:xfrm>
+        </p:spPr>
+        <p:txBody>
+          <a:bodyPr/>
+          <a:lstStyle/>
+          <a:p>
+            <a:r>
+              <a:rPr lang="en-BE" dirty="0"/>
+              <a:t>Bart Delanghe</a:t>
+            </a:r>
+          </a:p>
+          <a:p>
+            <a:r>
+              <a:rPr lang="en-BE" dirty="0"/>
+              <a:t>Thijs Zandvliet</a:t>
+            </a:r>
+          </a:p>
+          <a:p>
+            <a:r>
+              <a:rPr lang="en-BE" dirty="0"/>
+              <a:t>Julien Michel</a:t>
+            </a:r>
+          </a:p>
+        </p:txBody>
+      </p:sp>
+    </p:spTree>
+    <p:extLst>
+      <p:ext uri="{BB962C8B-B14F-4D97-AF65-F5344CB8AC3E}">
+        <p14:creationId xmlns:p14="http://schemas.microsoft.com/office/powerpoint/2010/main" val="1224567526"/>
+      </p:ext>
+    </p:extLst>
+  </p:cSld>
+  <p:clrMapOvr>
+    <a:masterClrMapping/>
+  </p:clrMapOvr>
+  <mc:AlternateContent xmlns:mc="http://schemas.openxmlformats.org/markup-compatibility/2006" xmlns:p14="http://schemas.microsoft.com/office/powerpoint/2010/main">
+    <mc:Choice Requires="p14">
+      <p:transition spd="med" p14:dur="700">
+        <p:fade/>
+      </p:transition>
+    </mc:Choice>
+    <mc:Fallback xmlns="">
+      <p:transition spd="med">
+        <p:fade/>
+      </p:transition>
+    </mc:Fallback>
+  </mc:AlternateContent>
+</p:sld>
+</file>
+
 <file path=ppt/slides/slide2.xml><?xml version="1.0" encoding="utf-8"?>
+<p:sld xmlns:a="http://schemas.openxmlformats.org/drawingml/2006/main" xmlns:r="http://schemas.openxmlformats.org/officeDocument/2006/relationships" xmlns:p="http://schemas.openxmlformats.org/presentationml/2006/main">
+  <p:cSld>
+    <p:spTree>
+      <p:nvGrpSpPr>
+        <p:cNvPr id="1" name=""/>
+        <p:cNvGrpSpPr/>
+        <p:nvPr/>
+      </p:nvGrpSpPr>
+      <p:grpSpPr>
+        <a:xfrm>
+          <a:off x="0" y="0"/>
+          <a:ext cx="0" cy="0"/>
+          <a:chOff x="0" y="0"/>
+          <a:chExt cx="0" cy="0"/>
+        </a:xfrm>
+      </p:grpSpPr>
+      <p:sp>
+        <p:nvSpPr>
+          <p:cNvPr id="4" name="Title 3">
+            <a:extLst>
+              <a:ext uri="{FF2B5EF4-FFF2-40B4-BE49-F238E27FC236}">
+                <a16:creationId xmlns:a16="http://schemas.microsoft.com/office/drawing/2014/main" id="{F7B90623-C641-4D7E-8326-F7AC8FD7B169}"/>
+              </a:ext>
+            </a:extLst>
+          </p:cNvPr>
+          <p:cNvSpPr>
+            <a:spLocks noGrp="1"/>
+          </p:cNvSpPr>
+          <p:nvPr>
+            <p:ph type="title"/>
+          </p:nvPr>
+        </p:nvSpPr>
+        <p:spPr>
+          <a:xfrm>
+            <a:off x="588263" y="457200"/>
+            <a:ext cx="11018520" cy="553998"/>
+          </a:xfrm>
+        </p:spPr>
+        <p:txBody>
+          <a:bodyPr/>
+          <a:lstStyle/>
+          <a:p>
+            <a:r>
+              <a:rPr lang="en-BE" dirty="0"/>
+              <a:t>Purpose</a:t>
+            </a:r>
+          </a:p>
+        </p:txBody>
+      </p:sp>
+      <p:sp>
+        <p:nvSpPr>
+          <p:cNvPr id="5" name="Text Placeholder 4">
+            <a:extLst>
+              <a:ext uri="{FF2B5EF4-FFF2-40B4-BE49-F238E27FC236}">
+                <a16:creationId xmlns:a16="http://schemas.microsoft.com/office/drawing/2014/main" id="{777DF727-2D6A-4193-8906-D7453A7B77AD}"/>
+              </a:ext>
+            </a:extLst>
+          </p:cNvPr>
+          <p:cNvSpPr>
+            <a:spLocks noGrp="1"/>
+          </p:cNvSpPr>
+          <p:nvPr>
+            <p:ph type="body" sz="quarter" idx="10"/>
+          </p:nvPr>
+        </p:nvSpPr>
+        <p:spPr>
+          <a:xfrm>
+            <a:off x="585788" y="1435100"/>
+            <a:ext cx="11018837" cy="3545586"/>
+          </a:xfrm>
+        </p:spPr>
+        <p:txBody>
+          <a:bodyPr/>
+          <a:lstStyle/>
+          <a:p>
+            <a:pPr marL="342900" indent="-342900">
+              <a:buFont typeface="Arial" panose="020B0604020202020204" pitchFamily="34" charset="0"/>
+              <a:buChar char="•"/>
+            </a:pPr>
+            <a:r>
+              <a:rPr lang="en-BE" sz="2400" dirty="0"/>
+              <a:t>Get Hands-on experience with</a:t>
+            </a:r>
+          </a:p>
+          <a:p>
+            <a:pPr marL="571500" lvl="1" indent="-342900">
+              <a:buFont typeface="Arial" panose="020B0604020202020204" pitchFamily="34" charset="0"/>
+              <a:buChar char="•"/>
+            </a:pPr>
+            <a:r>
+              <a:rPr lang="en-BE" sz="1800" dirty="0"/>
+              <a:t>SAP data extraction</a:t>
+            </a:r>
+          </a:p>
+          <a:p>
+            <a:pPr marL="571500" lvl="1" indent="-342900">
+              <a:buFont typeface="Arial" panose="020B0604020202020204" pitchFamily="34" charset="0"/>
+              <a:buChar char="•"/>
+            </a:pPr>
+            <a:r>
+              <a:rPr lang="en-BE" sz="1800" dirty="0"/>
+              <a:t>Combine SAP and non SAP data</a:t>
+            </a:r>
+          </a:p>
+          <a:p>
+            <a:pPr marL="571500" lvl="1" indent="-342900">
+              <a:buFont typeface="Arial" panose="020B0604020202020204" pitchFamily="34" charset="0"/>
+              <a:buChar char="•"/>
+            </a:pPr>
+            <a:r>
+              <a:rPr lang="en-BE" sz="1800" dirty="0" err="1"/>
+              <a:t>PowerBI</a:t>
+            </a:r>
+            <a:endParaRPr lang="en-BE" sz="1800" dirty="0"/>
+          </a:p>
+          <a:p>
+            <a:pPr marL="571500" lvl="1" indent="-342900">
+              <a:buFont typeface="Arial" panose="020B0604020202020204" pitchFamily="34" charset="0"/>
+              <a:buChar char="•"/>
+            </a:pPr>
+            <a:r>
+              <a:rPr lang="en-BE" sz="1800" dirty="0"/>
+              <a:t>Azure Machine Learning</a:t>
+            </a:r>
+            <a:endParaRPr lang="en-BE" sz="2400" dirty="0"/>
+          </a:p>
+          <a:p>
+            <a:pPr marL="342900" indent="-342900">
+              <a:buFont typeface="Arial" panose="020B0604020202020204" pitchFamily="34" charset="0"/>
+              <a:buChar char="•"/>
+            </a:pPr>
+            <a:endParaRPr lang="en-BE" sz="2400" dirty="0"/>
+          </a:p>
+          <a:p>
+            <a:pPr marL="342900" indent="-342900">
+              <a:buFont typeface="Arial" panose="020B0604020202020204" pitchFamily="34" charset="0"/>
+              <a:buChar char="•"/>
+            </a:pPr>
+            <a:r>
+              <a:rPr lang="en-BE" sz="2400" dirty="0" err="1"/>
+              <a:t>OpenHack</a:t>
+            </a:r>
+            <a:r>
+              <a:rPr lang="en-BE" sz="2400" dirty="0"/>
+              <a:t> - like</a:t>
+            </a:r>
+          </a:p>
+          <a:p>
+            <a:pPr marL="342900" indent="-342900">
+              <a:buFont typeface="Arial" panose="020B0604020202020204" pitchFamily="34" charset="0"/>
+              <a:buChar char="•"/>
+            </a:pPr>
+            <a:r>
+              <a:rPr lang="en-BE" sz="2400" dirty="0"/>
+              <a:t>Duration ~4 hours</a:t>
+            </a:r>
+          </a:p>
+          <a:p>
+            <a:endParaRPr lang="en-BE" dirty="0"/>
+          </a:p>
+        </p:txBody>
+      </p:sp>
+    </p:spTree>
+    <p:extLst>
+      <p:ext uri="{BB962C8B-B14F-4D97-AF65-F5344CB8AC3E}">
+        <p14:creationId xmlns:p14="http://schemas.microsoft.com/office/powerpoint/2010/main" val="560890708"/>
+      </p:ext>
+    </p:extLst>
+  </p:cSld>
+  <p:clrMapOvr>
+    <a:masterClrMapping/>
+  </p:clrMapOvr>
+  <p:transition>
+    <p:fade/>
+  </p:transition>
+</p:sld>
+</file>
+
+<file path=ppt/slides/slide3.xml><?xml version="1.0" encoding="utf-8"?>
 <p:sld xmlns:a="http://schemas.openxmlformats.org/drawingml/2006/main" xmlns:r="http://schemas.openxmlformats.org/officeDocument/2006/relationships" xmlns:p="http://schemas.openxmlformats.org/presentationml/2006/main">
   <p:cSld>
     <p:spTree>
@@ -14121,8 +14277,8 @@
         </p:nvSpPr>
         <p:spPr>
           <a:xfrm>
-            <a:off x="584200" y="1435503"/>
-            <a:ext cx="11018520" cy="947952"/>
+            <a:off x="586740" y="1434974"/>
+            <a:ext cx="11018520" cy="1046440"/>
           </a:xfrm>
         </p:spPr>
         <p:txBody>
@@ -14130,15 +14286,18 @@
           <a:lstStyle/>
           <a:p>
             <a:r>
-              <a:rPr lang="en-BE" dirty="0"/>
-              <a:t>Customers pay X days after receiving billing document</a:t>
-            </a:r>
-          </a:p>
-          <a:p>
-            <a:r>
-              <a:rPr lang="en-BE" dirty="0"/>
+              <a:rPr lang="en-BE" sz="2000" dirty="0"/>
+              <a:t>Customers pay X days after receiving invoice</a:t>
+            </a:r>
+          </a:p>
+          <a:p>
+            <a:r>
+              <a:rPr lang="en-BE" sz="2000" dirty="0"/>
               <a:t>Goal : predict when a customer will pay</a:t>
             </a:r>
+          </a:p>
+          <a:p>
+            <a:endParaRPr lang="en-BE" sz="2000" dirty="0"/>
           </a:p>
         </p:txBody>
       </p:sp>
@@ -14151,13 +14310,15 @@
               </a:ext>
             </a:extLst>
           </p:cNvPr>
-          <p:cNvCxnSpPr/>
+          <p:cNvCxnSpPr>
+            <a:cxnSpLocks/>
+          </p:cNvCxnSpPr>
           <p:nvPr/>
         </p:nvCxnSpPr>
         <p:spPr>
           <a:xfrm flipV="1">
-            <a:off x="1514843" y="4074011"/>
-            <a:ext cx="0" cy="2017175"/>
+            <a:off x="1514843" y="2857009"/>
+            <a:ext cx="0" cy="3234179"/>
           </a:xfrm>
           <a:prstGeom prst="straightConnector1">
             <a:avLst/>
@@ -14198,7 +14359,7 @@
         <p:spPr>
           <a:xfrm flipV="1">
             <a:off x="1514843" y="6059790"/>
-            <a:ext cx="3579111" cy="31397"/>
+            <a:ext cx="3936237" cy="31398"/>
           </a:xfrm>
           <a:prstGeom prst="straightConnector1">
             <a:avLst/>
@@ -14236,8 +14397,8 @@
         </p:nvSpPr>
         <p:spPr>
           <a:xfrm>
-            <a:off x="1934761" y="4478231"/>
-            <a:ext cx="184444" cy="1581559"/>
+            <a:off x="1903693" y="2980106"/>
+            <a:ext cx="272740" cy="3048868"/>
           </a:xfrm>
           <a:prstGeom prst="rect">
             <a:avLst/>
@@ -14282,8 +14443,8 @@
         </p:nvSpPr>
         <p:spPr>
           <a:xfrm>
-            <a:off x="2424005" y="5737984"/>
-            <a:ext cx="184444" cy="310033"/>
+            <a:off x="2892507" y="5330003"/>
+            <a:ext cx="272741" cy="698971"/>
           </a:xfrm>
           <a:prstGeom prst="rect">
             <a:avLst/>
@@ -14291,6 +14452,14 @@
           <a:solidFill>
             <a:schemeClr val="accent2"/>
           </a:solidFill>
+          <a:ln>
+            <a:solidFill>
+              <a:schemeClr val="accent1">
+                <a:lumMod val="40000"/>
+                <a:lumOff val="60000"/>
+              </a:schemeClr>
+            </a:solidFill>
+          </a:ln>
         </p:spPr>
         <p:style>
           <a:lnRef idx="2">
@@ -14331,8 +14500,8 @@
         </p:nvSpPr>
         <p:spPr>
           <a:xfrm>
-            <a:off x="2817103" y="5176783"/>
-            <a:ext cx="184444" cy="871233"/>
+            <a:off x="3320466" y="4814509"/>
+            <a:ext cx="272740" cy="1217809"/>
           </a:xfrm>
           <a:prstGeom prst="rect">
             <a:avLst/>
@@ -14340,6 +14509,14 @@
           <a:solidFill>
             <a:schemeClr val="accent2"/>
           </a:solidFill>
+          <a:ln>
+            <a:solidFill>
+              <a:schemeClr val="accent1">
+                <a:lumMod val="40000"/>
+                <a:lumOff val="60000"/>
+              </a:schemeClr>
+            </a:solidFill>
+          </a:ln>
         </p:spPr>
         <p:style>
           <a:lnRef idx="2">
@@ -14380,8 +14557,8 @@
         </p:nvSpPr>
         <p:spPr>
           <a:xfrm>
-            <a:off x="3218049" y="5518214"/>
-            <a:ext cx="184444" cy="518030"/>
+            <a:off x="3748424" y="5129275"/>
+            <a:ext cx="272740" cy="892894"/>
           </a:xfrm>
           <a:prstGeom prst="rect">
             <a:avLst/>
@@ -14389,6 +14566,14 @@
           <a:solidFill>
             <a:schemeClr val="accent2"/>
           </a:solidFill>
+          <a:ln>
+            <a:solidFill>
+              <a:schemeClr val="accent1">
+                <a:lumMod val="40000"/>
+                <a:lumOff val="60000"/>
+              </a:schemeClr>
+            </a:solidFill>
+          </a:ln>
         </p:spPr>
         <p:style>
           <a:lnRef idx="2">
@@ -14429,8 +14614,8 @@
         </p:nvSpPr>
         <p:spPr>
           <a:xfrm>
-            <a:off x="3600695" y="5726212"/>
-            <a:ext cx="184444" cy="310032"/>
+            <a:off x="4145665" y="5527267"/>
+            <a:ext cx="272740" cy="494902"/>
           </a:xfrm>
           <a:prstGeom prst="rect">
             <a:avLst/>
@@ -14438,6 +14623,14 @@
           <a:solidFill>
             <a:schemeClr val="accent2"/>
           </a:solidFill>
+          <a:ln>
+            <a:solidFill>
+              <a:schemeClr val="accent1">
+                <a:lumMod val="40000"/>
+                <a:lumOff val="60000"/>
+              </a:schemeClr>
+            </a:solidFill>
+          </a:ln>
         </p:spPr>
         <p:style>
           <a:lnRef idx="2">
@@ -14478,8 +14671,8 @@
         </p:nvSpPr>
         <p:spPr>
           <a:xfrm>
-            <a:off x="4574260" y="6059790"/>
-            <a:ext cx="519694" cy="307777"/>
+            <a:off x="4911764" y="6059790"/>
+            <a:ext cx="570990" cy="307777"/>
           </a:xfrm>
           <a:prstGeom prst="rect">
             <a:avLst/>
@@ -14494,7 +14687,7 @@
           <a:p>
             <a:r>
               <a:rPr lang="en-BE" sz="1400" dirty="0"/>
-              <a:t>time</a:t>
+              <a:t>Time</a:t>
             </a:r>
           </a:p>
         </p:txBody>
@@ -14513,7 +14706,7 @@
         </p:nvSpPr>
         <p:spPr>
           <a:xfrm>
-            <a:off x="4574260" y="4209405"/>
+            <a:off x="5249262" y="3581488"/>
             <a:ext cx="362715" cy="145206"/>
           </a:xfrm>
           <a:prstGeom prst="rect">
@@ -14559,7 +14752,7 @@
         </p:nvSpPr>
         <p:spPr>
           <a:xfrm>
-            <a:off x="4574260" y="4478231"/>
+            <a:off x="5249262" y="3850314"/>
             <a:ext cx="362715" cy="145206"/>
           </a:xfrm>
           <a:prstGeom prst="rect">
@@ -14568,6 +14761,14 @@
           <a:solidFill>
             <a:schemeClr val="accent2"/>
           </a:solidFill>
+          <a:ln>
+            <a:solidFill>
+              <a:schemeClr val="accent1">
+                <a:lumMod val="40000"/>
+                <a:lumOff val="60000"/>
+              </a:schemeClr>
+            </a:solidFill>
+          </a:ln>
         </p:spPr>
         <p:style>
           <a:lnRef idx="2">
@@ -14640,7 +14841,7 @@
         </p:nvSpPr>
         <p:spPr>
           <a:xfrm>
-            <a:off x="4990534" y="4106715"/>
+            <a:off x="5665536" y="3478798"/>
             <a:ext cx="986745" cy="307777"/>
           </a:xfrm>
           <a:prstGeom prst="rect">
@@ -14675,7 +14876,7 @@
         </p:nvSpPr>
         <p:spPr>
           <a:xfrm>
-            <a:off x="4990534" y="4414492"/>
+            <a:off x="5665536" y="3786575"/>
             <a:ext cx="1256819" cy="307777"/>
           </a:xfrm>
           <a:prstGeom prst="rect">
@@ -14710,7 +14911,7 @@
         </p:nvSpPr>
         <p:spPr>
           <a:xfrm>
-            <a:off x="925002" y="4052573"/>
+            <a:off x="892698" y="2980106"/>
             <a:ext cx="589841" cy="307777"/>
           </a:xfrm>
           <a:prstGeom prst="rect">
@@ -14744,7 +14945,7 @@
 </p:sld>
 </file>
 
-<file path=ppt/slides/slide3.xml><?xml version="1.0" encoding="utf-8"?>
+<file path=ppt/slides/slide4.xml><?xml version="1.0" encoding="utf-8"?>
 <p:sld xmlns:a="http://schemas.openxmlformats.org/drawingml/2006/main" xmlns:r="http://schemas.openxmlformats.org/officeDocument/2006/relationships" xmlns:p="http://schemas.openxmlformats.org/presentationml/2006/main">
   <p:cSld>
     <p:spTree>
@@ -14784,45 +14985,11 @@
           <a:p>
             <a:r>
               <a:rPr lang="en-BE" dirty="0"/>
-              <a:t>Setup</a:t>
+              <a:t>Architecture Overview</a:t>
             </a:r>
           </a:p>
         </p:txBody>
       </p:sp>
-      <p:pic>
-        <p:nvPicPr>
-          <p:cNvPr id="5" name="Google Shape;889;p87">
-            <a:extLst>
-              <a:ext uri="{FF2B5EF4-FFF2-40B4-BE49-F238E27FC236}">
-                <a16:creationId xmlns:a16="http://schemas.microsoft.com/office/drawing/2014/main" id="{525B6682-6972-40DC-AE15-291CADA22428}"/>
-              </a:ext>
-            </a:extLst>
-          </p:cNvPr>
-          <p:cNvPicPr preferRelativeResize="0"/>
-          <p:nvPr/>
-        </p:nvPicPr>
-        <p:blipFill>
-          <a:blip r:embed="rId2">
-            <a:alphaModFix/>
-          </a:blip>
-          <a:stretch>
-            <a:fillRect/>
-          </a:stretch>
-        </p:blipFill>
-        <p:spPr>
-          <a:xfrm>
-            <a:off x="1077722" y="2260669"/>
-            <a:ext cx="1212000" cy="353488"/>
-          </a:xfrm>
-          <a:prstGeom prst="rect">
-            <a:avLst/>
-          </a:prstGeom>
-          <a:noFill/>
-          <a:ln>
-            <a:noFill/>
-          </a:ln>
-        </p:spPr>
-      </p:pic>
       <p:pic>
         <p:nvPicPr>
           <p:cNvPr id="7" name="Picture 6" descr="A picture containing clock&#10;&#10;Description automatically generated">
@@ -14838,7 +15005,7 @@
           <p:nvPr/>
         </p:nvPicPr>
         <p:blipFill>
-          <a:blip r:embed="rId3"/>
+          <a:blip r:embed="rId2"/>
           <a:stretch>
             <a:fillRect/>
           </a:stretch>
@@ -14868,7 +15035,7 @@
           <p:nvPr/>
         </p:nvPicPr>
         <p:blipFill>
-          <a:blip r:embed="rId4"/>
+          <a:blip r:embed="rId3"/>
           <a:stretch>
             <a:fillRect/>
           </a:stretch>
@@ -14898,7 +15065,7 @@
           <p:nvPr/>
         </p:nvPicPr>
         <p:blipFill>
-          <a:blip r:embed="rId5"/>
+          <a:blip r:embed="rId4"/>
           <a:stretch>
             <a:fillRect/>
           </a:stretch>
@@ -15006,10 +15173,10 @@
           <p:nvPr/>
         </p:nvPicPr>
         <p:blipFill>
-          <a:blip r:embed="rId6">
+          <a:blip r:embed="rId5">
             <a:extLst>
               <a:ext uri="{96DAC541-7B7A-43D3-8B79-37D633B846F1}">
-                <asvg:svgBlip xmlns:asvg="http://schemas.microsoft.com/office/drawing/2016/SVG/main" r:embed="rId7"/>
+                <asvg:svgBlip xmlns:asvg="http://schemas.microsoft.com/office/drawing/2016/SVG/main" r:embed="rId6"/>
               </a:ext>
             </a:extLst>
           </a:blip>
@@ -15332,7 +15499,7 @@
           <p:nvPr/>
         </p:nvPicPr>
         <p:blipFill>
-          <a:blip r:embed="rId8">
+          <a:blip r:embed="rId7">
             <a:extLst>
               <a:ext uri="{28A0092B-C50C-407E-A947-70E740481C1C}">
                 <a14:useLocalDpi xmlns:a14="http://schemas.microsoft.com/office/drawing/2010/main" val="0"/>
@@ -15603,6 +15770,88 @@
           </a:p>
         </p:txBody>
       </p:sp>
+      <p:sp>
+        <p:nvSpPr>
+          <p:cNvPr id="27" name="TextBox 26">
+            <a:extLst>
+              <a:ext uri="{FF2B5EF4-FFF2-40B4-BE49-F238E27FC236}">
+                <a16:creationId xmlns:a16="http://schemas.microsoft.com/office/drawing/2014/main" id="{1C565ADE-6565-4985-9833-E8C7D17D0DAF}"/>
+              </a:ext>
+            </a:extLst>
+          </p:cNvPr>
+          <p:cNvSpPr txBox="1"/>
+          <p:nvPr/>
+        </p:nvSpPr>
+        <p:spPr>
+          <a:xfrm>
+            <a:off x="213390" y="6411223"/>
+            <a:ext cx="8490495" cy="276999"/>
+          </a:xfrm>
+          <a:prstGeom prst="rect">
+            <a:avLst/>
+          </a:prstGeom>
+          <a:noFill/>
+        </p:spPr>
+        <p:txBody>
+          <a:bodyPr wrap="square">
+            <a:spAutoFit/>
+          </a:bodyPr>
+          <a:lstStyle/>
+          <a:p>
+            <a:r>
+              <a:rPr lang="en-BE" sz="1200" dirty="0"/>
+              <a:t>Based on Sales Data available in S/4 HANA Fully Activated Appliance – SAP CAL Image 1909 / 2020</a:t>
+            </a:r>
+          </a:p>
+        </p:txBody>
+      </p:sp>
+      <p:pic>
+        <p:nvPicPr>
+          <p:cNvPr id="4" name="Picture 2" descr="See the source image">
+            <a:extLst>
+              <a:ext uri="{FF2B5EF4-FFF2-40B4-BE49-F238E27FC236}">
+                <a16:creationId xmlns:a16="http://schemas.microsoft.com/office/drawing/2014/main" id="{31E4C9C2-0CAD-4EB5-A4A3-B5F0977CF87B}"/>
+              </a:ext>
+            </a:extLst>
+          </p:cNvPr>
+          <p:cNvPicPr>
+            <a:picLocks noChangeAspect="1" noChangeArrowheads="1"/>
+          </p:cNvPicPr>
+          <p:nvPr/>
+        </p:nvPicPr>
+        <p:blipFill>
+          <a:blip r:embed="rId8">
+            <a:extLst>
+              <a:ext uri="{28A0092B-C50C-407E-A947-70E740481C1C}">
+                <a14:useLocalDpi xmlns:a14="http://schemas.microsoft.com/office/drawing/2010/main" val="0"/>
+              </a:ext>
+            </a:extLst>
+          </a:blip>
+          <a:srcRect/>
+          <a:stretch>
+            <a:fillRect/>
+          </a:stretch>
+        </p:blipFill>
+        <p:spPr bwMode="auto">
+          <a:xfrm>
+            <a:off x="309180" y="2342404"/>
+            <a:ext cx="2044642" cy="504571"/>
+          </a:xfrm>
+          <a:prstGeom prst="rect">
+            <a:avLst/>
+          </a:prstGeom>
+          <a:noFill/>
+          <a:extLst>
+            <a:ext uri="{909E8E84-426E-40DD-AFC4-6F175D3DCCD1}">
+              <a14:hiddenFill xmlns:a14="http://schemas.microsoft.com/office/drawing/2010/main">
+                <a:solidFill>
+                  <a:srgbClr val="FFFFFF"/>
+                </a:solidFill>
+              </a14:hiddenFill>
+            </a:ext>
+          </a:extLst>
+        </p:spPr>
+      </p:pic>
     </p:spTree>
     <p:extLst>
       <p:ext uri="{BB962C8B-B14F-4D97-AF65-F5344CB8AC3E}">
@@ -15694,7 +15943,1049 @@
 </p:sld>
 </file>
 
-<file path=ppt/slides/slide4.xml><?xml version="1.0" encoding="utf-8"?>
+<file path=ppt/slides/slide5.xml><?xml version="1.0" encoding="utf-8"?>
+<p:sld xmlns:a="http://schemas.openxmlformats.org/drawingml/2006/main" xmlns:r="http://schemas.openxmlformats.org/officeDocument/2006/relationships" xmlns:p="http://schemas.openxmlformats.org/presentationml/2006/main">
+  <p:cSld>
+    <p:spTree>
+      <p:nvGrpSpPr>
+        <p:cNvPr id="1" name=""/>
+        <p:cNvGrpSpPr/>
+        <p:nvPr/>
+      </p:nvGrpSpPr>
+      <p:grpSpPr>
+        <a:xfrm>
+          <a:off x="0" y="0"/>
+          <a:ext cx="0" cy="0"/>
+          <a:chOff x="0" y="0"/>
+          <a:chExt cx="0" cy="0"/>
+        </a:xfrm>
+      </p:grpSpPr>
+      <p:sp>
+        <p:nvSpPr>
+          <p:cNvPr id="2" name="Title 1">
+            <a:extLst>
+              <a:ext uri="{FF2B5EF4-FFF2-40B4-BE49-F238E27FC236}">
+                <a16:creationId xmlns:a16="http://schemas.microsoft.com/office/drawing/2014/main" id="{2EABE7B2-102B-4BC5-A7E0-3484B793060B}"/>
+              </a:ext>
+            </a:extLst>
+          </p:cNvPr>
+          <p:cNvSpPr>
+            <a:spLocks noGrp="1"/>
+          </p:cNvSpPr>
+          <p:nvPr>
+            <p:ph type="title"/>
+          </p:nvPr>
+        </p:nvSpPr>
+        <p:spPr/>
+        <p:txBody>
+          <a:bodyPr/>
+          <a:lstStyle/>
+          <a:p>
+            <a:r>
+              <a:rPr lang="en-BE" dirty="0"/>
+              <a:t>SAP Extraction – Synapse Pipelines</a:t>
+            </a:r>
+          </a:p>
+        </p:txBody>
+      </p:sp>
+      <p:sp>
+        <p:nvSpPr>
+          <p:cNvPr id="3" name="Content Placeholder 2">
+            <a:extLst>
+              <a:ext uri="{FF2B5EF4-FFF2-40B4-BE49-F238E27FC236}">
+                <a16:creationId xmlns:a16="http://schemas.microsoft.com/office/drawing/2014/main" id="{0A31A802-BDA4-4F03-879F-21A5CD11CA35}"/>
+              </a:ext>
+            </a:extLst>
+          </p:cNvPr>
+          <p:cNvSpPr>
+            <a:spLocks noGrp="1"/>
+          </p:cNvSpPr>
+          <p:nvPr>
+            <p:ph idx="1"/>
+          </p:nvPr>
+        </p:nvSpPr>
+        <p:spPr>
+          <a:xfrm>
+            <a:off x="336959" y="1341316"/>
+            <a:ext cx="11018520" cy="1415772"/>
+          </a:xfrm>
+        </p:spPr>
+        <p:txBody>
+          <a:bodyPr/>
+          <a:lstStyle/>
+          <a:p>
+            <a:r>
+              <a:rPr lang="en-BE" sz="2000" dirty="0"/>
+              <a:t>Sales Order Headers – SAP Table Connector</a:t>
+            </a:r>
+          </a:p>
+          <a:p>
+            <a:r>
+              <a:rPr lang="en-BE" sz="2000" dirty="0"/>
+              <a:t>Sales Order Items – SAP ECC Adapter (</a:t>
+            </a:r>
+            <a:r>
+              <a:rPr lang="en-BE" sz="2000" dirty="0" err="1"/>
+              <a:t>oData</a:t>
+            </a:r>
+            <a:r>
+              <a:rPr lang="en-BE" sz="2000" dirty="0"/>
+              <a:t>)</a:t>
+            </a:r>
+          </a:p>
+          <a:p>
+            <a:r>
+              <a:rPr lang="en-BE" sz="2000" dirty="0"/>
+              <a:t>Payments – </a:t>
+            </a:r>
+            <a:r>
+              <a:rPr lang="en-BE" sz="2000" dirty="0" err="1"/>
+              <a:t>CosmosDB</a:t>
+            </a:r>
+            <a:r>
+              <a:rPr lang="en-BE" sz="2000" dirty="0"/>
+              <a:t> – SQL API Adapter</a:t>
+            </a:r>
+          </a:p>
+          <a:p>
+            <a:r>
+              <a:rPr lang="en-BE" sz="2000" dirty="0"/>
+              <a:t>Upload to Synapse SQL Pool - Tables</a:t>
+            </a:r>
+          </a:p>
+        </p:txBody>
+      </p:sp>
+      <p:pic>
+        <p:nvPicPr>
+          <p:cNvPr id="5" name="Picture 4">
+            <a:extLst>
+              <a:ext uri="{FF2B5EF4-FFF2-40B4-BE49-F238E27FC236}">
+                <a16:creationId xmlns:a16="http://schemas.microsoft.com/office/drawing/2014/main" id="{98F82D0C-C0C2-491C-90E6-B18BC6E578F9}"/>
+              </a:ext>
+            </a:extLst>
+          </p:cNvPr>
+          <p:cNvPicPr>
+            <a:picLocks noChangeAspect="1"/>
+          </p:cNvPicPr>
+          <p:nvPr/>
+        </p:nvPicPr>
+        <p:blipFill>
+          <a:blip r:embed="rId2"/>
+          <a:stretch>
+            <a:fillRect/>
+          </a:stretch>
+        </p:blipFill>
+        <p:spPr>
+          <a:xfrm>
+            <a:off x="1053005" y="3019745"/>
+            <a:ext cx="4676795" cy="2162335"/>
+          </a:xfrm>
+          <a:prstGeom prst="rect">
+            <a:avLst/>
+          </a:prstGeom>
+          <a:solidFill>
+            <a:srgbClr val="FFFFFF">
+              <a:shade val="85000"/>
+            </a:srgbClr>
+          </a:solidFill>
+          <a:ln w="88900" cap="sq">
+            <a:solidFill>
+              <a:srgbClr val="FFFFFF"/>
+            </a:solidFill>
+            <a:miter lim="800000"/>
+          </a:ln>
+          <a:effectLst>
+            <a:outerShdw blurRad="55000" dist="18000" dir="5400000" algn="tl" rotWithShape="0">
+              <a:srgbClr val="000000">
+                <a:alpha val="40000"/>
+              </a:srgbClr>
+            </a:outerShdw>
+          </a:effectLst>
+          <a:scene3d>
+            <a:camera prst="orthographicFront"/>
+            <a:lightRig rig="twoPt" dir="t">
+              <a:rot lat="0" lon="0" rev="7200000"/>
+            </a:lightRig>
+          </a:scene3d>
+          <a:sp3d>
+            <a:bevelT w="25400" h="19050"/>
+            <a:contourClr>
+              <a:srgbClr val="FFFFFF"/>
+            </a:contourClr>
+          </a:sp3d>
+        </p:spPr>
+      </p:pic>
+      <p:pic>
+        <p:nvPicPr>
+          <p:cNvPr id="1026" name="Picture 2">
+            <a:extLst>
+              <a:ext uri="{FF2B5EF4-FFF2-40B4-BE49-F238E27FC236}">
+                <a16:creationId xmlns:a16="http://schemas.microsoft.com/office/drawing/2014/main" id="{FF983E5C-F903-4A12-BFC7-315F577180BE}"/>
+              </a:ext>
+            </a:extLst>
+          </p:cNvPr>
+          <p:cNvPicPr>
+            <a:picLocks noChangeAspect="1" noChangeArrowheads="1"/>
+          </p:cNvPicPr>
+          <p:nvPr/>
+        </p:nvPicPr>
+        <p:blipFill>
+          <a:blip r:embed="rId3">
+            <a:extLst>
+              <a:ext uri="{28A0092B-C50C-407E-A947-70E740481C1C}">
+                <a14:useLocalDpi xmlns:a14="http://schemas.microsoft.com/office/drawing/2010/main" val="0"/>
+              </a:ext>
+            </a:extLst>
+          </a:blip>
+          <a:srcRect/>
+          <a:stretch>
+            <a:fillRect/>
+          </a:stretch>
+        </p:blipFill>
+        <p:spPr bwMode="auto">
+          <a:xfrm>
+            <a:off x="3814579" y="3697823"/>
+            <a:ext cx="4261743" cy="2234765"/>
+          </a:xfrm>
+          <a:prstGeom prst="rect">
+            <a:avLst/>
+          </a:prstGeom>
+          <a:solidFill>
+            <a:srgbClr val="FFFFFF">
+              <a:shade val="85000"/>
+            </a:srgbClr>
+          </a:solidFill>
+          <a:ln w="88900" cap="sq">
+            <a:solidFill>
+              <a:srgbClr val="FFFFFF"/>
+            </a:solidFill>
+            <a:miter lim="800000"/>
+          </a:ln>
+          <a:effectLst>
+            <a:outerShdw blurRad="55000" dist="18000" dir="5400000" algn="tl" rotWithShape="0">
+              <a:srgbClr val="000000">
+                <a:alpha val="40000"/>
+              </a:srgbClr>
+            </a:outerShdw>
+          </a:effectLst>
+          <a:scene3d>
+            <a:camera prst="orthographicFront"/>
+            <a:lightRig rig="twoPt" dir="t">
+              <a:rot lat="0" lon="0" rev="7200000"/>
+            </a:lightRig>
+          </a:scene3d>
+          <a:sp3d>
+            <a:bevelT w="25400" h="19050"/>
+            <a:contourClr>
+              <a:srgbClr val="FFFFFF"/>
+            </a:contourClr>
+          </a:sp3d>
+        </p:spPr>
+      </p:pic>
+      <p:pic>
+        <p:nvPicPr>
+          <p:cNvPr id="6" name="Picture 5">
+            <a:extLst>
+              <a:ext uri="{FF2B5EF4-FFF2-40B4-BE49-F238E27FC236}">
+                <a16:creationId xmlns:a16="http://schemas.microsoft.com/office/drawing/2014/main" id="{38623A6E-818E-42F0-BFF8-7F800E146DA7}"/>
+              </a:ext>
+            </a:extLst>
+          </p:cNvPr>
+          <p:cNvPicPr>
+            <a:picLocks noChangeAspect="1"/>
+          </p:cNvPicPr>
+          <p:nvPr/>
+        </p:nvPicPr>
+        <p:blipFill>
+          <a:blip r:embed="rId4"/>
+          <a:stretch>
+            <a:fillRect/>
+          </a:stretch>
+        </p:blipFill>
+        <p:spPr>
+          <a:xfrm>
+            <a:off x="7409387" y="4347578"/>
+            <a:ext cx="4437260" cy="2338212"/>
+          </a:xfrm>
+          <a:prstGeom prst="rect">
+            <a:avLst/>
+          </a:prstGeom>
+          <a:solidFill>
+            <a:srgbClr val="FFFFFF">
+              <a:shade val="85000"/>
+            </a:srgbClr>
+          </a:solidFill>
+          <a:ln w="88900" cap="sq">
+            <a:solidFill>
+              <a:srgbClr val="FFFFFF"/>
+            </a:solidFill>
+            <a:miter lim="800000"/>
+          </a:ln>
+          <a:effectLst>
+            <a:outerShdw blurRad="55000" dist="18000" dir="5400000" algn="tl" rotWithShape="0">
+              <a:srgbClr val="000000">
+                <a:alpha val="40000"/>
+              </a:srgbClr>
+            </a:outerShdw>
+          </a:effectLst>
+          <a:scene3d>
+            <a:camera prst="orthographicFront"/>
+            <a:lightRig rig="twoPt" dir="t">
+              <a:rot lat="0" lon="0" rev="7200000"/>
+            </a:lightRig>
+          </a:scene3d>
+          <a:sp3d>
+            <a:bevelT w="25400" h="19050"/>
+            <a:contourClr>
+              <a:srgbClr val="FFFFFF"/>
+            </a:contourClr>
+          </a:sp3d>
+        </p:spPr>
+      </p:pic>
+    </p:spTree>
+    <p:extLst>
+      <p:ext uri="{BB962C8B-B14F-4D97-AF65-F5344CB8AC3E}">
+        <p14:creationId xmlns:p14="http://schemas.microsoft.com/office/powerpoint/2010/main" val="3313627249"/>
+      </p:ext>
+    </p:extLst>
+  </p:cSld>
+  <p:clrMapOvr>
+    <a:masterClrMapping/>
+  </p:clrMapOvr>
+</p:sld>
+</file>
+
+<file path=ppt/slides/slide6.xml><?xml version="1.0" encoding="utf-8"?>
+<p:sld xmlns:a="http://schemas.openxmlformats.org/drawingml/2006/main" xmlns:r="http://schemas.openxmlformats.org/officeDocument/2006/relationships" xmlns:p="http://schemas.openxmlformats.org/presentationml/2006/main">
+  <p:cSld>
+    <p:spTree>
+      <p:nvGrpSpPr>
+        <p:cNvPr id="1" name=""/>
+        <p:cNvGrpSpPr/>
+        <p:nvPr/>
+      </p:nvGrpSpPr>
+      <p:grpSpPr>
+        <a:xfrm>
+          <a:off x="0" y="0"/>
+          <a:ext cx="0" cy="0"/>
+          <a:chOff x="0" y="0"/>
+          <a:chExt cx="0" cy="0"/>
+        </a:xfrm>
+      </p:grpSpPr>
+      <p:pic>
+        <p:nvPicPr>
+          <p:cNvPr id="13" name="Picture 12">
+            <a:extLst>
+              <a:ext uri="{FF2B5EF4-FFF2-40B4-BE49-F238E27FC236}">
+                <a16:creationId xmlns:a16="http://schemas.microsoft.com/office/drawing/2014/main" id="{335C1792-DC3A-4C6B-A0A5-26F702AC4E51}"/>
+              </a:ext>
+            </a:extLst>
+          </p:cNvPr>
+          <p:cNvPicPr>
+            <a:picLocks noChangeAspect="1"/>
+          </p:cNvPicPr>
+          <p:nvPr/>
+        </p:nvPicPr>
+        <p:blipFill>
+          <a:blip r:embed="rId2"/>
+          <a:stretch>
+            <a:fillRect/>
+          </a:stretch>
+        </p:blipFill>
+        <p:spPr>
+          <a:xfrm>
+            <a:off x="6307525" y="1831532"/>
+            <a:ext cx="5299258" cy="2256878"/>
+          </a:xfrm>
+          <a:prstGeom prst="rect">
+            <a:avLst/>
+          </a:prstGeom>
+          <a:solidFill>
+            <a:srgbClr val="FFFFFF">
+              <a:shade val="85000"/>
+            </a:srgbClr>
+          </a:solidFill>
+          <a:ln w="88900" cap="sq">
+            <a:solidFill>
+              <a:srgbClr val="FFFFFF"/>
+            </a:solidFill>
+            <a:miter lim="800000"/>
+          </a:ln>
+          <a:effectLst>
+            <a:outerShdw blurRad="55000" dist="18000" dir="5400000" algn="tl" rotWithShape="0">
+              <a:srgbClr val="000000">
+                <a:alpha val="40000"/>
+              </a:srgbClr>
+            </a:outerShdw>
+          </a:effectLst>
+          <a:scene3d>
+            <a:camera prst="orthographicFront"/>
+            <a:lightRig rig="twoPt" dir="t">
+              <a:rot lat="0" lon="0" rev="7200000"/>
+            </a:lightRig>
+          </a:scene3d>
+          <a:sp3d>
+            <a:bevelT w="25400" h="19050"/>
+            <a:contourClr>
+              <a:srgbClr val="FFFFFF"/>
+            </a:contourClr>
+          </a:sp3d>
+        </p:spPr>
+      </p:pic>
+      <p:sp>
+        <p:nvSpPr>
+          <p:cNvPr id="2" name="Title 1">
+            <a:extLst>
+              <a:ext uri="{FF2B5EF4-FFF2-40B4-BE49-F238E27FC236}">
+                <a16:creationId xmlns:a16="http://schemas.microsoft.com/office/drawing/2014/main" id="{D6D400F4-3798-4F4C-A705-BD81D24C9F4B}"/>
+              </a:ext>
+            </a:extLst>
+          </p:cNvPr>
+          <p:cNvSpPr>
+            <a:spLocks noGrp="1"/>
+          </p:cNvSpPr>
+          <p:nvPr>
+            <p:ph type="title"/>
+          </p:nvPr>
+        </p:nvSpPr>
+        <p:spPr/>
+        <p:txBody>
+          <a:bodyPr/>
+          <a:lstStyle/>
+          <a:p>
+            <a:r>
+              <a:rPr lang="en-BE" dirty="0" err="1"/>
+              <a:t>PowerBI</a:t>
+            </a:r>
+            <a:endParaRPr lang="en-BE" dirty="0"/>
+          </a:p>
+        </p:txBody>
+      </p:sp>
+      <p:sp>
+        <p:nvSpPr>
+          <p:cNvPr id="3" name="Content Placeholder 2">
+            <a:extLst>
+              <a:ext uri="{FF2B5EF4-FFF2-40B4-BE49-F238E27FC236}">
+                <a16:creationId xmlns:a16="http://schemas.microsoft.com/office/drawing/2014/main" id="{178FF6D6-495B-4F5C-BA20-C19D6FFADC30}"/>
+              </a:ext>
+            </a:extLst>
+          </p:cNvPr>
+          <p:cNvSpPr>
+            <a:spLocks noGrp="1"/>
+          </p:cNvSpPr>
+          <p:nvPr>
+            <p:ph idx="1"/>
+          </p:nvPr>
+        </p:nvSpPr>
+        <p:spPr>
+          <a:xfrm>
+            <a:off x="588263" y="1174268"/>
+            <a:ext cx="11018520" cy="369332"/>
+          </a:xfrm>
+        </p:spPr>
+        <p:txBody>
+          <a:bodyPr/>
+          <a:lstStyle/>
+          <a:p>
+            <a:r>
+              <a:rPr lang="en-BE" sz="2400" dirty="0"/>
+              <a:t>Create </a:t>
+            </a:r>
+            <a:r>
+              <a:rPr lang="en-BE" sz="2400" dirty="0" err="1"/>
+              <a:t>PowerBI</a:t>
+            </a:r>
+            <a:r>
+              <a:rPr lang="en-BE" sz="2400" dirty="0"/>
+              <a:t> reports based on extracted data</a:t>
+            </a:r>
+          </a:p>
+        </p:txBody>
+      </p:sp>
+      <p:pic>
+        <p:nvPicPr>
+          <p:cNvPr id="7" name="Picture 6">
+            <a:extLst>
+              <a:ext uri="{FF2B5EF4-FFF2-40B4-BE49-F238E27FC236}">
+                <a16:creationId xmlns:a16="http://schemas.microsoft.com/office/drawing/2014/main" id="{B24591B0-4DC1-4B39-A1FA-E30451F33E9D}"/>
+              </a:ext>
+            </a:extLst>
+          </p:cNvPr>
+          <p:cNvPicPr>
+            <a:picLocks noChangeAspect="1"/>
+          </p:cNvPicPr>
+          <p:nvPr/>
+        </p:nvPicPr>
+        <p:blipFill rotWithShape="1">
+          <a:blip r:embed="rId3"/>
+          <a:srcRect l="-1167" t="-782"/>
+          <a:stretch/>
+        </p:blipFill>
+        <p:spPr>
+          <a:xfrm>
+            <a:off x="430825" y="1831532"/>
+            <a:ext cx="4039139" cy="2369315"/>
+          </a:xfrm>
+          <a:prstGeom prst="rect">
+            <a:avLst/>
+          </a:prstGeom>
+          <a:solidFill>
+            <a:srgbClr val="FFFFFF">
+              <a:shade val="85000"/>
+            </a:srgbClr>
+          </a:solidFill>
+          <a:ln w="88900" cap="sq">
+            <a:solidFill>
+              <a:srgbClr val="FFFFFF"/>
+            </a:solidFill>
+            <a:miter lim="800000"/>
+          </a:ln>
+          <a:effectLst>
+            <a:outerShdw blurRad="55000" dist="18000" dir="5400000" algn="tl" rotWithShape="0">
+              <a:srgbClr val="000000">
+                <a:alpha val="40000"/>
+              </a:srgbClr>
+            </a:outerShdw>
+          </a:effectLst>
+          <a:scene3d>
+            <a:camera prst="orthographicFront"/>
+            <a:lightRig rig="twoPt" dir="t">
+              <a:rot lat="0" lon="0" rev="7200000"/>
+            </a:lightRig>
+          </a:scene3d>
+          <a:sp3d>
+            <a:bevelT w="25400" h="19050"/>
+            <a:contourClr>
+              <a:srgbClr val="FFFFFF"/>
+            </a:contourClr>
+          </a:sp3d>
+        </p:spPr>
+      </p:pic>
+      <p:pic>
+        <p:nvPicPr>
+          <p:cNvPr id="5" name="Picture 4">
+            <a:extLst>
+              <a:ext uri="{FF2B5EF4-FFF2-40B4-BE49-F238E27FC236}">
+                <a16:creationId xmlns:a16="http://schemas.microsoft.com/office/drawing/2014/main" id="{C099C43A-05D5-423A-BE8E-FE83ECF5741F}"/>
+              </a:ext>
+            </a:extLst>
+          </p:cNvPr>
+          <p:cNvPicPr>
+            <a:picLocks noChangeAspect="1"/>
+          </p:cNvPicPr>
+          <p:nvPr/>
+        </p:nvPicPr>
+        <p:blipFill rotWithShape="1">
+          <a:blip r:embed="rId4"/>
+          <a:srcRect l="-515" t="-515"/>
+          <a:stretch/>
+        </p:blipFill>
+        <p:spPr>
+          <a:xfrm>
+            <a:off x="7401538" y="3821760"/>
+            <a:ext cx="4560766" cy="2681076"/>
+          </a:xfrm>
+          <a:prstGeom prst="rect">
+            <a:avLst/>
+          </a:prstGeom>
+          <a:solidFill>
+            <a:srgbClr val="FFFFFF">
+              <a:shade val="85000"/>
+            </a:srgbClr>
+          </a:solidFill>
+          <a:ln w="88900" cap="sq">
+            <a:solidFill>
+              <a:srgbClr val="FFFFFF"/>
+            </a:solidFill>
+            <a:miter lim="800000"/>
+          </a:ln>
+          <a:effectLst>
+            <a:outerShdw blurRad="55000" dist="18000" dir="5400000" algn="tl" rotWithShape="0">
+              <a:srgbClr val="000000">
+                <a:alpha val="40000"/>
+              </a:srgbClr>
+            </a:outerShdw>
+          </a:effectLst>
+          <a:scene3d>
+            <a:camera prst="orthographicFront"/>
+            <a:lightRig rig="twoPt" dir="t">
+              <a:rot lat="0" lon="0" rev="7200000"/>
+            </a:lightRig>
+          </a:scene3d>
+          <a:sp3d>
+            <a:bevelT w="25400" h="19050"/>
+            <a:contourClr>
+              <a:srgbClr val="FFFFFF"/>
+            </a:contourClr>
+          </a:sp3d>
+        </p:spPr>
+      </p:pic>
+      <p:pic>
+        <p:nvPicPr>
+          <p:cNvPr id="9" name="Picture 8">
+            <a:extLst>
+              <a:ext uri="{FF2B5EF4-FFF2-40B4-BE49-F238E27FC236}">
+                <a16:creationId xmlns:a16="http://schemas.microsoft.com/office/drawing/2014/main" id="{937C0501-740C-450F-B6E9-49F773DD9B56}"/>
+              </a:ext>
+            </a:extLst>
+          </p:cNvPr>
+          <p:cNvPicPr>
+            <a:picLocks noChangeAspect="1"/>
+          </p:cNvPicPr>
+          <p:nvPr/>
+        </p:nvPicPr>
+        <p:blipFill>
+          <a:blip r:embed="rId5"/>
+          <a:stretch>
+            <a:fillRect/>
+          </a:stretch>
+        </p:blipFill>
+        <p:spPr>
+          <a:xfrm>
+            <a:off x="1209302" y="3855875"/>
+            <a:ext cx="4643916" cy="2732220"/>
+          </a:xfrm>
+          <a:prstGeom prst="rect">
+            <a:avLst/>
+          </a:prstGeom>
+          <a:solidFill>
+            <a:srgbClr val="FFFFFF">
+              <a:shade val="85000"/>
+            </a:srgbClr>
+          </a:solidFill>
+          <a:ln w="88900" cap="sq">
+            <a:solidFill>
+              <a:srgbClr val="FFFFFF"/>
+            </a:solidFill>
+            <a:miter lim="800000"/>
+          </a:ln>
+          <a:effectLst>
+            <a:outerShdw blurRad="55000" dist="18000" dir="5400000" algn="tl" rotWithShape="0">
+              <a:srgbClr val="000000">
+                <a:alpha val="40000"/>
+              </a:srgbClr>
+            </a:outerShdw>
+          </a:effectLst>
+          <a:scene3d>
+            <a:camera prst="orthographicFront"/>
+            <a:lightRig rig="twoPt" dir="t">
+              <a:rot lat="0" lon="0" rev="7200000"/>
+            </a:lightRig>
+          </a:scene3d>
+          <a:sp3d>
+            <a:bevelT w="25400" h="19050"/>
+            <a:contourClr>
+              <a:srgbClr val="FFFFFF"/>
+            </a:contourClr>
+          </a:sp3d>
+        </p:spPr>
+      </p:pic>
+    </p:spTree>
+    <p:extLst>
+      <p:ext uri="{BB962C8B-B14F-4D97-AF65-F5344CB8AC3E}">
+        <p14:creationId xmlns:p14="http://schemas.microsoft.com/office/powerpoint/2010/main" val="2706452235"/>
+      </p:ext>
+    </p:extLst>
+  </p:cSld>
+  <p:clrMapOvr>
+    <a:masterClrMapping/>
+  </p:clrMapOvr>
+</p:sld>
+</file>
+
+<file path=ppt/slides/slide7.xml><?xml version="1.0" encoding="utf-8"?>
+<p:sld xmlns:a="http://schemas.openxmlformats.org/drawingml/2006/main" xmlns:r="http://schemas.openxmlformats.org/officeDocument/2006/relationships" xmlns:p="http://schemas.openxmlformats.org/presentationml/2006/main">
+  <p:cSld>
+    <p:spTree>
+      <p:nvGrpSpPr>
+        <p:cNvPr id="1" name=""/>
+        <p:cNvGrpSpPr/>
+        <p:nvPr/>
+      </p:nvGrpSpPr>
+      <p:grpSpPr>
+        <a:xfrm>
+          <a:off x="0" y="0"/>
+          <a:ext cx="0" cy="0"/>
+          <a:chOff x="0" y="0"/>
+          <a:chExt cx="0" cy="0"/>
+        </a:xfrm>
+      </p:grpSpPr>
+      <p:sp>
+        <p:nvSpPr>
+          <p:cNvPr id="2" name="Title 1">
+            <a:extLst>
+              <a:ext uri="{FF2B5EF4-FFF2-40B4-BE49-F238E27FC236}">
+                <a16:creationId xmlns:a16="http://schemas.microsoft.com/office/drawing/2014/main" id="{26F72A51-8045-48F1-9539-CE21F944BCDA}"/>
+              </a:ext>
+            </a:extLst>
+          </p:cNvPr>
+          <p:cNvSpPr>
+            <a:spLocks noGrp="1"/>
+          </p:cNvSpPr>
+          <p:nvPr>
+            <p:ph type="title"/>
+          </p:nvPr>
+        </p:nvSpPr>
+        <p:spPr/>
+        <p:txBody>
+          <a:bodyPr/>
+          <a:lstStyle/>
+          <a:p>
+            <a:r>
+              <a:rPr lang="en-BE" dirty="0"/>
+              <a:t>Azure ML</a:t>
+            </a:r>
+          </a:p>
+        </p:txBody>
+      </p:sp>
+      <p:pic>
+        <p:nvPicPr>
+          <p:cNvPr id="5" name="Picture 4">
+            <a:extLst>
+              <a:ext uri="{FF2B5EF4-FFF2-40B4-BE49-F238E27FC236}">
+                <a16:creationId xmlns:a16="http://schemas.microsoft.com/office/drawing/2014/main" id="{45169BB8-9DA5-4147-9C98-A02CD9C7A6A3}"/>
+              </a:ext>
+            </a:extLst>
+          </p:cNvPr>
+          <p:cNvPicPr>
+            <a:picLocks noChangeAspect="1"/>
+          </p:cNvPicPr>
+          <p:nvPr/>
+        </p:nvPicPr>
+        <p:blipFill>
+          <a:blip r:embed="rId2"/>
+          <a:stretch>
+            <a:fillRect/>
+          </a:stretch>
+        </p:blipFill>
+        <p:spPr>
+          <a:xfrm>
+            <a:off x="4563734" y="1321947"/>
+            <a:ext cx="4262518" cy="2367048"/>
+          </a:xfrm>
+          <a:prstGeom prst="rect">
+            <a:avLst/>
+          </a:prstGeom>
+          <a:solidFill>
+            <a:srgbClr val="FFFFFF">
+              <a:shade val="85000"/>
+            </a:srgbClr>
+          </a:solidFill>
+          <a:ln w="88900" cap="sq">
+            <a:solidFill>
+              <a:srgbClr val="FFFFFF"/>
+            </a:solidFill>
+            <a:miter lim="800000"/>
+          </a:ln>
+          <a:effectLst>
+            <a:outerShdw blurRad="55000" dist="18000" dir="5400000" algn="tl" rotWithShape="0">
+              <a:srgbClr val="000000">
+                <a:alpha val="40000"/>
+              </a:srgbClr>
+            </a:outerShdw>
+          </a:effectLst>
+          <a:scene3d>
+            <a:camera prst="orthographicFront"/>
+            <a:lightRig rig="twoPt" dir="t">
+              <a:rot lat="0" lon="0" rev="7200000"/>
+            </a:lightRig>
+          </a:scene3d>
+          <a:sp3d>
+            <a:bevelT w="25400" h="19050"/>
+            <a:contourClr>
+              <a:srgbClr val="FFFFFF"/>
+            </a:contourClr>
+          </a:sp3d>
+        </p:spPr>
+      </p:pic>
+      <p:pic>
+        <p:nvPicPr>
+          <p:cNvPr id="7" name="Picture 6">
+            <a:extLst>
+              <a:ext uri="{FF2B5EF4-FFF2-40B4-BE49-F238E27FC236}">
+                <a16:creationId xmlns:a16="http://schemas.microsoft.com/office/drawing/2014/main" id="{0627A3AA-06C8-4B93-858C-C4F573BD8E44}"/>
+              </a:ext>
+            </a:extLst>
+          </p:cNvPr>
+          <p:cNvPicPr>
+            <a:picLocks noChangeAspect="1"/>
+          </p:cNvPicPr>
+          <p:nvPr/>
+        </p:nvPicPr>
+        <p:blipFill>
+          <a:blip r:embed="rId3"/>
+          <a:stretch>
+            <a:fillRect/>
+          </a:stretch>
+        </p:blipFill>
+        <p:spPr>
+          <a:xfrm>
+            <a:off x="5490771" y="2315434"/>
+            <a:ext cx="4899898" cy="2574436"/>
+          </a:xfrm>
+          <a:prstGeom prst="rect">
+            <a:avLst/>
+          </a:prstGeom>
+          <a:solidFill>
+            <a:srgbClr val="FFFFFF">
+              <a:shade val="85000"/>
+            </a:srgbClr>
+          </a:solidFill>
+          <a:ln w="88900" cap="sq">
+            <a:solidFill>
+              <a:srgbClr val="FFFFFF"/>
+            </a:solidFill>
+            <a:miter lim="800000"/>
+          </a:ln>
+          <a:effectLst>
+            <a:outerShdw blurRad="55000" dist="18000" dir="5400000" algn="tl" rotWithShape="0">
+              <a:srgbClr val="000000">
+                <a:alpha val="40000"/>
+              </a:srgbClr>
+            </a:outerShdw>
+          </a:effectLst>
+          <a:scene3d>
+            <a:camera prst="orthographicFront"/>
+            <a:lightRig rig="twoPt" dir="t">
+              <a:rot lat="0" lon="0" rev="7200000"/>
+            </a:lightRig>
+          </a:scene3d>
+          <a:sp3d>
+            <a:bevelT w="25400" h="19050"/>
+            <a:contourClr>
+              <a:srgbClr val="FFFFFF"/>
+            </a:contourClr>
+          </a:sp3d>
+        </p:spPr>
+      </p:pic>
+      <p:pic>
+        <p:nvPicPr>
+          <p:cNvPr id="9" name="Picture 8">
+            <a:extLst>
+              <a:ext uri="{FF2B5EF4-FFF2-40B4-BE49-F238E27FC236}">
+                <a16:creationId xmlns:a16="http://schemas.microsoft.com/office/drawing/2014/main" id="{ACE42E09-66BA-4E44-A8B1-58BD77691E55}"/>
+              </a:ext>
+            </a:extLst>
+          </p:cNvPr>
+          <p:cNvPicPr>
+            <a:picLocks noChangeAspect="1"/>
+          </p:cNvPicPr>
+          <p:nvPr/>
+        </p:nvPicPr>
+        <p:blipFill>
+          <a:blip r:embed="rId4"/>
+          <a:stretch>
+            <a:fillRect/>
+          </a:stretch>
+        </p:blipFill>
+        <p:spPr>
+          <a:xfrm>
+            <a:off x="6540536" y="3163117"/>
+            <a:ext cx="4024811" cy="2439709"/>
+          </a:xfrm>
+          <a:prstGeom prst="rect">
+            <a:avLst/>
+          </a:prstGeom>
+          <a:solidFill>
+            <a:srgbClr val="FFFFFF">
+              <a:shade val="85000"/>
+            </a:srgbClr>
+          </a:solidFill>
+          <a:ln w="88900" cap="sq">
+            <a:solidFill>
+              <a:srgbClr val="FFFFFF"/>
+            </a:solidFill>
+            <a:miter lim="800000"/>
+          </a:ln>
+          <a:effectLst>
+            <a:outerShdw blurRad="55000" dist="18000" dir="5400000" algn="tl" rotWithShape="0">
+              <a:srgbClr val="000000">
+                <a:alpha val="40000"/>
+              </a:srgbClr>
+            </a:outerShdw>
+          </a:effectLst>
+          <a:scene3d>
+            <a:camera prst="orthographicFront"/>
+            <a:lightRig rig="twoPt" dir="t">
+              <a:rot lat="0" lon="0" rev="7200000"/>
+            </a:lightRig>
+          </a:scene3d>
+          <a:sp3d>
+            <a:bevelT w="25400" h="19050"/>
+            <a:contourClr>
+              <a:srgbClr val="FFFFFF"/>
+            </a:contourClr>
+          </a:sp3d>
+        </p:spPr>
+      </p:pic>
+      <p:sp>
+        <p:nvSpPr>
+          <p:cNvPr id="12" name="TextBox 11">
+            <a:extLst>
+              <a:ext uri="{FF2B5EF4-FFF2-40B4-BE49-F238E27FC236}">
+                <a16:creationId xmlns:a16="http://schemas.microsoft.com/office/drawing/2014/main" id="{82B1B9BD-FB2F-4C9F-8FC5-CE351016CAE6}"/>
+              </a:ext>
+            </a:extLst>
+          </p:cNvPr>
+          <p:cNvSpPr txBox="1"/>
+          <p:nvPr/>
+        </p:nvSpPr>
+        <p:spPr>
+          <a:xfrm flipH="1">
+            <a:off x="494547" y="1432430"/>
+            <a:ext cx="3543726" cy="1661993"/>
+          </a:xfrm>
+          <a:prstGeom prst="rect">
+            <a:avLst/>
+          </a:prstGeom>
+          <a:noFill/>
+        </p:spPr>
+        <p:txBody>
+          <a:bodyPr wrap="square" lIns="0" tIns="0" rIns="0" bIns="0" rtlCol="0">
+            <a:spAutoFit/>
+          </a:bodyPr>
+          <a:lstStyle/>
+          <a:p>
+            <a:pPr marL="342900" indent="-342900" algn="l">
+              <a:buFont typeface="Arial" panose="020B0604020202020204" pitchFamily="34" charset="0"/>
+              <a:buChar char="•"/>
+            </a:pPr>
+            <a:r>
+              <a:rPr lang="en-BE" sz="1800" dirty="0"/>
+              <a:t>Configure Auto ML Run</a:t>
+            </a:r>
+          </a:p>
+          <a:p>
+            <a:pPr marL="342900" indent="-342900" algn="l">
+              <a:buFont typeface="Arial" panose="020B0604020202020204" pitchFamily="34" charset="0"/>
+              <a:buChar char="•"/>
+            </a:pPr>
+            <a:r>
+              <a:rPr lang="en-BE" sz="1800" dirty="0"/>
+              <a:t>Configure ‘Regression’</a:t>
+            </a:r>
+          </a:p>
+          <a:p>
+            <a:pPr marL="342900" indent="-342900" algn="l">
+              <a:buFont typeface="Arial" panose="020B0604020202020204" pitchFamily="34" charset="0"/>
+              <a:buChar char="•"/>
+            </a:pPr>
+            <a:r>
+              <a:rPr lang="en-BE" sz="1800" dirty="0"/>
+              <a:t>Create Cluster</a:t>
+            </a:r>
+          </a:p>
+          <a:p>
+            <a:pPr marL="342900" indent="-342900" algn="l">
+              <a:buFont typeface="Arial" panose="020B0604020202020204" pitchFamily="34" charset="0"/>
+              <a:buChar char="•"/>
+            </a:pPr>
+            <a:r>
+              <a:rPr lang="en-BE" sz="1800" dirty="0"/>
+              <a:t>Evaluate Different Models</a:t>
+            </a:r>
+          </a:p>
+          <a:p>
+            <a:pPr marL="342900" indent="-342900" algn="l">
+              <a:buFont typeface="Arial" panose="020B0604020202020204" pitchFamily="34" charset="0"/>
+              <a:buChar char="•"/>
+            </a:pPr>
+            <a:r>
+              <a:rPr lang="en-BE" sz="1800" dirty="0"/>
+              <a:t>Deploy best model</a:t>
+            </a:r>
+          </a:p>
+          <a:p>
+            <a:pPr marL="342900" indent="-342900" algn="l">
+              <a:buFont typeface="Arial" panose="020B0604020202020204" pitchFamily="34" charset="0"/>
+              <a:buChar char="•"/>
+            </a:pPr>
+            <a:r>
+              <a:rPr lang="en-BE" sz="1800" dirty="0"/>
+              <a:t>Integrate with </a:t>
+            </a:r>
+            <a:r>
+              <a:rPr lang="en-BE" sz="1800" dirty="0" err="1"/>
+              <a:t>PowerBI</a:t>
+            </a:r>
+            <a:endParaRPr lang="en-BE" sz="2000" dirty="0"/>
+          </a:p>
+        </p:txBody>
+      </p:sp>
+      <p:pic>
+        <p:nvPicPr>
+          <p:cNvPr id="14" name="Picture 13">
+            <a:extLst>
+              <a:ext uri="{FF2B5EF4-FFF2-40B4-BE49-F238E27FC236}">
+                <a16:creationId xmlns:a16="http://schemas.microsoft.com/office/drawing/2014/main" id="{6E3DA3DB-835D-4DEB-8794-C7CA7622E186}"/>
+              </a:ext>
+            </a:extLst>
+          </p:cNvPr>
+          <p:cNvPicPr>
+            <a:picLocks noChangeAspect="1"/>
+          </p:cNvPicPr>
+          <p:nvPr/>
+        </p:nvPicPr>
+        <p:blipFill>
+          <a:blip r:embed="rId5"/>
+          <a:stretch>
+            <a:fillRect/>
+          </a:stretch>
+        </p:blipFill>
+        <p:spPr>
+          <a:xfrm>
+            <a:off x="7915124" y="4498331"/>
+            <a:ext cx="4100964" cy="2208989"/>
+          </a:xfrm>
+          <a:prstGeom prst="rect">
+            <a:avLst/>
+          </a:prstGeom>
+          <a:solidFill>
+            <a:srgbClr val="FFFFFF">
+              <a:shade val="85000"/>
+            </a:srgbClr>
+          </a:solidFill>
+          <a:ln w="88900" cap="sq">
+            <a:solidFill>
+              <a:srgbClr val="FFFFFF"/>
+            </a:solidFill>
+            <a:miter lim="800000"/>
+          </a:ln>
+          <a:effectLst>
+            <a:outerShdw blurRad="55000" dist="18000" dir="5400000" algn="tl" rotWithShape="0">
+              <a:srgbClr val="000000">
+                <a:alpha val="40000"/>
+              </a:srgbClr>
+            </a:outerShdw>
+          </a:effectLst>
+          <a:scene3d>
+            <a:camera prst="orthographicFront"/>
+            <a:lightRig rig="twoPt" dir="t">
+              <a:rot lat="0" lon="0" rev="7200000"/>
+            </a:lightRig>
+          </a:scene3d>
+          <a:sp3d>
+            <a:bevelT w="25400" h="19050"/>
+            <a:contourClr>
+              <a:srgbClr val="FFFFFF"/>
+            </a:contourClr>
+          </a:sp3d>
+        </p:spPr>
+      </p:pic>
+    </p:spTree>
+    <p:extLst>
+      <p:ext uri="{BB962C8B-B14F-4D97-AF65-F5344CB8AC3E}">
+        <p14:creationId xmlns:p14="http://schemas.microsoft.com/office/powerpoint/2010/main" val="2290896173"/>
+      </p:ext>
+    </p:extLst>
+  </p:cSld>
+  <p:clrMapOvr>
+    <a:masterClrMapping/>
+  </p:clrMapOvr>
+</p:sld>
+</file>
+
+<file path=ppt/slides/slide8.xml><?xml version="1.0" encoding="utf-8"?>
 <p:sld xmlns:a="http://schemas.openxmlformats.org/drawingml/2006/main" xmlns:r="http://schemas.openxmlformats.org/officeDocument/2006/relationships" xmlns:p="http://schemas.openxmlformats.org/presentationml/2006/main">
   <p:cSld>
     <p:spTree>
@@ -15762,7 +17053,7 @@
             <p:ph sz="quarter" idx="10"/>
             <p:extLst>
               <p:ext uri="{D42A27DB-BD31-4B8C-83A1-F6EECF244321}">
-                <p14:modId xmlns:p14="http://schemas.microsoft.com/office/powerpoint/2010/main" val="1129968410"/>
+                <p14:modId xmlns:p14="http://schemas.microsoft.com/office/powerpoint/2010/main" val="1427548940"/>
               </p:ext>
             </p:extLst>
           </p:nvPr>
@@ -15793,7 +17084,7 @@
 </p:sld>
 </file>
 
-<file path=ppt/slides/slide5.xml><?xml version="1.0" encoding="utf-8"?>
+<file path=ppt/slides/slide9.xml><?xml version="1.0" encoding="utf-8"?>
 <p:sld xmlns:a="http://schemas.openxmlformats.org/drawingml/2006/main" xmlns:r="http://schemas.openxmlformats.org/officeDocument/2006/relationships" xmlns:p="http://schemas.openxmlformats.org/presentationml/2006/main">
   <p:cSld>
     <p:spTree>
@@ -15854,52 +17145,71 @@
             <p:ph idx="1"/>
           </p:nvPr>
         </p:nvSpPr>
-        <p:spPr/>
+        <p:spPr>
+          <a:xfrm>
+            <a:off x="584200" y="1435503"/>
+            <a:ext cx="11018520" cy="3754874"/>
+          </a:xfrm>
+        </p:spPr>
         <p:txBody>
           <a:bodyPr/>
           <a:lstStyle/>
           <a:p>
             <a:r>
-              <a:rPr lang="en-BE" dirty="0" err="1">
+              <a:rPr lang="en-BE" dirty="0"/>
+              <a:t>Instructions :</a:t>
+            </a:r>
+          </a:p>
+          <a:p>
+            <a:pPr lvl="1"/>
+            <a:r>
+              <a:rPr lang="en-US" sz="2000" u="sng" dirty="0">
+                <a:solidFill>
+                  <a:srgbClr val="0563C1"/>
+                </a:solidFill>
+                <a:effectLst/>
+                <a:latin typeface="Calibri" panose="020F0502020204030204" pitchFamily="34" charset="0"/>
+                <a:ea typeface="Calibri" panose="020F0502020204030204" pitchFamily="34" charset="0"/>
                 <a:hlinkClick r:id="rId2"/>
               </a:rPr>
-              <a:t>thzandvl</a:t>
-            </a:r>
-            <a:r>
-              <a:rPr lang="en-BE" dirty="0">
-                <a:hlinkClick r:id="rId2"/>
-              </a:rPr>
-              <a:t>/</a:t>
-            </a:r>
-            <a:r>
-              <a:rPr lang="en-BE" dirty="0" err="1">
-                <a:hlinkClick r:id="rId2"/>
-              </a:rPr>
-              <a:t>microhack</a:t>
-            </a:r>
-            <a:r>
-              <a:rPr lang="en-BE" dirty="0">
-                <a:hlinkClick r:id="rId2"/>
-              </a:rPr>
-              <a:t>-sap-data (github.com)</a:t>
-            </a:r>
+              <a:t>https://aka.ms/microhack-sap-data</a:t>
+            </a:r>
+            <a:endParaRPr lang="en-BE" dirty="0">
+              <a:hlinkClick r:id="rId3"/>
+            </a:endParaRPr>
+          </a:p>
+          <a:p>
             <a:endParaRPr lang="en-BE" dirty="0"/>
           </a:p>
           <a:p>
             <a:r>
               <a:rPr lang="en-BE" dirty="0"/>
-              <a:t>Txt file with connectivity details for SAP &amp; </a:t>
-            </a:r>
-            <a:r>
-              <a:rPr lang="en-BE" dirty="0" err="1"/>
-              <a:t>CosmosDB</a:t>
-            </a:r>
+              <a:t>Self explanatory / Step-by-step instructions</a:t>
+            </a:r>
+          </a:p>
+          <a:p>
+            <a:pPr lvl="1"/>
+            <a:r>
+              <a:rPr lang="en-BE" dirty="0"/>
+              <a:t>Feedback is welcome</a:t>
+            </a:r>
+          </a:p>
+          <a:p>
+            <a:pPr marL="0" indent="0">
+              <a:buNone/>
+            </a:pPr>
             <a:endParaRPr lang="en-BE" dirty="0"/>
           </a:p>
           <a:p>
+            <a:pPr marL="0" indent="0">
+              <a:buNone/>
+            </a:pPr>
+            <a:endParaRPr lang="en-BE" dirty="0"/>
+          </a:p>
+          <a:p>
             <a:r>
               <a:rPr lang="en-BE" dirty="0"/>
-              <a:t>Blob storage with SAP </a:t>
+              <a:t>Note: SAP </a:t>
             </a:r>
             <a:r>
               <a:rPr lang="en-BE" dirty="0" err="1"/>
@@ -15907,20 +17217,8 @@
             </a:r>
             <a:r>
               <a:rPr lang="en-BE" dirty="0"/>
-              <a:t> Connector if no S-User</a:t>
-            </a:r>
-          </a:p>
-          <a:p>
-            <a:pPr lvl="1"/>
-            <a:r>
-              <a:rPr lang="en-BE" dirty="0"/>
-              <a:t>Note: will be removed after </a:t>
-            </a:r>
-            <a:r>
-              <a:rPr lang="en-BE" dirty="0" err="1"/>
-              <a:t>MicroHack</a:t>
-            </a:r>
-            <a:endParaRPr lang="en-BE" dirty="0"/>
+              <a:t> Connector needs SAP S-User to download</a:t>
+            </a:r>
           </a:p>
         </p:txBody>
       </p:sp>
@@ -15928,471 +17226,6 @@
     <p:extLst>
       <p:ext uri="{BB962C8B-B14F-4D97-AF65-F5344CB8AC3E}">
         <p14:creationId xmlns:p14="http://schemas.microsoft.com/office/powerpoint/2010/main" val="2715703261"/>
-      </p:ext>
-    </p:extLst>
-  </p:cSld>
-  <p:clrMapOvr>
-    <a:masterClrMapping/>
-  </p:clrMapOvr>
-</p:sld>
-</file>
-
-<file path=ppt/slides/slide6.xml><?xml version="1.0" encoding="utf-8"?>
-<p:sld xmlns:a="http://schemas.openxmlformats.org/drawingml/2006/main" xmlns:r="http://schemas.openxmlformats.org/officeDocument/2006/relationships" xmlns:p="http://schemas.openxmlformats.org/presentationml/2006/main" show="0">
-  <p:cSld>
-    <p:spTree>
-      <p:nvGrpSpPr>
-        <p:cNvPr id="1" name=""/>
-        <p:cNvGrpSpPr/>
-        <p:nvPr/>
-      </p:nvGrpSpPr>
-      <p:grpSpPr>
-        <a:xfrm>
-          <a:off x="0" y="0"/>
-          <a:ext cx="0" cy="0"/>
-          <a:chOff x="0" y="0"/>
-          <a:chExt cx="0" cy="0"/>
-        </a:xfrm>
-      </p:grpSpPr>
-      <p:sp>
-        <p:nvSpPr>
-          <p:cNvPr id="2" name="Title 1">
-            <a:extLst>
-              <a:ext uri="{FF2B5EF4-FFF2-40B4-BE49-F238E27FC236}">
-                <a16:creationId xmlns:a16="http://schemas.microsoft.com/office/drawing/2014/main" id="{CDFD80C6-CC7C-47C3-B307-00114EDC1B4A}"/>
-              </a:ext>
-            </a:extLst>
-          </p:cNvPr>
-          <p:cNvSpPr>
-            <a:spLocks noGrp="1"/>
-          </p:cNvSpPr>
-          <p:nvPr>
-            <p:ph type="title"/>
-          </p:nvPr>
-        </p:nvSpPr>
-        <p:spPr/>
-        <p:txBody>
-          <a:bodyPr/>
-          <a:lstStyle/>
-          <a:p>
-            <a:endParaRPr lang="en-BE"/>
-          </a:p>
-        </p:txBody>
-      </p:sp>
-      <p:pic>
-        <p:nvPicPr>
-          <p:cNvPr id="5" name="Content Placeholder 4">
-            <a:extLst>
-              <a:ext uri="{FF2B5EF4-FFF2-40B4-BE49-F238E27FC236}">
-                <a16:creationId xmlns:a16="http://schemas.microsoft.com/office/drawing/2014/main" id="{A5FD809B-EE93-41E0-85A4-CB2BD7BE3FC5}"/>
-              </a:ext>
-            </a:extLst>
-          </p:cNvPr>
-          <p:cNvPicPr>
-            <a:picLocks noGrp="1" noChangeAspect="1"/>
-          </p:cNvPicPr>
-          <p:nvPr>
-            <p:ph idx="1"/>
-          </p:nvPr>
-        </p:nvPicPr>
-        <p:blipFill>
-          <a:blip r:embed="rId2"/>
-          <a:stretch>
-            <a:fillRect/>
-          </a:stretch>
-        </p:blipFill>
-        <p:spPr>
-          <a:xfrm>
-            <a:off x="1501140" y="1807899"/>
-            <a:ext cx="9189719" cy="2926025"/>
-          </a:xfrm>
-        </p:spPr>
-      </p:pic>
-      <p:sp>
-        <p:nvSpPr>
-          <p:cNvPr id="6" name="Rectangle 5">
-            <a:extLst>
-              <a:ext uri="{FF2B5EF4-FFF2-40B4-BE49-F238E27FC236}">
-                <a16:creationId xmlns:a16="http://schemas.microsoft.com/office/drawing/2014/main" id="{6C29472B-90F4-46DC-8A01-1ACB415B4A38}"/>
-              </a:ext>
-            </a:extLst>
-          </p:cNvPr>
-          <p:cNvSpPr/>
-          <p:nvPr/>
-        </p:nvSpPr>
-        <p:spPr bwMode="auto">
-          <a:xfrm>
-            <a:off x="3524250" y="1823996"/>
-            <a:ext cx="2019300" cy="400050"/>
-          </a:xfrm>
-          <a:prstGeom prst="rect">
-            <a:avLst/>
-          </a:prstGeom>
-          <a:noFill/>
-          <a:ln w="19050">
-            <a:solidFill>
-              <a:srgbClr val="FF0000"/>
-            </a:solidFill>
-            <a:headEnd type="none" w="med" len="med"/>
-            <a:tailEnd type="none" w="med" len="med"/>
-          </a:ln>
-          <a:effectLst/>
-        </p:spPr>
-        <p:style>
-          <a:lnRef idx="1">
-            <a:schemeClr val="accent2"/>
-          </a:lnRef>
-          <a:fillRef idx="3">
-            <a:schemeClr val="accent2"/>
-          </a:fillRef>
-          <a:effectRef idx="2">
-            <a:schemeClr val="accent2"/>
-          </a:effectRef>
-          <a:fontRef idx="minor">
-            <a:schemeClr val="lt1"/>
-          </a:fontRef>
-        </p:style>
-        <p:txBody>
-          <a:bodyPr rot="0" spcFirstLastPara="0" vertOverflow="overflow" horzOverflow="overflow" vert="horz" wrap="square" lIns="182880" tIns="146304" rIns="182880" bIns="146304" numCol="1" spcCol="0" rtlCol="0" fromWordArt="0" anchor="t" anchorCtr="0" forceAA="0" compatLnSpc="1">
-            <a:prstTxWarp prst="textNoShape">
-              <a:avLst/>
-            </a:prstTxWarp>
-            <a:noAutofit/>
-          </a:bodyPr>
-          <a:lstStyle/>
-          <a:p>
-            <a:pPr algn="l" defTabSz="932472" fontAlgn="base">
-              <a:spcBef>
-                <a:spcPct val="0"/>
-              </a:spcBef>
-              <a:spcAft>
-                <a:spcPct val="0"/>
-              </a:spcAft>
-            </a:pPr>
-            <a:endParaRPr lang="en-BE" sz="2000" dirty="0" err="1">
-              <a:solidFill>
-                <a:srgbClr val="FFFFFF"/>
-              </a:solidFill>
-              <a:ea typeface="Segoe UI" pitchFamily="34" charset="0"/>
-              <a:cs typeface="Segoe UI" pitchFamily="34" charset="0"/>
-            </a:endParaRPr>
-          </a:p>
-        </p:txBody>
-      </p:sp>
-    </p:spTree>
-    <p:extLst>
-      <p:ext uri="{BB962C8B-B14F-4D97-AF65-F5344CB8AC3E}">
-        <p14:creationId xmlns:p14="http://schemas.microsoft.com/office/powerpoint/2010/main" val="566810426"/>
-      </p:ext>
-    </p:extLst>
-  </p:cSld>
-  <p:clrMapOvr>
-    <a:masterClrMapping/>
-  </p:clrMapOvr>
-</p:sld>
-</file>
-
-<file path=ppt/slides/slide7.xml><?xml version="1.0" encoding="utf-8"?>
-<p:sld xmlns:a="http://schemas.openxmlformats.org/drawingml/2006/main" xmlns:r="http://schemas.openxmlformats.org/officeDocument/2006/relationships" xmlns:p="http://schemas.openxmlformats.org/presentationml/2006/main" show="0">
-  <p:cSld>
-    <p:spTree>
-      <p:nvGrpSpPr>
-        <p:cNvPr id="1" name=""/>
-        <p:cNvGrpSpPr/>
-        <p:nvPr/>
-      </p:nvGrpSpPr>
-      <p:grpSpPr>
-        <a:xfrm>
-          <a:off x="0" y="0"/>
-          <a:ext cx="0" cy="0"/>
-          <a:chOff x="0" y="0"/>
-          <a:chExt cx="0" cy="0"/>
-        </a:xfrm>
-      </p:grpSpPr>
-      <p:sp>
-        <p:nvSpPr>
-          <p:cNvPr id="2" name="Title 1">
-            <a:extLst>
-              <a:ext uri="{FF2B5EF4-FFF2-40B4-BE49-F238E27FC236}">
-                <a16:creationId xmlns:a16="http://schemas.microsoft.com/office/drawing/2014/main" id="{CDFD80C6-CC7C-47C3-B307-00114EDC1B4A}"/>
-              </a:ext>
-            </a:extLst>
-          </p:cNvPr>
-          <p:cNvSpPr>
-            <a:spLocks noGrp="1"/>
-          </p:cNvSpPr>
-          <p:nvPr>
-            <p:ph type="title"/>
-          </p:nvPr>
-        </p:nvSpPr>
-        <p:spPr/>
-        <p:txBody>
-          <a:bodyPr/>
-          <a:lstStyle/>
-          <a:p>
-            <a:endParaRPr lang="en-BE"/>
-          </a:p>
-        </p:txBody>
-      </p:sp>
-      <p:pic>
-        <p:nvPicPr>
-          <p:cNvPr id="5" name="Content Placeholder 4">
-            <a:extLst>
-              <a:ext uri="{FF2B5EF4-FFF2-40B4-BE49-F238E27FC236}">
-                <a16:creationId xmlns:a16="http://schemas.microsoft.com/office/drawing/2014/main" id="{A5FD809B-EE93-41E0-85A4-CB2BD7BE3FC5}"/>
-              </a:ext>
-            </a:extLst>
-          </p:cNvPr>
-          <p:cNvPicPr>
-            <a:picLocks noGrp="1" noChangeAspect="1"/>
-          </p:cNvPicPr>
-          <p:nvPr>
-            <p:ph idx="1"/>
-          </p:nvPr>
-        </p:nvPicPr>
-        <p:blipFill>
-          <a:blip r:embed="rId2"/>
-          <a:stretch>
-            <a:fillRect/>
-          </a:stretch>
-        </p:blipFill>
-        <p:spPr>
-          <a:xfrm>
-            <a:off x="1501140" y="1807899"/>
-            <a:ext cx="9189719" cy="2926025"/>
-          </a:xfrm>
-        </p:spPr>
-      </p:pic>
-      <p:sp>
-        <p:nvSpPr>
-          <p:cNvPr id="6" name="Rectangle 5">
-            <a:extLst>
-              <a:ext uri="{FF2B5EF4-FFF2-40B4-BE49-F238E27FC236}">
-                <a16:creationId xmlns:a16="http://schemas.microsoft.com/office/drawing/2014/main" id="{6C29472B-90F4-46DC-8A01-1ACB415B4A38}"/>
-              </a:ext>
-            </a:extLst>
-          </p:cNvPr>
-          <p:cNvSpPr/>
-          <p:nvPr/>
-        </p:nvSpPr>
-        <p:spPr bwMode="auto">
-          <a:xfrm>
-            <a:off x="2085064" y="2460100"/>
-            <a:ext cx="2019300" cy="400050"/>
-          </a:xfrm>
-          <a:prstGeom prst="rect">
-            <a:avLst/>
-          </a:prstGeom>
-          <a:noFill/>
-          <a:ln w="19050">
-            <a:solidFill>
-              <a:srgbClr val="FF0000"/>
-            </a:solidFill>
-            <a:headEnd type="none" w="med" len="med"/>
-            <a:tailEnd type="none" w="med" len="med"/>
-          </a:ln>
-          <a:effectLst/>
-        </p:spPr>
-        <p:style>
-          <a:lnRef idx="1">
-            <a:schemeClr val="accent2"/>
-          </a:lnRef>
-          <a:fillRef idx="3">
-            <a:schemeClr val="accent2"/>
-          </a:fillRef>
-          <a:effectRef idx="2">
-            <a:schemeClr val="accent2"/>
-          </a:effectRef>
-          <a:fontRef idx="minor">
-            <a:schemeClr val="lt1"/>
-          </a:fontRef>
-        </p:style>
-        <p:txBody>
-          <a:bodyPr rot="0" spcFirstLastPara="0" vertOverflow="overflow" horzOverflow="overflow" vert="horz" wrap="square" lIns="182880" tIns="146304" rIns="182880" bIns="146304" numCol="1" spcCol="0" rtlCol="0" fromWordArt="0" anchor="t" anchorCtr="0" forceAA="0" compatLnSpc="1">
-            <a:prstTxWarp prst="textNoShape">
-              <a:avLst/>
-            </a:prstTxWarp>
-            <a:noAutofit/>
-          </a:bodyPr>
-          <a:lstStyle/>
-          <a:p>
-            <a:pPr algn="l" defTabSz="932472" fontAlgn="base">
-              <a:spcBef>
-                <a:spcPct val="0"/>
-              </a:spcBef>
-              <a:spcAft>
-                <a:spcPct val="0"/>
-              </a:spcAft>
-            </a:pPr>
-            <a:endParaRPr lang="en-BE" sz="2000" dirty="0" err="1">
-              <a:solidFill>
-                <a:srgbClr val="FFFFFF"/>
-              </a:solidFill>
-              <a:ea typeface="Segoe UI" pitchFamily="34" charset="0"/>
-              <a:cs typeface="Segoe UI" pitchFamily="34" charset="0"/>
-            </a:endParaRPr>
-          </a:p>
-        </p:txBody>
-      </p:sp>
-    </p:spTree>
-    <p:extLst>
-      <p:ext uri="{BB962C8B-B14F-4D97-AF65-F5344CB8AC3E}">
-        <p14:creationId xmlns:p14="http://schemas.microsoft.com/office/powerpoint/2010/main" val="37632715"/>
-      </p:ext>
-    </p:extLst>
-  </p:cSld>
-  <p:clrMapOvr>
-    <a:masterClrMapping/>
-  </p:clrMapOvr>
-</p:sld>
-</file>
-
-<file path=ppt/slides/slide8.xml><?xml version="1.0" encoding="utf-8"?>
-<p:sld xmlns:a="http://schemas.openxmlformats.org/drawingml/2006/main" xmlns:r="http://schemas.openxmlformats.org/officeDocument/2006/relationships" xmlns:p="http://schemas.openxmlformats.org/presentationml/2006/main" show="0">
-  <p:cSld>
-    <p:spTree>
-      <p:nvGrpSpPr>
-        <p:cNvPr id="1" name=""/>
-        <p:cNvGrpSpPr/>
-        <p:nvPr/>
-      </p:nvGrpSpPr>
-      <p:grpSpPr>
-        <a:xfrm>
-          <a:off x="0" y="0"/>
-          <a:ext cx="0" cy="0"/>
-          <a:chOff x="0" y="0"/>
-          <a:chExt cx="0" cy="0"/>
-        </a:xfrm>
-      </p:grpSpPr>
-      <p:sp>
-        <p:nvSpPr>
-          <p:cNvPr id="2" name="Title 1">
-            <a:extLst>
-              <a:ext uri="{FF2B5EF4-FFF2-40B4-BE49-F238E27FC236}">
-                <a16:creationId xmlns:a16="http://schemas.microsoft.com/office/drawing/2014/main" id="{CDFD80C6-CC7C-47C3-B307-00114EDC1B4A}"/>
-              </a:ext>
-            </a:extLst>
-          </p:cNvPr>
-          <p:cNvSpPr>
-            <a:spLocks noGrp="1"/>
-          </p:cNvSpPr>
-          <p:nvPr>
-            <p:ph type="title"/>
-          </p:nvPr>
-        </p:nvSpPr>
-        <p:spPr/>
-        <p:txBody>
-          <a:bodyPr/>
-          <a:lstStyle/>
-          <a:p>
-            <a:endParaRPr lang="en-BE"/>
-          </a:p>
-        </p:txBody>
-      </p:sp>
-      <p:pic>
-        <p:nvPicPr>
-          <p:cNvPr id="5" name="Content Placeholder 4">
-            <a:extLst>
-              <a:ext uri="{FF2B5EF4-FFF2-40B4-BE49-F238E27FC236}">
-                <a16:creationId xmlns:a16="http://schemas.microsoft.com/office/drawing/2014/main" id="{A5FD809B-EE93-41E0-85A4-CB2BD7BE3FC5}"/>
-              </a:ext>
-            </a:extLst>
-          </p:cNvPr>
-          <p:cNvPicPr>
-            <a:picLocks noGrp="1" noChangeAspect="1"/>
-          </p:cNvPicPr>
-          <p:nvPr>
-            <p:ph idx="1"/>
-          </p:nvPr>
-        </p:nvPicPr>
-        <p:blipFill>
-          <a:blip r:embed="rId2"/>
-          <a:stretch>
-            <a:fillRect/>
-          </a:stretch>
-        </p:blipFill>
-        <p:spPr>
-          <a:xfrm>
-            <a:off x="1501140" y="1807899"/>
-            <a:ext cx="9189719" cy="2926025"/>
-          </a:xfrm>
-        </p:spPr>
-      </p:pic>
-      <p:sp>
-        <p:nvSpPr>
-          <p:cNvPr id="3" name="Rectangle 2">
-            <a:extLst>
-              <a:ext uri="{FF2B5EF4-FFF2-40B4-BE49-F238E27FC236}">
-                <a16:creationId xmlns:a16="http://schemas.microsoft.com/office/drawing/2014/main" id="{DE8A9355-49CF-47ED-912B-109C9F42F64D}"/>
-              </a:ext>
-            </a:extLst>
-          </p:cNvPr>
-          <p:cNvSpPr/>
-          <p:nvPr/>
-        </p:nvSpPr>
-        <p:spPr bwMode="auto">
-          <a:xfrm>
-            <a:off x="2512611" y="3212327"/>
-            <a:ext cx="1362489" cy="300024"/>
-          </a:xfrm>
-          <a:prstGeom prst="rect">
-            <a:avLst/>
-          </a:prstGeom>
-          <a:noFill/>
-          <a:ln w="19050">
-            <a:solidFill>
-              <a:srgbClr val="FF0000"/>
-            </a:solidFill>
-            <a:headEnd type="none" w="med" len="med"/>
-            <a:tailEnd type="none" w="med" len="med"/>
-          </a:ln>
-          <a:effectLst/>
-        </p:spPr>
-        <p:style>
-          <a:lnRef idx="1">
-            <a:schemeClr val="accent2"/>
-          </a:lnRef>
-          <a:fillRef idx="3">
-            <a:schemeClr val="accent2"/>
-          </a:fillRef>
-          <a:effectRef idx="2">
-            <a:schemeClr val="accent2"/>
-          </a:effectRef>
-          <a:fontRef idx="minor">
-            <a:schemeClr val="lt1"/>
-          </a:fontRef>
-        </p:style>
-        <p:txBody>
-          <a:bodyPr rot="0" spcFirstLastPara="0" vertOverflow="overflow" horzOverflow="overflow" vert="horz" wrap="square" lIns="182880" tIns="146304" rIns="182880" bIns="146304" numCol="1" spcCol="0" rtlCol="0" fromWordArt="0" anchor="t" anchorCtr="0" forceAA="0" compatLnSpc="1">
-            <a:prstTxWarp prst="textNoShape">
-              <a:avLst/>
-            </a:prstTxWarp>
-            <a:noAutofit/>
-          </a:bodyPr>
-          <a:lstStyle/>
-          <a:p>
-            <a:pPr algn="l" defTabSz="932472" fontAlgn="base">
-              <a:spcBef>
-                <a:spcPct val="0"/>
-              </a:spcBef>
-              <a:spcAft>
-                <a:spcPct val="0"/>
-              </a:spcAft>
-            </a:pPr>
-            <a:endParaRPr lang="en-BE" sz="2000" dirty="0" err="1">
-              <a:solidFill>
-                <a:srgbClr val="FFFFFF"/>
-              </a:solidFill>
-              <a:ea typeface="Segoe UI" pitchFamily="34" charset="0"/>
-              <a:cs typeface="Segoe UI" pitchFamily="34" charset="0"/>
-            </a:endParaRPr>
-          </a:p>
-        </p:txBody>
-      </p:sp>
-    </p:spTree>
-    <p:extLst>
-      <p:ext uri="{BB962C8B-B14F-4D97-AF65-F5344CB8AC3E}">
-        <p14:creationId xmlns:p14="http://schemas.microsoft.com/office/powerpoint/2010/main" val="296623923"/>
       </p:ext>
     </p:extLst>
   </p:cSld>

</xml_diff>

<commit_message>
UI5 link added, UI5 appsrc  uploaded
</commit_message>
<xml_diff>
--- a/SAP-Data-MicroHack.pptx
+++ b/SAP-Data-MicroHack.pptx
@@ -13,9 +13,10 @@
     <p:sldId id="270" r:id="rId7"/>
     <p:sldId id="264" r:id="rId8"/>
     <p:sldId id="268" r:id="rId9"/>
-    <p:sldId id="258" r:id="rId10"/>
-    <p:sldId id="260" r:id="rId11"/>
-    <p:sldId id="271" r:id="rId12"/>
+    <p:sldId id="273" r:id="rId10"/>
+    <p:sldId id="258" r:id="rId11"/>
+    <p:sldId id="260" r:id="rId12"/>
+    <p:sldId id="271" r:id="rId13"/>
   </p:sldIdLst>
   <p:sldSz cx="12192000" cy="6858000"/>
   <p:notesSz cx="6858000" cy="9144000"/>
@@ -9997,7 +9998,7 @@
           <a:p>
             <a:fld id="{52886E62-62E8-476F-BA0C-83330FBF2326}" type="datetimeFigureOut">
               <a:rPr lang="en-BE" smtClean="0"/>
-              <a:t>05/31/2022</a:t>
+              <a:t>06/01/2022</a:t>
             </a:fld>
             <a:endParaRPr lang="en-BE"/>
           </a:p>
@@ -10167,7 +10168,7 @@
           <a:p>
             <a:fld id="{52886E62-62E8-476F-BA0C-83330FBF2326}" type="datetimeFigureOut">
               <a:rPr lang="en-BE" smtClean="0"/>
-              <a:t>05/31/2022</a:t>
+              <a:t>06/01/2022</a:t>
             </a:fld>
             <a:endParaRPr lang="en-BE"/>
           </a:p>
@@ -13943,6 +13944,105 @@
           <p:cNvPr id="2" name="Title 1">
             <a:extLst>
               <a:ext uri="{FF2B5EF4-FFF2-40B4-BE49-F238E27FC236}">
+                <a16:creationId xmlns:a16="http://schemas.microsoft.com/office/drawing/2014/main" id="{51AD9371-9B27-4D4D-A7F9-0C5690E2FA4F}"/>
+              </a:ext>
+            </a:extLst>
+          </p:cNvPr>
+          <p:cNvSpPr>
+            <a:spLocks noGrp="1"/>
+          </p:cNvSpPr>
+          <p:nvPr>
+            <p:ph type="title"/>
+          </p:nvPr>
+        </p:nvSpPr>
+        <p:spPr>
+          <a:xfrm>
+            <a:off x="588263" y="457200"/>
+            <a:ext cx="11018520" cy="553998"/>
+          </a:xfrm>
+        </p:spPr>
+        <p:txBody>
+          <a:bodyPr wrap="square" anchor="t">
+            <a:normAutofit/>
+          </a:bodyPr>
+          <a:lstStyle/>
+          <a:p>
+            <a:r>
+              <a:rPr lang="en-BE" dirty="0"/>
+              <a:t>Architecture Setup</a:t>
+            </a:r>
+          </a:p>
+        </p:txBody>
+      </p:sp>
+      <p:graphicFrame>
+        <p:nvGraphicFramePr>
+          <p:cNvPr id="7" name="Content Placeholder 2">
+            <a:extLst>
+              <a:ext uri="{FF2B5EF4-FFF2-40B4-BE49-F238E27FC236}">
+                <a16:creationId xmlns:a16="http://schemas.microsoft.com/office/drawing/2014/main" id="{7ACAE881-2A15-4EF5-A2E1-95E958C3B748}"/>
+              </a:ext>
+            </a:extLst>
+          </p:cNvPr>
+          <p:cNvGraphicFramePr>
+            <a:graphicFrameLocks noGrp="1"/>
+          </p:cNvGraphicFramePr>
+          <p:nvPr>
+            <p:ph sz="quarter" idx="10"/>
+            <p:extLst>
+              <p:ext uri="{D42A27DB-BD31-4B8C-83A1-F6EECF244321}">
+                <p14:modId xmlns:p14="http://schemas.microsoft.com/office/powerpoint/2010/main" val="1427548940"/>
+              </p:ext>
+            </p:extLst>
+          </p:nvPr>
+        </p:nvGraphicFramePr>
+        <p:xfrm>
+          <a:off x="584200" y="1435100"/>
+          <a:ext cx="11018838" cy="4833938"/>
+        </p:xfrm>
+        <a:graphic>
+          <a:graphicData uri="http://schemas.openxmlformats.org/drawingml/2006/diagram">
+            <dgm:relIds xmlns:dgm="http://schemas.openxmlformats.org/drawingml/2006/diagram" xmlns:r="http://schemas.openxmlformats.org/officeDocument/2006/relationships" r:dm="rId2" r:lo="rId3" r:qs="rId4" r:cs="rId5"/>
+          </a:graphicData>
+        </a:graphic>
+      </p:graphicFrame>
+    </p:spTree>
+    <p:extLst>
+      <p:ext uri="{BB962C8B-B14F-4D97-AF65-F5344CB8AC3E}">
+        <p14:creationId xmlns:p14="http://schemas.microsoft.com/office/powerpoint/2010/main" val="4112841600"/>
+      </p:ext>
+    </p:extLst>
+  </p:cSld>
+  <p:clrMapOvr>
+    <a:masterClrMapping/>
+  </p:clrMapOvr>
+  <p:transition>
+    <p:fade/>
+  </p:transition>
+</p:sld>
+</file>
+
+<file path=ppt/slides/slide11.xml><?xml version="1.0" encoding="utf-8"?>
+<p:sld xmlns:a="http://schemas.openxmlformats.org/drawingml/2006/main" xmlns:r="http://schemas.openxmlformats.org/officeDocument/2006/relationships" xmlns:p="http://schemas.openxmlformats.org/presentationml/2006/main">
+  <p:cSld>
+    <p:spTree>
+      <p:nvGrpSpPr>
+        <p:cNvPr id="1" name=""/>
+        <p:cNvGrpSpPr/>
+        <p:nvPr/>
+      </p:nvGrpSpPr>
+      <p:grpSpPr>
+        <a:xfrm>
+          <a:off x="0" y="0"/>
+          <a:ext cx="0" cy="0"/>
+          <a:chOff x="0" y="0"/>
+          <a:chExt cx="0" cy="0"/>
+        </a:xfrm>
+      </p:grpSpPr>
+      <p:sp>
+        <p:nvSpPr>
+          <p:cNvPr id="2" name="Title 1">
+            <a:extLst>
+              <a:ext uri="{FF2B5EF4-FFF2-40B4-BE49-F238E27FC236}">
                 <a16:creationId xmlns:a16="http://schemas.microsoft.com/office/drawing/2014/main" id="{9690280F-D48C-4DA7-83CA-262070D5AD0D}"/>
               </a:ext>
             </a:extLst>
@@ -14072,7 +14172,7 @@
 </p:sld>
 </file>
 
-<file path=ppt/slides/slide11.xml><?xml version="1.0" encoding="utf-8"?>
+<file path=ppt/slides/slide12.xml><?xml version="1.0" encoding="utf-8"?>
 <p:sld xmlns:a="http://schemas.openxmlformats.org/drawingml/2006/main" xmlns:r="http://schemas.openxmlformats.org/officeDocument/2006/relationships" xmlns:p="http://schemas.openxmlformats.org/presentationml/2006/main">
   <p:cSld>
     <p:spTree>
@@ -19117,7 +19217,7 @@
           <p:cNvPr id="2" name="Title 1">
             <a:extLst>
               <a:ext uri="{FF2B5EF4-FFF2-40B4-BE49-F238E27FC236}">
-                <a16:creationId xmlns:a16="http://schemas.microsoft.com/office/drawing/2014/main" id="{51AD9371-9B27-4D4D-A7F9-0C5690E2FA4F}"/>
+                <a16:creationId xmlns:a16="http://schemas.microsoft.com/office/drawing/2014/main" id="{14C11569-7A70-8106-28E3-FAD01463ADD7}"/>
               </a:ext>
             </a:extLst>
           </p:cNvPr>
@@ -19131,66 +19231,271 @@
         <p:spPr>
           <a:xfrm>
             <a:off x="588263" y="457200"/>
-            <a:ext cx="11018520" cy="553998"/>
+            <a:ext cx="11018520" cy="1107996"/>
           </a:xfrm>
         </p:spPr>
         <p:txBody>
-          <a:bodyPr wrap="square" anchor="t">
-            <a:normAutofit/>
+          <a:bodyPr/>
+          <a:lstStyle/>
+          <a:p>
+            <a:r>
+              <a:rPr lang="de-DE" dirty="0" err="1"/>
+              <a:t>Verify</a:t>
+            </a:r>
+            <a:r>
+              <a:rPr lang="de-DE" dirty="0"/>
+              <a:t> Business Partner </a:t>
+            </a:r>
+            <a:r>
+              <a:rPr lang="de-DE" dirty="0" err="1"/>
+              <a:t>Role</a:t>
+            </a:r>
+            <a:r>
+              <a:rPr lang="de-DE" dirty="0"/>
+              <a:t> </a:t>
+            </a:r>
+            <a:r>
+              <a:rPr lang="de-DE" dirty="0" err="1"/>
+              <a:t>before</a:t>
+            </a:r>
+            <a:r>
+              <a:rPr lang="de-DE" dirty="0"/>
+              <a:t> </a:t>
+            </a:r>
+            <a:r>
+              <a:rPr lang="de-DE" dirty="0" err="1"/>
+              <a:t>updating</a:t>
+            </a:r>
+            <a:r>
+              <a:rPr lang="de-DE" dirty="0"/>
+              <a:t> </a:t>
+            </a:r>
+            <a:r>
+              <a:rPr lang="de-DE" dirty="0" err="1"/>
+              <a:t>from</a:t>
+            </a:r>
+            <a:r>
+              <a:rPr lang="de-DE" dirty="0"/>
+              <a:t> PowerBI</a:t>
+            </a:r>
+            <a:endParaRPr lang="en-DE" dirty="0"/>
+          </a:p>
+        </p:txBody>
+      </p:sp>
+      <p:pic>
+        <p:nvPicPr>
+          <p:cNvPr id="5" name="Picture 4">
+            <a:extLst>
+              <a:ext uri="{FF2B5EF4-FFF2-40B4-BE49-F238E27FC236}">
+                <a16:creationId xmlns:a16="http://schemas.microsoft.com/office/drawing/2014/main" id="{B6C56BA8-275F-54FF-FA2D-10A35B3CA153}"/>
+              </a:ext>
+            </a:extLst>
+          </p:cNvPr>
+          <p:cNvPicPr>
+            <a:picLocks noChangeAspect="1"/>
+          </p:cNvPicPr>
+          <p:nvPr/>
+        </p:nvPicPr>
+        <p:blipFill>
+          <a:blip r:embed="rId2"/>
+          <a:stretch>
+            <a:fillRect/>
+          </a:stretch>
+        </p:blipFill>
+        <p:spPr>
+          <a:xfrm>
+            <a:off x="1506071" y="2989042"/>
+            <a:ext cx="3708750" cy="1604389"/>
+          </a:xfrm>
+          <a:prstGeom prst="rect">
+            <a:avLst/>
+          </a:prstGeom>
+        </p:spPr>
+      </p:pic>
+      <p:pic>
+        <p:nvPicPr>
+          <p:cNvPr id="7" name="Picture 6">
+            <a:extLst>
+              <a:ext uri="{FF2B5EF4-FFF2-40B4-BE49-F238E27FC236}">
+                <a16:creationId xmlns:a16="http://schemas.microsoft.com/office/drawing/2014/main" id="{0CA2AA64-70C7-A7D0-AFF3-A27CFB2A0804}"/>
+              </a:ext>
+            </a:extLst>
+          </p:cNvPr>
+          <p:cNvPicPr>
+            <a:picLocks noChangeAspect="1"/>
+          </p:cNvPicPr>
+          <p:nvPr/>
+        </p:nvPicPr>
+        <p:blipFill>
+          <a:blip r:embed="rId3"/>
+          <a:stretch>
+            <a:fillRect/>
+          </a:stretch>
+        </p:blipFill>
+        <p:spPr>
+          <a:xfrm>
+            <a:off x="6351889" y="2975196"/>
+            <a:ext cx="3317256" cy="1628593"/>
+          </a:xfrm>
+          <a:prstGeom prst="rect">
+            <a:avLst/>
+          </a:prstGeom>
+        </p:spPr>
+      </p:pic>
+      <p:sp>
+        <p:nvSpPr>
+          <p:cNvPr id="8" name="Arrow: Chevron 7">
+            <a:extLst>
+              <a:ext uri="{FF2B5EF4-FFF2-40B4-BE49-F238E27FC236}">
+                <a16:creationId xmlns:a16="http://schemas.microsoft.com/office/drawing/2014/main" id="{48D43098-84D3-0335-08C8-84962E57EF0B}"/>
+              </a:ext>
+            </a:extLst>
+          </p:cNvPr>
+          <p:cNvSpPr/>
+          <p:nvPr/>
+        </p:nvSpPr>
+        <p:spPr bwMode="auto">
+          <a:xfrm>
+            <a:off x="5661518" y="3500438"/>
+            <a:ext cx="357188" cy="553998"/>
+          </a:xfrm>
+          <a:prstGeom prst="chevron">
+            <a:avLst/>
+          </a:prstGeom>
+          <a:solidFill>
+            <a:schemeClr val="bg1">
+              <a:lumMod val="50000"/>
+            </a:schemeClr>
+          </a:solidFill>
+          <a:ln>
+            <a:noFill/>
+            <a:headEnd type="none" w="med" len="med"/>
+            <a:tailEnd type="none" w="med" len="med"/>
+          </a:ln>
+          <a:effectLst/>
+        </p:spPr>
+        <p:style>
+          <a:lnRef idx="1">
+            <a:schemeClr val="accent2"/>
+          </a:lnRef>
+          <a:fillRef idx="3">
+            <a:schemeClr val="accent2"/>
+          </a:fillRef>
+          <a:effectRef idx="2">
+            <a:schemeClr val="accent2"/>
+          </a:effectRef>
+          <a:fontRef idx="minor">
+            <a:schemeClr val="lt1"/>
+          </a:fontRef>
+        </p:style>
+        <p:txBody>
+          <a:bodyPr rot="0" spcFirstLastPara="0" vertOverflow="overflow" horzOverflow="overflow" vert="horz" wrap="square" lIns="182880" tIns="146304" rIns="182880" bIns="146304" numCol="1" spcCol="0" rtlCol="0" fromWordArt="0" anchor="t" anchorCtr="0" forceAA="0" compatLnSpc="1">
+            <a:prstTxWarp prst="textNoShape">
+              <a:avLst/>
+            </a:prstTxWarp>
+            <a:noAutofit/>
           </a:bodyPr>
           <a:lstStyle/>
           <a:p>
-            <a:r>
-              <a:rPr lang="en-BE" dirty="0"/>
-              <a:t>Architecture Setup</a:t>
-            </a:r>
+            <a:pPr algn="l" defTabSz="932472" fontAlgn="base">
+              <a:spcBef>
+                <a:spcPct val="0"/>
+              </a:spcBef>
+              <a:spcAft>
+                <a:spcPct val="0"/>
+              </a:spcAft>
+            </a:pPr>
+            <a:endParaRPr lang="en-DE" sz="2000" dirty="0" err="1">
+              <a:solidFill>
+                <a:srgbClr val="FFFFFF"/>
+              </a:solidFill>
+              <a:ea typeface="Segoe UI" pitchFamily="34" charset="0"/>
+              <a:cs typeface="Segoe UI" pitchFamily="34" charset="0"/>
+            </a:endParaRPr>
           </a:p>
         </p:txBody>
       </p:sp>
-      <p:graphicFrame>
-        <p:nvGraphicFramePr>
-          <p:cNvPr id="7" name="Content Placeholder 2">
-            <a:extLst>
-              <a:ext uri="{FF2B5EF4-FFF2-40B4-BE49-F238E27FC236}">
-                <a16:creationId xmlns:a16="http://schemas.microsoft.com/office/drawing/2014/main" id="{7ACAE881-2A15-4EF5-A2E1-95E958C3B748}"/>
-              </a:ext>
-            </a:extLst>
-          </p:cNvPr>
-          <p:cNvGraphicFramePr>
-            <a:graphicFrameLocks noGrp="1"/>
-          </p:cNvGraphicFramePr>
-          <p:nvPr>
-            <p:ph sz="quarter" idx="10"/>
-            <p:extLst>
-              <p:ext uri="{D42A27DB-BD31-4B8C-83A1-F6EECF244321}">
-                <p14:modId xmlns:p14="http://schemas.microsoft.com/office/powerpoint/2010/main" val="1427548940"/>
-              </p:ext>
-            </p:extLst>
-          </p:nvPr>
-        </p:nvGraphicFramePr>
-        <p:xfrm>
-          <a:off x="584200" y="1435100"/>
-          <a:ext cx="11018838" cy="4833938"/>
-        </p:xfrm>
-        <a:graphic>
-          <a:graphicData uri="http://schemas.openxmlformats.org/drawingml/2006/diagram">
-            <dgm:relIds xmlns:dgm="http://schemas.openxmlformats.org/drawingml/2006/diagram" xmlns:r="http://schemas.openxmlformats.org/officeDocument/2006/relationships" r:dm="rId2" r:lo="rId3" r:qs="rId4" r:cs="rId5"/>
-          </a:graphicData>
-        </a:graphic>
-      </p:graphicFrame>
+      <p:sp>
+        <p:nvSpPr>
+          <p:cNvPr id="9" name="Rectangle 8">
+            <a:extLst>
+              <a:ext uri="{FF2B5EF4-FFF2-40B4-BE49-F238E27FC236}">
+                <a16:creationId xmlns:a16="http://schemas.microsoft.com/office/drawing/2014/main" id="{ADC7885C-E5E8-FC8B-2CA5-ADF1FEBDE96E}"/>
+              </a:ext>
+            </a:extLst>
+          </p:cNvPr>
+          <p:cNvSpPr/>
+          <p:nvPr/>
+        </p:nvSpPr>
+        <p:spPr bwMode="auto">
+          <a:xfrm>
+            <a:off x="8909387" y="4403912"/>
+            <a:ext cx="604404" cy="189519"/>
+          </a:xfrm>
+          <a:prstGeom prst="rect">
+            <a:avLst/>
+          </a:prstGeom>
+          <a:noFill/>
+          <a:ln w="38100">
+            <a:solidFill>
+              <a:srgbClr val="FF0000"/>
+            </a:solidFill>
+            <a:headEnd type="none" w="med" len="med"/>
+            <a:tailEnd type="none" w="med" len="med"/>
+          </a:ln>
+          <a:effectLst/>
+        </p:spPr>
+        <p:style>
+          <a:lnRef idx="1">
+            <a:schemeClr val="accent2"/>
+          </a:lnRef>
+          <a:fillRef idx="3">
+            <a:schemeClr val="accent2"/>
+          </a:fillRef>
+          <a:effectRef idx="2">
+            <a:schemeClr val="accent2"/>
+          </a:effectRef>
+          <a:fontRef idx="minor">
+            <a:schemeClr val="lt1"/>
+          </a:fontRef>
+        </p:style>
+        <p:txBody>
+          <a:bodyPr rot="0" spcFirstLastPara="0" vertOverflow="overflow" horzOverflow="overflow" vert="horz" wrap="square" lIns="182880" tIns="146304" rIns="182880" bIns="146304" numCol="1" spcCol="0" rtlCol="0" fromWordArt="0" anchor="t" anchorCtr="0" forceAA="0" compatLnSpc="1">
+            <a:prstTxWarp prst="textNoShape">
+              <a:avLst/>
+            </a:prstTxWarp>
+            <a:noAutofit/>
+          </a:bodyPr>
+          <a:lstStyle/>
+          <a:p>
+            <a:pPr algn="l" defTabSz="932472" fontAlgn="base">
+              <a:spcBef>
+                <a:spcPct val="0"/>
+              </a:spcBef>
+              <a:spcAft>
+                <a:spcPct val="0"/>
+              </a:spcAft>
+            </a:pPr>
+            <a:endParaRPr lang="en-DE" sz="2000" dirty="0" err="1">
+              <a:solidFill>
+                <a:srgbClr val="FFFFFF"/>
+              </a:solidFill>
+              <a:ea typeface="Segoe UI" pitchFamily="34" charset="0"/>
+              <a:cs typeface="Segoe UI" pitchFamily="34" charset="0"/>
+            </a:endParaRPr>
+          </a:p>
+        </p:txBody>
+      </p:sp>
     </p:spTree>
     <p:extLst>
       <p:ext uri="{BB962C8B-B14F-4D97-AF65-F5344CB8AC3E}">
-        <p14:creationId xmlns:p14="http://schemas.microsoft.com/office/powerpoint/2010/main" val="4112841600"/>
+        <p14:creationId xmlns:p14="http://schemas.microsoft.com/office/powerpoint/2010/main" val="1415010808"/>
       </p:ext>
     </p:extLst>
   </p:cSld>
   <p:clrMapOvr>
     <a:masterClrMapping/>
   </p:clrMapOvr>
-  <p:transition>
-    <p:fade/>
-  </p:transition>
 </p:sld>
 </file>
 

</xml_diff>

<commit_message>
overview img dark version
</commit_message>
<xml_diff>
--- a/SAP-Data-MicroHack.pptx
+++ b/SAP-Data-MicroHack.pptx
@@ -8,15 +8,16 @@
     <p:sldId id="256" r:id="rId2"/>
     <p:sldId id="265" r:id="rId3"/>
     <p:sldId id="257" r:id="rId4"/>
-    <p:sldId id="259" r:id="rId5"/>
-    <p:sldId id="272" r:id="rId6"/>
-    <p:sldId id="270" r:id="rId7"/>
-    <p:sldId id="264" r:id="rId8"/>
-    <p:sldId id="268" r:id="rId9"/>
-    <p:sldId id="273" r:id="rId10"/>
-    <p:sldId id="258" r:id="rId11"/>
-    <p:sldId id="260" r:id="rId12"/>
-    <p:sldId id="271" r:id="rId13"/>
+    <p:sldId id="274" r:id="rId5"/>
+    <p:sldId id="259" r:id="rId6"/>
+    <p:sldId id="272" r:id="rId7"/>
+    <p:sldId id="270" r:id="rId8"/>
+    <p:sldId id="264" r:id="rId9"/>
+    <p:sldId id="268" r:id="rId10"/>
+    <p:sldId id="273" r:id="rId11"/>
+    <p:sldId id="258" r:id="rId12"/>
+    <p:sldId id="260" r:id="rId13"/>
+    <p:sldId id="271" r:id="rId14"/>
   </p:sldIdLst>
   <p:sldSz cx="12192000" cy="6858000"/>
   <p:notesSz cx="6858000" cy="9144000"/>
@@ -9998,7 +9999,7 @@
           <a:p>
             <a:fld id="{52886E62-62E8-476F-BA0C-83330FBF2326}" type="datetimeFigureOut">
               <a:rPr lang="en-BE" smtClean="0"/>
-              <a:t>06/01/2022</a:t>
+              <a:t>06/03/2022</a:t>
             </a:fld>
             <a:endParaRPr lang="en-BE"/>
           </a:p>
@@ -10168,7 +10169,7 @@
           <a:p>
             <a:fld id="{52886E62-62E8-476F-BA0C-83330FBF2326}" type="datetimeFigureOut">
               <a:rPr lang="en-BE" smtClean="0"/>
-              <a:t>06/01/2022</a:t>
+              <a:t>06/03/2022</a:t>
             </a:fld>
             <a:endParaRPr lang="en-BE"/>
           </a:p>
@@ -13944,6 +13945,514 @@
           <p:cNvPr id="2" name="Title 1">
             <a:extLst>
               <a:ext uri="{FF2B5EF4-FFF2-40B4-BE49-F238E27FC236}">
+                <a16:creationId xmlns:a16="http://schemas.microsoft.com/office/drawing/2014/main" id="{14C11569-7A70-8106-28E3-FAD01463ADD7}"/>
+              </a:ext>
+            </a:extLst>
+          </p:cNvPr>
+          <p:cNvSpPr>
+            <a:spLocks noGrp="1"/>
+          </p:cNvSpPr>
+          <p:nvPr>
+            <p:ph type="title"/>
+          </p:nvPr>
+        </p:nvSpPr>
+        <p:spPr>
+          <a:xfrm>
+            <a:off x="588263" y="457200"/>
+            <a:ext cx="11018520" cy="1107996"/>
+          </a:xfrm>
+        </p:spPr>
+        <p:txBody>
+          <a:bodyPr/>
+          <a:lstStyle/>
+          <a:p>
+            <a:r>
+              <a:rPr lang="de-DE" dirty="0" err="1"/>
+              <a:t>Verify</a:t>
+            </a:r>
+            <a:r>
+              <a:rPr lang="de-DE" dirty="0"/>
+              <a:t> Business Partner </a:t>
+            </a:r>
+            <a:r>
+              <a:rPr lang="de-DE" dirty="0" err="1"/>
+              <a:t>Role</a:t>
+            </a:r>
+            <a:r>
+              <a:rPr lang="de-DE" dirty="0"/>
+              <a:t> </a:t>
+            </a:r>
+            <a:r>
+              <a:rPr lang="de-DE" dirty="0" err="1"/>
+              <a:t>before</a:t>
+            </a:r>
+            <a:r>
+              <a:rPr lang="de-DE" dirty="0"/>
+              <a:t> </a:t>
+            </a:r>
+            <a:r>
+              <a:rPr lang="de-DE" dirty="0" err="1"/>
+              <a:t>updating</a:t>
+            </a:r>
+            <a:r>
+              <a:rPr lang="de-DE" dirty="0"/>
+              <a:t> </a:t>
+            </a:r>
+            <a:r>
+              <a:rPr lang="de-DE" dirty="0" err="1"/>
+              <a:t>from</a:t>
+            </a:r>
+            <a:r>
+              <a:rPr lang="de-DE" dirty="0"/>
+              <a:t> PowerBI</a:t>
+            </a:r>
+            <a:endParaRPr lang="en-DE" dirty="0"/>
+          </a:p>
+        </p:txBody>
+      </p:sp>
+      <p:pic>
+        <p:nvPicPr>
+          <p:cNvPr id="5" name="Picture 4">
+            <a:extLst>
+              <a:ext uri="{FF2B5EF4-FFF2-40B4-BE49-F238E27FC236}">
+                <a16:creationId xmlns:a16="http://schemas.microsoft.com/office/drawing/2014/main" id="{B6C56BA8-275F-54FF-FA2D-10A35B3CA153}"/>
+              </a:ext>
+            </a:extLst>
+          </p:cNvPr>
+          <p:cNvPicPr>
+            <a:picLocks noChangeAspect="1"/>
+          </p:cNvPicPr>
+          <p:nvPr/>
+        </p:nvPicPr>
+        <p:blipFill>
+          <a:blip r:embed="rId2"/>
+          <a:stretch>
+            <a:fillRect/>
+          </a:stretch>
+        </p:blipFill>
+        <p:spPr>
+          <a:xfrm>
+            <a:off x="1506071" y="2989042"/>
+            <a:ext cx="3708750" cy="1604389"/>
+          </a:xfrm>
+          <a:prstGeom prst="rect">
+            <a:avLst/>
+          </a:prstGeom>
+        </p:spPr>
+      </p:pic>
+      <p:pic>
+        <p:nvPicPr>
+          <p:cNvPr id="7" name="Picture 6">
+            <a:extLst>
+              <a:ext uri="{FF2B5EF4-FFF2-40B4-BE49-F238E27FC236}">
+                <a16:creationId xmlns:a16="http://schemas.microsoft.com/office/drawing/2014/main" id="{0CA2AA64-70C7-A7D0-AFF3-A27CFB2A0804}"/>
+              </a:ext>
+            </a:extLst>
+          </p:cNvPr>
+          <p:cNvPicPr>
+            <a:picLocks noChangeAspect="1"/>
+          </p:cNvPicPr>
+          <p:nvPr/>
+        </p:nvPicPr>
+        <p:blipFill>
+          <a:blip r:embed="rId3"/>
+          <a:stretch>
+            <a:fillRect/>
+          </a:stretch>
+        </p:blipFill>
+        <p:spPr>
+          <a:xfrm>
+            <a:off x="6351889" y="2975196"/>
+            <a:ext cx="3317256" cy="1628593"/>
+          </a:xfrm>
+          <a:prstGeom prst="rect">
+            <a:avLst/>
+          </a:prstGeom>
+        </p:spPr>
+      </p:pic>
+      <p:sp>
+        <p:nvSpPr>
+          <p:cNvPr id="8" name="Arrow: Chevron 7">
+            <a:extLst>
+              <a:ext uri="{FF2B5EF4-FFF2-40B4-BE49-F238E27FC236}">
+                <a16:creationId xmlns:a16="http://schemas.microsoft.com/office/drawing/2014/main" id="{48D43098-84D3-0335-08C8-84962E57EF0B}"/>
+              </a:ext>
+            </a:extLst>
+          </p:cNvPr>
+          <p:cNvSpPr/>
+          <p:nvPr/>
+        </p:nvSpPr>
+        <p:spPr bwMode="auto">
+          <a:xfrm>
+            <a:off x="5661518" y="3500438"/>
+            <a:ext cx="357188" cy="553998"/>
+          </a:xfrm>
+          <a:prstGeom prst="chevron">
+            <a:avLst/>
+          </a:prstGeom>
+          <a:solidFill>
+            <a:schemeClr val="bg1">
+              <a:lumMod val="50000"/>
+            </a:schemeClr>
+          </a:solidFill>
+          <a:ln>
+            <a:noFill/>
+            <a:headEnd type="none" w="med" len="med"/>
+            <a:tailEnd type="none" w="med" len="med"/>
+          </a:ln>
+          <a:effectLst/>
+        </p:spPr>
+        <p:style>
+          <a:lnRef idx="1">
+            <a:schemeClr val="accent2"/>
+          </a:lnRef>
+          <a:fillRef idx="3">
+            <a:schemeClr val="accent2"/>
+          </a:fillRef>
+          <a:effectRef idx="2">
+            <a:schemeClr val="accent2"/>
+          </a:effectRef>
+          <a:fontRef idx="minor">
+            <a:schemeClr val="lt1"/>
+          </a:fontRef>
+        </p:style>
+        <p:txBody>
+          <a:bodyPr rot="0" spcFirstLastPara="0" vertOverflow="overflow" horzOverflow="overflow" vert="horz" wrap="square" lIns="182880" tIns="146304" rIns="182880" bIns="146304" numCol="1" spcCol="0" rtlCol="0" fromWordArt="0" anchor="t" anchorCtr="0" forceAA="0" compatLnSpc="1">
+            <a:prstTxWarp prst="textNoShape">
+              <a:avLst/>
+            </a:prstTxWarp>
+            <a:noAutofit/>
+          </a:bodyPr>
+          <a:lstStyle/>
+          <a:p>
+            <a:pPr algn="l" defTabSz="932472" fontAlgn="base">
+              <a:spcBef>
+                <a:spcPct val="0"/>
+              </a:spcBef>
+              <a:spcAft>
+                <a:spcPct val="0"/>
+              </a:spcAft>
+            </a:pPr>
+            <a:endParaRPr lang="en-DE" sz="2000" dirty="0" err="1">
+              <a:solidFill>
+                <a:srgbClr val="FFFFFF"/>
+              </a:solidFill>
+              <a:ea typeface="Segoe UI" pitchFamily="34" charset="0"/>
+              <a:cs typeface="Segoe UI" pitchFamily="34" charset="0"/>
+            </a:endParaRPr>
+          </a:p>
+        </p:txBody>
+      </p:sp>
+      <p:sp>
+        <p:nvSpPr>
+          <p:cNvPr id="9" name="Rectangle 8">
+            <a:extLst>
+              <a:ext uri="{FF2B5EF4-FFF2-40B4-BE49-F238E27FC236}">
+                <a16:creationId xmlns:a16="http://schemas.microsoft.com/office/drawing/2014/main" id="{ADC7885C-E5E8-FC8B-2CA5-ADF1FEBDE96E}"/>
+              </a:ext>
+            </a:extLst>
+          </p:cNvPr>
+          <p:cNvSpPr/>
+          <p:nvPr/>
+        </p:nvSpPr>
+        <p:spPr bwMode="auto">
+          <a:xfrm>
+            <a:off x="8909387" y="4403912"/>
+            <a:ext cx="604404" cy="189519"/>
+          </a:xfrm>
+          <a:prstGeom prst="rect">
+            <a:avLst/>
+          </a:prstGeom>
+          <a:noFill/>
+          <a:ln w="38100">
+            <a:solidFill>
+              <a:srgbClr val="FF0000"/>
+            </a:solidFill>
+            <a:headEnd type="none" w="med" len="med"/>
+            <a:tailEnd type="none" w="med" len="med"/>
+          </a:ln>
+          <a:effectLst/>
+        </p:spPr>
+        <p:style>
+          <a:lnRef idx="1">
+            <a:schemeClr val="accent2"/>
+          </a:lnRef>
+          <a:fillRef idx="3">
+            <a:schemeClr val="accent2"/>
+          </a:fillRef>
+          <a:effectRef idx="2">
+            <a:schemeClr val="accent2"/>
+          </a:effectRef>
+          <a:fontRef idx="minor">
+            <a:schemeClr val="lt1"/>
+          </a:fontRef>
+        </p:style>
+        <p:txBody>
+          <a:bodyPr rot="0" spcFirstLastPara="0" vertOverflow="overflow" horzOverflow="overflow" vert="horz" wrap="square" lIns="182880" tIns="146304" rIns="182880" bIns="146304" numCol="1" spcCol="0" rtlCol="0" fromWordArt="0" anchor="t" anchorCtr="0" forceAA="0" compatLnSpc="1">
+            <a:prstTxWarp prst="textNoShape">
+              <a:avLst/>
+            </a:prstTxWarp>
+            <a:noAutofit/>
+          </a:bodyPr>
+          <a:lstStyle/>
+          <a:p>
+            <a:pPr algn="l" defTabSz="932472" fontAlgn="base">
+              <a:spcBef>
+                <a:spcPct val="0"/>
+              </a:spcBef>
+              <a:spcAft>
+                <a:spcPct val="0"/>
+              </a:spcAft>
+            </a:pPr>
+            <a:endParaRPr lang="en-DE" sz="2000" dirty="0" err="1">
+              <a:solidFill>
+                <a:srgbClr val="FFFFFF"/>
+              </a:solidFill>
+              <a:ea typeface="Segoe UI" pitchFamily="34" charset="0"/>
+              <a:cs typeface="Segoe UI" pitchFamily="34" charset="0"/>
+            </a:endParaRPr>
+          </a:p>
+        </p:txBody>
+      </p:sp>
+      <p:pic>
+        <p:nvPicPr>
+          <p:cNvPr id="4" name="Picture 3">
+            <a:extLst>
+              <a:ext uri="{FF2B5EF4-FFF2-40B4-BE49-F238E27FC236}">
+                <a16:creationId xmlns:a16="http://schemas.microsoft.com/office/drawing/2014/main" id="{6BE1BEA8-1B45-C123-7CB2-040E0E12DDF9}"/>
+              </a:ext>
+            </a:extLst>
+          </p:cNvPr>
+          <p:cNvPicPr>
+            <a:picLocks noChangeAspect="1"/>
+          </p:cNvPicPr>
+          <p:nvPr/>
+        </p:nvPicPr>
+        <p:blipFill>
+          <a:blip r:embed="rId4"/>
+          <a:stretch>
+            <a:fillRect/>
+          </a:stretch>
+        </p:blipFill>
+        <p:spPr>
+          <a:xfrm>
+            <a:off x="6351889" y="4785771"/>
+            <a:ext cx="3531699" cy="1615029"/>
+          </a:xfrm>
+          <a:prstGeom prst="rect">
+            <a:avLst/>
+          </a:prstGeom>
+        </p:spPr>
+      </p:pic>
+      <p:sp>
+        <p:nvSpPr>
+          <p:cNvPr id="6" name="Rectangle 5">
+            <a:extLst>
+              <a:ext uri="{FF2B5EF4-FFF2-40B4-BE49-F238E27FC236}">
+                <a16:creationId xmlns:a16="http://schemas.microsoft.com/office/drawing/2014/main" id="{12849B09-3EF8-9171-785A-4AB75D8F3838}"/>
+              </a:ext>
+            </a:extLst>
+          </p:cNvPr>
+          <p:cNvSpPr/>
+          <p:nvPr/>
+        </p:nvSpPr>
+        <p:spPr bwMode="auto">
+          <a:xfrm>
+            <a:off x="9192130" y="6116170"/>
+            <a:ext cx="604404" cy="189519"/>
+          </a:xfrm>
+          <a:prstGeom prst="rect">
+            <a:avLst/>
+          </a:prstGeom>
+          <a:noFill/>
+          <a:ln w="38100">
+            <a:solidFill>
+              <a:srgbClr val="FF0000"/>
+            </a:solidFill>
+            <a:headEnd type="none" w="med" len="med"/>
+            <a:tailEnd type="none" w="med" len="med"/>
+          </a:ln>
+          <a:effectLst/>
+        </p:spPr>
+        <p:style>
+          <a:lnRef idx="1">
+            <a:schemeClr val="accent2"/>
+          </a:lnRef>
+          <a:fillRef idx="3">
+            <a:schemeClr val="accent2"/>
+          </a:fillRef>
+          <a:effectRef idx="2">
+            <a:schemeClr val="accent2"/>
+          </a:effectRef>
+          <a:fontRef idx="minor">
+            <a:schemeClr val="lt1"/>
+          </a:fontRef>
+        </p:style>
+        <p:txBody>
+          <a:bodyPr rot="0" spcFirstLastPara="0" vertOverflow="overflow" horzOverflow="overflow" vert="horz" wrap="square" lIns="182880" tIns="146304" rIns="182880" bIns="146304" numCol="1" spcCol="0" rtlCol="0" fromWordArt="0" anchor="t" anchorCtr="0" forceAA="0" compatLnSpc="1">
+            <a:prstTxWarp prst="textNoShape">
+              <a:avLst/>
+            </a:prstTxWarp>
+            <a:noAutofit/>
+          </a:bodyPr>
+          <a:lstStyle/>
+          <a:p>
+            <a:pPr algn="l" defTabSz="932472" fontAlgn="base">
+              <a:spcBef>
+                <a:spcPct val="0"/>
+              </a:spcBef>
+              <a:spcAft>
+                <a:spcPct val="0"/>
+              </a:spcAft>
+            </a:pPr>
+            <a:endParaRPr lang="en-DE" sz="2000" dirty="0" err="1">
+              <a:solidFill>
+                <a:srgbClr val="FFFFFF"/>
+              </a:solidFill>
+              <a:ea typeface="Segoe UI" pitchFamily="34" charset="0"/>
+              <a:cs typeface="Segoe UI" pitchFamily="34" charset="0"/>
+            </a:endParaRPr>
+          </a:p>
+        </p:txBody>
+      </p:sp>
+      <p:pic>
+        <p:nvPicPr>
+          <p:cNvPr id="12" name="Picture 11">
+            <a:extLst>
+              <a:ext uri="{FF2B5EF4-FFF2-40B4-BE49-F238E27FC236}">
+                <a16:creationId xmlns:a16="http://schemas.microsoft.com/office/drawing/2014/main" id="{D0B437DF-A5C9-029B-D59A-4D3F98322115}"/>
+              </a:ext>
+            </a:extLst>
+          </p:cNvPr>
+          <p:cNvPicPr>
+            <a:picLocks noChangeAspect="1"/>
+          </p:cNvPicPr>
+          <p:nvPr/>
+        </p:nvPicPr>
+        <p:blipFill>
+          <a:blip r:embed="rId2"/>
+          <a:stretch>
+            <a:fillRect/>
+          </a:stretch>
+        </p:blipFill>
+        <p:spPr>
+          <a:xfrm>
+            <a:off x="1506071" y="4796411"/>
+            <a:ext cx="3708750" cy="1604389"/>
+          </a:xfrm>
+          <a:prstGeom prst="rect">
+            <a:avLst/>
+          </a:prstGeom>
+        </p:spPr>
+      </p:pic>
+      <p:sp>
+        <p:nvSpPr>
+          <p:cNvPr id="14" name="Arrow: Chevron 13">
+            <a:extLst>
+              <a:ext uri="{FF2B5EF4-FFF2-40B4-BE49-F238E27FC236}">
+                <a16:creationId xmlns:a16="http://schemas.microsoft.com/office/drawing/2014/main" id="{260C37FD-5D58-CD8D-C8EE-1A2EB1F5F356}"/>
+              </a:ext>
+            </a:extLst>
+          </p:cNvPr>
+          <p:cNvSpPr/>
+          <p:nvPr/>
+        </p:nvSpPr>
+        <p:spPr bwMode="auto">
+          <a:xfrm>
+            <a:off x="5661518" y="5246314"/>
+            <a:ext cx="357188" cy="553998"/>
+          </a:xfrm>
+          <a:prstGeom prst="chevron">
+            <a:avLst/>
+          </a:prstGeom>
+          <a:solidFill>
+            <a:schemeClr val="bg1">
+              <a:lumMod val="50000"/>
+            </a:schemeClr>
+          </a:solidFill>
+          <a:ln>
+            <a:noFill/>
+            <a:headEnd type="none" w="med" len="med"/>
+            <a:tailEnd type="none" w="med" len="med"/>
+          </a:ln>
+          <a:effectLst/>
+        </p:spPr>
+        <p:style>
+          <a:lnRef idx="1">
+            <a:schemeClr val="accent2"/>
+          </a:lnRef>
+          <a:fillRef idx="3">
+            <a:schemeClr val="accent2"/>
+          </a:fillRef>
+          <a:effectRef idx="2">
+            <a:schemeClr val="accent2"/>
+          </a:effectRef>
+          <a:fontRef idx="minor">
+            <a:schemeClr val="lt1"/>
+          </a:fontRef>
+        </p:style>
+        <p:txBody>
+          <a:bodyPr rot="0" spcFirstLastPara="0" vertOverflow="overflow" horzOverflow="overflow" vert="horz" wrap="square" lIns="182880" tIns="146304" rIns="182880" bIns="146304" numCol="1" spcCol="0" rtlCol="0" fromWordArt="0" anchor="t" anchorCtr="0" forceAA="0" compatLnSpc="1">
+            <a:prstTxWarp prst="textNoShape">
+              <a:avLst/>
+            </a:prstTxWarp>
+            <a:noAutofit/>
+          </a:bodyPr>
+          <a:lstStyle/>
+          <a:p>
+            <a:pPr algn="l" defTabSz="932472" fontAlgn="base">
+              <a:spcBef>
+                <a:spcPct val="0"/>
+              </a:spcBef>
+              <a:spcAft>
+                <a:spcPct val="0"/>
+              </a:spcAft>
+            </a:pPr>
+            <a:endParaRPr lang="en-DE" sz="2000" dirty="0" err="1">
+              <a:solidFill>
+                <a:srgbClr val="FFFFFF"/>
+              </a:solidFill>
+              <a:ea typeface="Segoe UI" pitchFamily="34" charset="0"/>
+              <a:cs typeface="Segoe UI" pitchFamily="34" charset="0"/>
+            </a:endParaRPr>
+          </a:p>
+        </p:txBody>
+      </p:sp>
+    </p:spTree>
+    <p:extLst>
+      <p:ext uri="{BB962C8B-B14F-4D97-AF65-F5344CB8AC3E}">
+        <p14:creationId xmlns:p14="http://schemas.microsoft.com/office/powerpoint/2010/main" val="1415010808"/>
+      </p:ext>
+    </p:extLst>
+  </p:cSld>
+  <p:clrMapOvr>
+    <a:masterClrMapping/>
+  </p:clrMapOvr>
+</p:sld>
+</file>
+
+<file path=ppt/slides/slide11.xml><?xml version="1.0" encoding="utf-8"?>
+<p:sld xmlns:a="http://schemas.openxmlformats.org/drawingml/2006/main" xmlns:r="http://schemas.openxmlformats.org/officeDocument/2006/relationships" xmlns:p="http://schemas.openxmlformats.org/presentationml/2006/main">
+  <p:cSld>
+    <p:spTree>
+      <p:nvGrpSpPr>
+        <p:cNvPr id="1" name=""/>
+        <p:cNvGrpSpPr/>
+        <p:nvPr/>
+      </p:nvGrpSpPr>
+      <p:grpSpPr>
+        <a:xfrm>
+          <a:off x="0" y="0"/>
+          <a:ext cx="0" cy="0"/>
+          <a:chOff x="0" y="0"/>
+          <a:chExt cx="0" cy="0"/>
+        </a:xfrm>
+      </p:grpSpPr>
+      <p:sp>
+        <p:nvSpPr>
+          <p:cNvPr id="2" name="Title 1">
+            <a:extLst>
+              <a:ext uri="{FF2B5EF4-FFF2-40B4-BE49-F238E27FC236}">
                 <a16:creationId xmlns:a16="http://schemas.microsoft.com/office/drawing/2014/main" id="{51AD9371-9B27-4D4D-A7F9-0C5690E2FA4F}"/>
               </a:ext>
             </a:extLst>
@@ -14021,7 +14530,7 @@
 </p:sld>
 </file>
 
-<file path=ppt/slides/slide11.xml><?xml version="1.0" encoding="utf-8"?>
+<file path=ppt/slides/slide12.xml><?xml version="1.0" encoding="utf-8"?>
 <p:sld xmlns:a="http://schemas.openxmlformats.org/drawingml/2006/main" xmlns:r="http://schemas.openxmlformats.org/officeDocument/2006/relationships" xmlns:p="http://schemas.openxmlformats.org/presentationml/2006/main">
   <p:cSld>
     <p:spTree>
@@ -14172,7 +14681,7 @@
 </p:sld>
 </file>
 
-<file path=ppt/slides/slide12.xml><?xml version="1.0" encoding="utf-8"?>
+<file path=ppt/slides/slide13.xml><?xml version="1.0" encoding="utf-8"?>
 <p:sld xmlns:a="http://schemas.openxmlformats.org/drawingml/2006/main" xmlns:r="http://schemas.openxmlformats.org/officeDocument/2006/relationships" xmlns:p="http://schemas.openxmlformats.org/presentationml/2006/main">
   <p:cSld>
     <p:spTree>
@@ -16513,81 +17022,10 @@
           </a:prstGeom>
         </p:spPr>
       </p:pic>
-      <p:sp>
-        <p:nvSpPr>
-          <p:cNvPr id="5" name="Rectangle 4">
-            <a:extLst>
-              <a:ext uri="{FF2B5EF4-FFF2-40B4-BE49-F238E27FC236}">
-                <a16:creationId xmlns:a16="http://schemas.microsoft.com/office/drawing/2014/main" id="{4F4BE785-B950-FE65-951D-C8EDC5393369}"/>
-              </a:ext>
-            </a:extLst>
-          </p:cNvPr>
-          <p:cNvSpPr/>
-          <p:nvPr/>
-        </p:nvSpPr>
-        <p:spPr bwMode="auto">
-          <a:xfrm>
-            <a:off x="213390" y="2117912"/>
-            <a:ext cx="6422748" cy="2978523"/>
-          </a:xfrm>
-          <a:prstGeom prst="rect">
-            <a:avLst/>
-          </a:prstGeom>
-          <a:noFill/>
-          <a:ln w="28575">
-            <a:solidFill>
-              <a:srgbClr val="FF0000"/>
-            </a:solidFill>
-            <a:headEnd type="none" w="med" len="med"/>
-            <a:tailEnd type="none" w="med" len="med"/>
-          </a:ln>
-          <a:effectLst/>
-        </p:spPr>
-        <p:style>
-          <a:lnRef idx="1">
-            <a:schemeClr val="accent2"/>
-          </a:lnRef>
-          <a:fillRef idx="3">
-            <a:schemeClr val="accent2"/>
-          </a:fillRef>
-          <a:effectRef idx="2">
-            <a:schemeClr val="accent2"/>
-          </a:effectRef>
-          <a:fontRef idx="minor">
-            <a:schemeClr val="lt1"/>
-          </a:fontRef>
-        </p:style>
-        <p:txBody>
-          <a:bodyPr rot="0" spcFirstLastPara="0" vertOverflow="overflow" horzOverflow="overflow" vert="horz" wrap="square" lIns="182880" tIns="146304" rIns="182880" bIns="146304" numCol="1" spcCol="0" rtlCol="0" fromWordArt="0" anchor="t" anchorCtr="0" forceAA="0" compatLnSpc="1">
-            <a:prstTxWarp prst="textNoShape">
-              <a:avLst/>
-            </a:prstTxWarp>
-            <a:noAutofit/>
-          </a:bodyPr>
-          <a:lstStyle/>
-          <a:p>
-            <a:pPr algn="l" defTabSz="932472" fontAlgn="base">
-              <a:spcBef>
-                <a:spcPct val="0"/>
-              </a:spcBef>
-              <a:spcAft>
-                <a:spcPct val="0"/>
-              </a:spcAft>
-            </a:pPr>
-            <a:endParaRPr lang="en-DE" sz="2000" dirty="0" err="1">
-              <a:solidFill>
-                <a:srgbClr val="FFFFFF"/>
-              </a:solidFill>
-              <a:ea typeface="Segoe UI" pitchFamily="34" charset="0"/>
-              <a:cs typeface="Segoe UI" pitchFamily="34" charset="0"/>
-            </a:endParaRPr>
-          </a:p>
-        </p:txBody>
-      </p:sp>
     </p:spTree>
     <p:extLst>
       <p:ext uri="{BB962C8B-B14F-4D97-AF65-F5344CB8AC3E}">
-        <p14:creationId xmlns:p14="http://schemas.microsoft.com/office/powerpoint/2010/main" val="3120669869"/>
+        <p14:creationId xmlns:p14="http://schemas.microsoft.com/office/powerpoint/2010/main" val="924664610"/>
       </p:ext>
     </p:extLst>
   </p:cSld>
@@ -18005,8 +18443,8 @@
         </p:nvSpPr>
         <p:spPr bwMode="auto">
           <a:xfrm>
-            <a:off x="2033045" y="3713942"/>
-            <a:ext cx="825213" cy="401989"/>
+            <a:off x="213390" y="2117912"/>
+            <a:ext cx="6422748" cy="2978523"/>
           </a:xfrm>
           <a:prstGeom prst="rect">
             <a:avLst/>
@@ -18065,7 +18503,7 @@
     </p:spTree>
     <p:extLst>
       <p:ext uri="{BB962C8B-B14F-4D97-AF65-F5344CB8AC3E}">
-        <p14:creationId xmlns:p14="http://schemas.microsoft.com/office/powerpoint/2010/main" val="177521163"/>
+        <p14:creationId xmlns:p14="http://schemas.microsoft.com/office/powerpoint/2010/main" val="3120669869"/>
       </p:ext>
     </p:extLst>
   </p:cSld>
@@ -18170,6 +18608,1484 @@
           <a:chExt cx="0" cy="0"/>
         </a:xfrm>
       </p:grpSpPr>
+      <p:pic>
+        <p:nvPicPr>
+          <p:cNvPr id="8" name="Graphic 7">
+            <a:extLst>
+              <a:ext uri="{FF2B5EF4-FFF2-40B4-BE49-F238E27FC236}">
+                <a16:creationId xmlns:a16="http://schemas.microsoft.com/office/drawing/2014/main" id="{4E646880-7EC2-C772-7E6D-DDA1554E4890}"/>
+              </a:ext>
+            </a:extLst>
+          </p:cNvPr>
+          <p:cNvPicPr>
+            <a:picLocks noChangeAspect="1"/>
+          </p:cNvPicPr>
+          <p:nvPr/>
+        </p:nvPicPr>
+        <p:blipFill>
+          <a:blip r:embed="rId2">
+            <a:extLst>
+              <a:ext uri="{28A0092B-C50C-407E-A947-70E740481C1C}">
+                <a14:useLocalDpi xmlns:a14="http://schemas.microsoft.com/office/drawing/2010/main" val="0"/>
+              </a:ext>
+              <a:ext uri="{96DAC541-7B7A-43D3-8B79-37D633B846F1}">
+                <asvg:svgBlip xmlns:asvg="http://schemas.microsoft.com/office/drawing/2016/SVG/main" r:embed="rId3"/>
+              </a:ext>
+            </a:extLst>
+          </a:blip>
+          <a:stretch>
+            <a:fillRect/>
+          </a:stretch>
+        </p:blipFill>
+        <p:spPr>
+          <a:xfrm>
+            <a:off x="7971745" y="2831454"/>
+            <a:ext cx="814006" cy="814006"/>
+          </a:xfrm>
+          <a:prstGeom prst="rect">
+            <a:avLst/>
+          </a:prstGeom>
+        </p:spPr>
+      </p:pic>
+      <p:sp>
+        <p:nvSpPr>
+          <p:cNvPr id="2" name="Title 1">
+            <a:extLst>
+              <a:ext uri="{FF2B5EF4-FFF2-40B4-BE49-F238E27FC236}">
+                <a16:creationId xmlns:a16="http://schemas.microsoft.com/office/drawing/2014/main" id="{AE671CB7-A2BE-41D2-A840-5D91E33AC3CD}"/>
+              </a:ext>
+            </a:extLst>
+          </p:cNvPr>
+          <p:cNvSpPr>
+            <a:spLocks noGrp="1"/>
+          </p:cNvSpPr>
+          <p:nvPr>
+            <p:ph type="title"/>
+          </p:nvPr>
+        </p:nvSpPr>
+        <p:spPr/>
+        <p:txBody>
+          <a:bodyPr/>
+          <a:lstStyle/>
+          <a:p>
+            <a:r>
+              <a:rPr lang="en-BE" dirty="0"/>
+              <a:t>Architecture Overview</a:t>
+            </a:r>
+          </a:p>
+        </p:txBody>
+      </p:sp>
+      <p:pic>
+        <p:nvPicPr>
+          <p:cNvPr id="7" name="Picture 6" descr="A picture containing clock&#10;&#10;Description automatically generated">
+            <a:extLst>
+              <a:ext uri="{FF2B5EF4-FFF2-40B4-BE49-F238E27FC236}">
+                <a16:creationId xmlns:a16="http://schemas.microsoft.com/office/drawing/2014/main" id="{E28BBEB6-8ADA-435F-8A12-279347D650CD}"/>
+              </a:ext>
+            </a:extLst>
+          </p:cNvPr>
+          <p:cNvPicPr>
+            <a:picLocks noChangeAspect="1"/>
+          </p:cNvPicPr>
+          <p:nvPr/>
+        </p:nvPicPr>
+        <p:blipFill>
+          <a:blip r:embed="rId4"/>
+          <a:stretch>
+            <a:fillRect/>
+          </a:stretch>
+        </p:blipFill>
+        <p:spPr>
+          <a:xfrm>
+            <a:off x="5665592" y="2979325"/>
+            <a:ext cx="611771" cy="611771"/>
+          </a:xfrm>
+          <a:prstGeom prst="rect">
+            <a:avLst/>
+          </a:prstGeom>
+        </p:spPr>
+      </p:pic>
+      <p:pic>
+        <p:nvPicPr>
+          <p:cNvPr id="9" name="Picture 8">
+            <a:extLst>
+              <a:ext uri="{FF2B5EF4-FFF2-40B4-BE49-F238E27FC236}">
+                <a16:creationId xmlns:a16="http://schemas.microsoft.com/office/drawing/2014/main" id="{4C5C1C8C-6095-4CB3-AF30-0A7A163AF85E}"/>
+              </a:ext>
+            </a:extLst>
+          </p:cNvPr>
+          <p:cNvPicPr>
+            <a:picLocks noChangeAspect="1"/>
+          </p:cNvPicPr>
+          <p:nvPr/>
+        </p:nvPicPr>
+        <p:blipFill>
+          <a:blip r:embed="rId5"/>
+          <a:stretch>
+            <a:fillRect/>
+          </a:stretch>
+        </p:blipFill>
+        <p:spPr>
+          <a:xfrm>
+            <a:off x="7398026" y="4115931"/>
+            <a:ext cx="512108" cy="506012"/>
+          </a:xfrm>
+          <a:prstGeom prst="rect">
+            <a:avLst/>
+          </a:prstGeom>
+        </p:spPr>
+      </p:pic>
+      <p:sp>
+        <p:nvSpPr>
+          <p:cNvPr id="12" name="TextBox 11">
+            <a:extLst>
+              <a:ext uri="{FF2B5EF4-FFF2-40B4-BE49-F238E27FC236}">
+                <a16:creationId xmlns:a16="http://schemas.microsoft.com/office/drawing/2014/main" id="{CABBD023-F2DF-4310-AF15-1FA5085761AE}"/>
+              </a:ext>
+            </a:extLst>
+          </p:cNvPr>
+          <p:cNvSpPr txBox="1"/>
+          <p:nvPr/>
+        </p:nvSpPr>
+        <p:spPr>
+          <a:xfrm>
+            <a:off x="7929359" y="3411918"/>
+            <a:ext cx="871201" cy="307777"/>
+          </a:xfrm>
+          <a:prstGeom prst="rect">
+            <a:avLst/>
+          </a:prstGeom>
+          <a:noFill/>
+        </p:spPr>
+        <p:txBody>
+          <a:bodyPr wrap="none" rtlCol="0">
+            <a:spAutoFit/>
+          </a:bodyPr>
+          <a:lstStyle/>
+          <a:p>
+            <a:r>
+              <a:rPr lang="en-BE" sz="1400" dirty="0">
+                <a:solidFill>
+                  <a:schemeClr val="accent1"/>
+                </a:solidFill>
+              </a:rPr>
+              <a:t>Power BI</a:t>
+            </a:r>
+          </a:p>
+        </p:txBody>
+      </p:sp>
+      <p:sp>
+        <p:nvSpPr>
+          <p:cNvPr id="14" name="TextBox 13">
+            <a:extLst>
+              <a:ext uri="{FF2B5EF4-FFF2-40B4-BE49-F238E27FC236}">
+                <a16:creationId xmlns:a16="http://schemas.microsoft.com/office/drawing/2014/main" id="{0D03AE79-053D-4F15-86BD-8F506B2CD4CC}"/>
+              </a:ext>
+            </a:extLst>
+          </p:cNvPr>
+          <p:cNvSpPr txBox="1"/>
+          <p:nvPr/>
+        </p:nvSpPr>
+        <p:spPr>
+          <a:xfrm>
+            <a:off x="6636138" y="4672433"/>
+            <a:ext cx="2097562" cy="307777"/>
+          </a:xfrm>
+          <a:prstGeom prst="rect">
+            <a:avLst/>
+          </a:prstGeom>
+          <a:noFill/>
+        </p:spPr>
+        <p:txBody>
+          <a:bodyPr wrap="none" rtlCol="0">
+            <a:spAutoFit/>
+          </a:bodyPr>
+          <a:lstStyle/>
+          <a:p>
+            <a:r>
+              <a:rPr lang="en-BE" sz="1400" dirty="0">
+                <a:solidFill>
+                  <a:schemeClr val="accent1"/>
+                </a:solidFill>
+              </a:rPr>
+              <a:t>Azure Machine Learning</a:t>
+            </a:r>
+          </a:p>
+        </p:txBody>
+      </p:sp>
+      <p:pic>
+        <p:nvPicPr>
+          <p:cNvPr id="15" name="Graphic 14">
+            <a:extLst>
+              <a:ext uri="{FF2B5EF4-FFF2-40B4-BE49-F238E27FC236}">
+                <a16:creationId xmlns:a16="http://schemas.microsoft.com/office/drawing/2014/main" id="{9D902800-78CD-448D-A222-720D91D24B4D}"/>
+              </a:ext>
+            </a:extLst>
+          </p:cNvPr>
+          <p:cNvPicPr>
+            <a:picLocks noChangeAspect="1"/>
+          </p:cNvPicPr>
+          <p:nvPr/>
+        </p:nvPicPr>
+        <p:blipFill>
+          <a:blip r:embed="rId6">
+            <a:extLst>
+              <a:ext uri="{96DAC541-7B7A-43D3-8B79-37D633B846F1}">
+                <asvg:svgBlip xmlns:asvg="http://schemas.microsoft.com/office/drawing/2016/SVG/main" r:embed="rId7"/>
+              </a:ext>
+            </a:extLst>
+          </a:blip>
+          <a:stretch>
+            <a:fillRect/>
+          </a:stretch>
+        </p:blipFill>
+        <p:spPr>
+          <a:xfrm>
+            <a:off x="3786983" y="2937409"/>
+            <a:ext cx="572597" cy="570812"/>
+          </a:xfrm>
+          <a:prstGeom prst="rect">
+            <a:avLst/>
+          </a:prstGeom>
+        </p:spPr>
+      </p:pic>
+      <p:sp>
+        <p:nvSpPr>
+          <p:cNvPr id="17" name="TextBox 16">
+            <a:extLst>
+              <a:ext uri="{FF2B5EF4-FFF2-40B4-BE49-F238E27FC236}">
+                <a16:creationId xmlns:a16="http://schemas.microsoft.com/office/drawing/2014/main" id="{6C0E8E31-DCD4-4BFE-8CBF-79BA58CA270B}"/>
+              </a:ext>
+            </a:extLst>
+          </p:cNvPr>
+          <p:cNvSpPr txBox="1"/>
+          <p:nvPr/>
+        </p:nvSpPr>
+        <p:spPr>
+          <a:xfrm>
+            <a:off x="5303698" y="3704013"/>
+            <a:ext cx="1335558" cy="307777"/>
+          </a:xfrm>
+          <a:prstGeom prst="rect">
+            <a:avLst/>
+          </a:prstGeom>
+          <a:noFill/>
+        </p:spPr>
+        <p:txBody>
+          <a:bodyPr wrap="none" rtlCol="0">
+            <a:spAutoFit/>
+          </a:bodyPr>
+          <a:lstStyle/>
+          <a:p>
+            <a:r>
+              <a:rPr lang="en-BE" sz="1400" dirty="0">
+                <a:solidFill>
+                  <a:schemeClr val="accent1"/>
+                </a:solidFill>
+              </a:rPr>
+              <a:t>Azure Synapse</a:t>
+            </a:r>
+          </a:p>
+        </p:txBody>
+      </p:sp>
+      <p:sp>
+        <p:nvSpPr>
+          <p:cNvPr id="19" name="TextBox 18">
+            <a:extLst>
+              <a:ext uri="{FF2B5EF4-FFF2-40B4-BE49-F238E27FC236}">
+                <a16:creationId xmlns:a16="http://schemas.microsoft.com/office/drawing/2014/main" id="{ABF5D6CA-BB48-4787-93F3-D64602D8F89D}"/>
+              </a:ext>
+            </a:extLst>
+          </p:cNvPr>
+          <p:cNvSpPr txBox="1"/>
+          <p:nvPr/>
+        </p:nvSpPr>
+        <p:spPr>
+          <a:xfrm>
+            <a:off x="3282058" y="3713942"/>
+            <a:ext cx="1586396" cy="307777"/>
+          </a:xfrm>
+          <a:prstGeom prst="rect">
+            <a:avLst/>
+          </a:prstGeom>
+          <a:noFill/>
+        </p:spPr>
+        <p:txBody>
+          <a:bodyPr wrap="none" rtlCol="0">
+            <a:spAutoFit/>
+          </a:bodyPr>
+          <a:lstStyle/>
+          <a:p>
+            <a:r>
+              <a:rPr lang="en-BE" sz="1400" dirty="0">
+                <a:solidFill>
+                  <a:schemeClr val="accent1"/>
+                </a:solidFill>
+              </a:rPr>
+              <a:t>Synapse Pipelines</a:t>
+            </a:r>
+          </a:p>
+        </p:txBody>
+      </p:sp>
+      <p:cxnSp>
+        <p:nvCxnSpPr>
+          <p:cNvPr id="21" name="Straight Arrow Connector 20">
+            <a:extLst>
+              <a:ext uri="{FF2B5EF4-FFF2-40B4-BE49-F238E27FC236}">
+                <a16:creationId xmlns:a16="http://schemas.microsoft.com/office/drawing/2014/main" id="{F98A8B49-20B0-449A-B055-21FD9BED5009}"/>
+              </a:ext>
+            </a:extLst>
+          </p:cNvPr>
+          <p:cNvCxnSpPr>
+            <a:cxnSpLocks/>
+          </p:cNvCxnSpPr>
+          <p:nvPr/>
+        </p:nvCxnSpPr>
+        <p:spPr>
+          <a:xfrm>
+            <a:off x="2437441" y="2559863"/>
+            <a:ext cx="1265923" cy="505465"/>
+          </a:xfrm>
+          <a:prstGeom prst="straightConnector1">
+            <a:avLst/>
+          </a:prstGeom>
+          <a:ln>
+            <a:tailEnd type="triangle"/>
+          </a:ln>
+        </p:spPr>
+        <p:style>
+          <a:lnRef idx="1">
+            <a:schemeClr val="accent1"/>
+          </a:lnRef>
+          <a:fillRef idx="0">
+            <a:schemeClr val="accent1"/>
+          </a:fillRef>
+          <a:effectRef idx="0">
+            <a:schemeClr val="accent1"/>
+          </a:effectRef>
+          <a:fontRef idx="minor">
+            <a:schemeClr val="tx1"/>
+          </a:fontRef>
+        </p:style>
+      </p:cxnSp>
+      <p:cxnSp>
+        <p:nvCxnSpPr>
+          <p:cNvPr id="23" name="Straight Arrow Connector 22">
+            <a:extLst>
+              <a:ext uri="{FF2B5EF4-FFF2-40B4-BE49-F238E27FC236}">
+                <a16:creationId xmlns:a16="http://schemas.microsoft.com/office/drawing/2014/main" id="{3D611F36-D6AC-49EC-8CAC-4B6BA448A953}"/>
+              </a:ext>
+            </a:extLst>
+          </p:cNvPr>
+          <p:cNvCxnSpPr>
+            <a:cxnSpLocks/>
+          </p:cNvCxnSpPr>
+          <p:nvPr/>
+        </p:nvCxnSpPr>
+        <p:spPr>
+          <a:xfrm>
+            <a:off x="2382978" y="2744830"/>
+            <a:ext cx="1310771" cy="537330"/>
+          </a:xfrm>
+          <a:prstGeom prst="straightConnector1">
+            <a:avLst/>
+          </a:prstGeom>
+          <a:ln>
+            <a:tailEnd type="triangle"/>
+          </a:ln>
+        </p:spPr>
+        <p:style>
+          <a:lnRef idx="1">
+            <a:schemeClr val="accent1"/>
+          </a:lnRef>
+          <a:fillRef idx="0">
+            <a:schemeClr val="accent1"/>
+          </a:fillRef>
+          <a:effectRef idx="0">
+            <a:schemeClr val="accent1"/>
+          </a:effectRef>
+          <a:fontRef idx="minor">
+            <a:schemeClr val="tx1"/>
+          </a:fontRef>
+        </p:style>
+      </p:cxnSp>
+      <p:cxnSp>
+        <p:nvCxnSpPr>
+          <p:cNvPr id="25" name="Straight Arrow Connector 24">
+            <a:extLst>
+              <a:ext uri="{FF2B5EF4-FFF2-40B4-BE49-F238E27FC236}">
+                <a16:creationId xmlns:a16="http://schemas.microsoft.com/office/drawing/2014/main" id="{B2649238-C306-4DDF-8E5D-6C533EACEFA5}"/>
+              </a:ext>
+            </a:extLst>
+          </p:cNvPr>
+          <p:cNvCxnSpPr>
+            <a:cxnSpLocks/>
+            <a:endCxn id="7" idx="1"/>
+          </p:cNvCxnSpPr>
+          <p:nvPr/>
+        </p:nvCxnSpPr>
+        <p:spPr>
+          <a:xfrm>
+            <a:off x="4403053" y="3282160"/>
+            <a:ext cx="1262539" cy="3051"/>
+          </a:xfrm>
+          <a:prstGeom prst="straightConnector1">
+            <a:avLst/>
+          </a:prstGeom>
+          <a:ln>
+            <a:tailEnd type="triangle"/>
+          </a:ln>
+        </p:spPr>
+        <p:style>
+          <a:lnRef idx="1">
+            <a:schemeClr val="accent1"/>
+          </a:lnRef>
+          <a:fillRef idx="0">
+            <a:schemeClr val="accent1"/>
+          </a:fillRef>
+          <a:effectRef idx="0">
+            <a:schemeClr val="accent1"/>
+          </a:effectRef>
+          <a:fontRef idx="minor">
+            <a:schemeClr val="tx1"/>
+          </a:fontRef>
+        </p:style>
+      </p:cxnSp>
+      <p:sp>
+        <p:nvSpPr>
+          <p:cNvPr id="40" name="TextBox 39">
+            <a:extLst>
+              <a:ext uri="{FF2B5EF4-FFF2-40B4-BE49-F238E27FC236}">
+                <a16:creationId xmlns:a16="http://schemas.microsoft.com/office/drawing/2014/main" id="{0BA8B297-2F45-4376-A4C9-BD6B6BC838C2}"/>
+              </a:ext>
+            </a:extLst>
+          </p:cNvPr>
+          <p:cNvSpPr txBox="1"/>
+          <p:nvPr/>
+        </p:nvSpPr>
+        <p:spPr>
+          <a:xfrm>
+            <a:off x="2858259" y="2176173"/>
+            <a:ext cx="2123979" cy="461665"/>
+          </a:xfrm>
+          <a:prstGeom prst="rect">
+            <a:avLst/>
+          </a:prstGeom>
+          <a:noFill/>
+        </p:spPr>
+        <p:txBody>
+          <a:bodyPr wrap="none" rtlCol="0">
+            <a:spAutoFit/>
+          </a:bodyPr>
+          <a:lstStyle/>
+          <a:p>
+            <a:r>
+              <a:rPr lang="en-BE" sz="1200" dirty="0"/>
+              <a:t>Sales Order Headers</a:t>
+            </a:r>
+            <a:br>
+              <a:rPr lang="en-BE" sz="1200" dirty="0"/>
+            </a:br>
+            <a:r>
+              <a:rPr lang="en-BE" sz="1200" dirty="0"/>
+              <a:t>CDS View / SAP Table Adapter</a:t>
+            </a:r>
+          </a:p>
+        </p:txBody>
+      </p:sp>
+      <p:sp>
+        <p:nvSpPr>
+          <p:cNvPr id="42" name="TextBox 41">
+            <a:extLst>
+              <a:ext uri="{FF2B5EF4-FFF2-40B4-BE49-F238E27FC236}">
+                <a16:creationId xmlns:a16="http://schemas.microsoft.com/office/drawing/2014/main" id="{4295DCC5-862C-4BF1-B50A-9456B8EF3BD5}"/>
+              </a:ext>
+            </a:extLst>
+          </p:cNvPr>
+          <p:cNvSpPr txBox="1"/>
+          <p:nvPr/>
+        </p:nvSpPr>
+        <p:spPr>
+          <a:xfrm>
+            <a:off x="1529129" y="2901796"/>
+            <a:ext cx="1971492" cy="461665"/>
+          </a:xfrm>
+          <a:prstGeom prst="rect">
+            <a:avLst/>
+          </a:prstGeom>
+          <a:noFill/>
+        </p:spPr>
+        <p:txBody>
+          <a:bodyPr wrap="square" rtlCol="0">
+            <a:spAutoFit/>
+          </a:bodyPr>
+          <a:lstStyle/>
+          <a:p>
+            <a:r>
+              <a:rPr lang="en-BE" sz="1200" dirty="0"/>
+              <a:t>Sales Order Items</a:t>
+            </a:r>
+            <a:br>
+              <a:rPr lang="en-BE" sz="1200" dirty="0"/>
+            </a:br>
+            <a:r>
+              <a:rPr lang="en-BE" sz="1200" dirty="0" err="1"/>
+              <a:t>oData</a:t>
+            </a:r>
+            <a:r>
+              <a:rPr lang="en-BE" sz="1200" dirty="0"/>
+              <a:t> / SAP ECC Adapter</a:t>
+            </a:r>
+          </a:p>
+        </p:txBody>
+      </p:sp>
+      <p:cxnSp>
+        <p:nvCxnSpPr>
+          <p:cNvPr id="3" name="Straight Arrow Connector 2">
+            <a:extLst>
+              <a:ext uri="{FF2B5EF4-FFF2-40B4-BE49-F238E27FC236}">
+                <a16:creationId xmlns:a16="http://schemas.microsoft.com/office/drawing/2014/main" id="{BCF98339-EA55-4C18-A8BC-6F177E286190}"/>
+              </a:ext>
+            </a:extLst>
+          </p:cNvPr>
+          <p:cNvCxnSpPr>
+            <a:cxnSpLocks/>
+          </p:cNvCxnSpPr>
+          <p:nvPr/>
+        </p:nvCxnSpPr>
+        <p:spPr>
+          <a:xfrm flipV="1">
+            <a:off x="2225345" y="3467127"/>
+            <a:ext cx="1424397" cy="935151"/>
+          </a:xfrm>
+          <a:prstGeom prst="straightConnector1">
+            <a:avLst/>
+          </a:prstGeom>
+          <a:ln>
+            <a:tailEnd type="triangle"/>
+          </a:ln>
+        </p:spPr>
+        <p:style>
+          <a:lnRef idx="1">
+            <a:schemeClr val="accent1"/>
+          </a:lnRef>
+          <a:fillRef idx="0">
+            <a:schemeClr val="accent1"/>
+          </a:fillRef>
+          <a:effectRef idx="0">
+            <a:schemeClr val="accent1"/>
+          </a:effectRef>
+          <a:fontRef idx="minor">
+            <a:schemeClr val="tx1"/>
+          </a:fontRef>
+        </p:style>
+      </p:cxnSp>
+      <p:sp>
+        <p:nvSpPr>
+          <p:cNvPr id="6" name="TextBox 5">
+            <a:extLst>
+              <a:ext uri="{FF2B5EF4-FFF2-40B4-BE49-F238E27FC236}">
+                <a16:creationId xmlns:a16="http://schemas.microsoft.com/office/drawing/2014/main" id="{C8176678-4B17-4D5A-92C9-3CE652FE4D51}"/>
+              </a:ext>
+            </a:extLst>
+          </p:cNvPr>
+          <p:cNvSpPr txBox="1"/>
+          <p:nvPr/>
+        </p:nvSpPr>
+        <p:spPr>
+          <a:xfrm>
+            <a:off x="2033046" y="3761594"/>
+            <a:ext cx="792589" cy="276999"/>
+          </a:xfrm>
+          <a:prstGeom prst="rect">
+            <a:avLst/>
+          </a:prstGeom>
+          <a:noFill/>
+        </p:spPr>
+        <p:txBody>
+          <a:bodyPr wrap="none" rtlCol="0">
+            <a:spAutoFit/>
+          </a:bodyPr>
+          <a:lstStyle/>
+          <a:p>
+            <a:r>
+              <a:rPr lang="en-BE" sz="1200" dirty="0"/>
+              <a:t>Payments</a:t>
+            </a:r>
+          </a:p>
+        </p:txBody>
+      </p:sp>
+      <p:cxnSp>
+        <p:nvCxnSpPr>
+          <p:cNvPr id="26" name="Connector: Elbow 25">
+            <a:extLst>
+              <a:ext uri="{FF2B5EF4-FFF2-40B4-BE49-F238E27FC236}">
+                <a16:creationId xmlns:a16="http://schemas.microsoft.com/office/drawing/2014/main" id="{DEBA1AEB-0DCE-4BA5-83B0-3D14676E7489}"/>
+              </a:ext>
+            </a:extLst>
+          </p:cNvPr>
+          <p:cNvCxnSpPr>
+            <a:cxnSpLocks/>
+            <a:endCxn id="9" idx="1"/>
+          </p:cNvCxnSpPr>
+          <p:nvPr/>
+        </p:nvCxnSpPr>
+        <p:spPr>
+          <a:xfrm>
+            <a:off x="6375430" y="3404473"/>
+            <a:ext cx="1022596" cy="964464"/>
+          </a:xfrm>
+          <a:prstGeom prst="bentConnector3">
+            <a:avLst/>
+          </a:prstGeom>
+          <a:ln>
+            <a:tailEnd type="triangle"/>
+          </a:ln>
+        </p:spPr>
+        <p:style>
+          <a:lnRef idx="1">
+            <a:schemeClr val="accent1"/>
+          </a:lnRef>
+          <a:fillRef idx="0">
+            <a:schemeClr val="accent1"/>
+          </a:fillRef>
+          <a:effectRef idx="0">
+            <a:schemeClr val="accent1"/>
+          </a:effectRef>
+          <a:fontRef idx="minor">
+            <a:schemeClr val="tx1"/>
+          </a:fontRef>
+        </p:style>
+      </p:cxnSp>
+      <p:cxnSp>
+        <p:nvCxnSpPr>
+          <p:cNvPr id="30" name="Connector: Elbow 29">
+            <a:extLst>
+              <a:ext uri="{FF2B5EF4-FFF2-40B4-BE49-F238E27FC236}">
+                <a16:creationId xmlns:a16="http://schemas.microsoft.com/office/drawing/2014/main" id="{FBA3B752-6A3A-451E-9F70-171C3ED0BC35}"/>
+              </a:ext>
+            </a:extLst>
+          </p:cNvPr>
+          <p:cNvCxnSpPr>
+            <a:cxnSpLocks/>
+            <a:stCxn id="9" idx="3"/>
+            <a:endCxn id="12" idx="2"/>
+          </p:cNvCxnSpPr>
+          <p:nvPr/>
+        </p:nvCxnSpPr>
+        <p:spPr>
+          <a:xfrm flipV="1">
+            <a:off x="7910134" y="3719695"/>
+            <a:ext cx="454826" cy="649242"/>
+          </a:xfrm>
+          <a:prstGeom prst="bentConnector2">
+            <a:avLst/>
+          </a:prstGeom>
+          <a:ln>
+            <a:tailEnd type="triangle"/>
+          </a:ln>
+        </p:spPr>
+        <p:style>
+          <a:lnRef idx="1">
+            <a:schemeClr val="accent1"/>
+          </a:lnRef>
+          <a:fillRef idx="0">
+            <a:schemeClr val="accent1"/>
+          </a:fillRef>
+          <a:effectRef idx="0">
+            <a:schemeClr val="accent1"/>
+          </a:effectRef>
+          <a:fontRef idx="minor">
+            <a:schemeClr val="tx1"/>
+          </a:fontRef>
+        </p:style>
+      </p:cxnSp>
+      <p:sp>
+        <p:nvSpPr>
+          <p:cNvPr id="31" name="TextBox 30">
+            <a:extLst>
+              <a:ext uri="{FF2B5EF4-FFF2-40B4-BE49-F238E27FC236}">
+                <a16:creationId xmlns:a16="http://schemas.microsoft.com/office/drawing/2014/main" id="{9A42F41D-B033-4994-9598-CCCD288CFFBF}"/>
+              </a:ext>
+            </a:extLst>
+          </p:cNvPr>
+          <p:cNvSpPr txBox="1"/>
+          <p:nvPr/>
+        </p:nvSpPr>
+        <p:spPr>
+          <a:xfrm>
+            <a:off x="992681" y="4729739"/>
+            <a:ext cx="1596143" cy="307777"/>
+          </a:xfrm>
+          <a:prstGeom prst="rect">
+            <a:avLst/>
+          </a:prstGeom>
+          <a:noFill/>
+        </p:spPr>
+        <p:txBody>
+          <a:bodyPr wrap="none" rtlCol="0">
+            <a:spAutoFit/>
+          </a:bodyPr>
+          <a:lstStyle/>
+          <a:p>
+            <a:r>
+              <a:rPr lang="en-BE" sz="1400" dirty="0">
+                <a:solidFill>
+                  <a:schemeClr val="accent1"/>
+                </a:solidFill>
+              </a:rPr>
+              <a:t>Azure Cosmos DB</a:t>
+            </a:r>
+          </a:p>
+        </p:txBody>
+      </p:sp>
+      <p:sp>
+        <p:nvSpPr>
+          <p:cNvPr id="27" name="TextBox 26">
+            <a:extLst>
+              <a:ext uri="{FF2B5EF4-FFF2-40B4-BE49-F238E27FC236}">
+                <a16:creationId xmlns:a16="http://schemas.microsoft.com/office/drawing/2014/main" id="{1C565ADE-6565-4985-9833-E8C7D17D0DAF}"/>
+              </a:ext>
+            </a:extLst>
+          </p:cNvPr>
+          <p:cNvSpPr txBox="1"/>
+          <p:nvPr/>
+        </p:nvSpPr>
+        <p:spPr>
+          <a:xfrm>
+            <a:off x="213390" y="6411223"/>
+            <a:ext cx="8490495" cy="276999"/>
+          </a:xfrm>
+          <a:prstGeom prst="rect">
+            <a:avLst/>
+          </a:prstGeom>
+          <a:noFill/>
+        </p:spPr>
+        <p:txBody>
+          <a:bodyPr wrap="square">
+            <a:spAutoFit/>
+          </a:bodyPr>
+          <a:lstStyle/>
+          <a:p>
+            <a:r>
+              <a:rPr lang="en-BE" sz="1200" dirty="0"/>
+              <a:t>Based on Sales Data available in S/4 HANA Fully Activated Appliance – SAP CAL Image 1909 / 2020</a:t>
+            </a:r>
+          </a:p>
+        </p:txBody>
+      </p:sp>
+      <p:pic>
+        <p:nvPicPr>
+          <p:cNvPr id="4" name="Picture 2" descr="See the source image">
+            <a:extLst>
+              <a:ext uri="{FF2B5EF4-FFF2-40B4-BE49-F238E27FC236}">
+                <a16:creationId xmlns:a16="http://schemas.microsoft.com/office/drawing/2014/main" id="{31E4C9C2-0CAD-4EB5-A4A3-B5F0977CF87B}"/>
+              </a:ext>
+            </a:extLst>
+          </p:cNvPr>
+          <p:cNvPicPr>
+            <a:picLocks noChangeAspect="1" noChangeArrowheads="1"/>
+          </p:cNvPicPr>
+          <p:nvPr/>
+        </p:nvPicPr>
+        <p:blipFill>
+          <a:blip r:embed="rId8">
+            <a:extLst>
+              <a:ext uri="{28A0092B-C50C-407E-A947-70E740481C1C}">
+                <a14:useLocalDpi xmlns:a14="http://schemas.microsoft.com/office/drawing/2010/main" val="0"/>
+              </a:ext>
+            </a:extLst>
+          </a:blip>
+          <a:srcRect/>
+          <a:stretch>
+            <a:fillRect/>
+          </a:stretch>
+        </p:blipFill>
+        <p:spPr bwMode="auto">
+          <a:xfrm>
+            <a:off x="309180" y="2342404"/>
+            <a:ext cx="2044642" cy="504571"/>
+          </a:xfrm>
+          <a:prstGeom prst="rect">
+            <a:avLst/>
+          </a:prstGeom>
+          <a:noFill/>
+          <a:extLst>
+            <a:ext uri="{909E8E84-426E-40DD-AFC4-6F175D3DCCD1}">
+              <a14:hiddenFill xmlns:a14="http://schemas.microsoft.com/office/drawing/2010/main">
+                <a:solidFill>
+                  <a:srgbClr val="FFFFFF"/>
+                </a:solidFill>
+              </a14:hiddenFill>
+            </a:ext>
+          </a:extLst>
+        </p:spPr>
+      </p:pic>
+      <p:cxnSp>
+        <p:nvCxnSpPr>
+          <p:cNvPr id="24" name="Straight Arrow Connector 23">
+            <a:extLst>
+              <a:ext uri="{FF2B5EF4-FFF2-40B4-BE49-F238E27FC236}">
+                <a16:creationId xmlns:a16="http://schemas.microsoft.com/office/drawing/2014/main" id="{34265B12-179B-D302-22DD-FB48EF19C46A}"/>
+              </a:ext>
+            </a:extLst>
+          </p:cNvPr>
+          <p:cNvCxnSpPr>
+            <a:cxnSpLocks/>
+          </p:cNvCxnSpPr>
+          <p:nvPr/>
+        </p:nvCxnSpPr>
+        <p:spPr>
+          <a:xfrm flipV="1">
+            <a:off x="6375430" y="3278694"/>
+            <a:ext cx="1542085" cy="2354"/>
+          </a:xfrm>
+          <a:prstGeom prst="straightConnector1">
+            <a:avLst/>
+          </a:prstGeom>
+          <a:ln>
+            <a:tailEnd type="triangle"/>
+          </a:ln>
+        </p:spPr>
+        <p:style>
+          <a:lnRef idx="1">
+            <a:schemeClr val="accent1"/>
+          </a:lnRef>
+          <a:fillRef idx="0">
+            <a:schemeClr val="accent1"/>
+          </a:fillRef>
+          <a:effectRef idx="0">
+            <a:schemeClr val="accent1"/>
+          </a:effectRef>
+          <a:fontRef idx="minor">
+            <a:schemeClr val="tx1"/>
+          </a:fontRef>
+        </p:style>
+      </p:cxnSp>
+      <p:pic>
+        <p:nvPicPr>
+          <p:cNvPr id="37" name="Graphic 36">
+            <a:extLst>
+              <a:ext uri="{FF2B5EF4-FFF2-40B4-BE49-F238E27FC236}">
+                <a16:creationId xmlns:a16="http://schemas.microsoft.com/office/drawing/2014/main" id="{6976E3C1-6739-9CCD-CF52-922AA64A2506}"/>
+              </a:ext>
+            </a:extLst>
+          </p:cNvPr>
+          <p:cNvPicPr>
+            <a:picLocks noChangeAspect="1"/>
+          </p:cNvPicPr>
+          <p:nvPr/>
+        </p:nvPicPr>
+        <p:blipFill>
+          <a:blip r:embed="rId9">
+            <a:extLst>
+              <a:ext uri="{28A0092B-C50C-407E-A947-70E740481C1C}">
+                <a14:useLocalDpi xmlns:a14="http://schemas.microsoft.com/office/drawing/2010/main" val="0"/>
+              </a:ext>
+              <a:ext uri="{96DAC541-7B7A-43D3-8B79-37D633B846F1}">
+                <asvg:svgBlip xmlns:asvg="http://schemas.microsoft.com/office/drawing/2016/SVG/main" r:embed="rId10"/>
+              </a:ext>
+            </a:extLst>
+          </a:blip>
+          <a:stretch>
+            <a:fillRect/>
+          </a:stretch>
+        </p:blipFill>
+        <p:spPr>
+          <a:xfrm>
+            <a:off x="9317119" y="2863358"/>
+            <a:ext cx="789353" cy="789353"/>
+          </a:xfrm>
+          <a:prstGeom prst="rect">
+            <a:avLst/>
+          </a:prstGeom>
+        </p:spPr>
+      </p:pic>
+      <p:cxnSp>
+        <p:nvCxnSpPr>
+          <p:cNvPr id="45" name="Straight Arrow Connector 44">
+            <a:extLst>
+              <a:ext uri="{FF2B5EF4-FFF2-40B4-BE49-F238E27FC236}">
+                <a16:creationId xmlns:a16="http://schemas.microsoft.com/office/drawing/2014/main" id="{9A8B9C46-E1E0-C468-F1C6-DF2DB2C962BC}"/>
+              </a:ext>
+            </a:extLst>
+          </p:cNvPr>
+          <p:cNvCxnSpPr>
+            <a:cxnSpLocks/>
+            <a:endCxn id="37" idx="1"/>
+          </p:cNvCxnSpPr>
+          <p:nvPr/>
+        </p:nvCxnSpPr>
+        <p:spPr>
+          <a:xfrm>
+            <a:off x="8849213" y="3258035"/>
+            <a:ext cx="467906" cy="0"/>
+          </a:xfrm>
+          <a:prstGeom prst="straightConnector1">
+            <a:avLst/>
+          </a:prstGeom>
+          <a:ln>
+            <a:tailEnd type="triangle"/>
+          </a:ln>
+        </p:spPr>
+        <p:style>
+          <a:lnRef idx="1">
+            <a:schemeClr val="accent1"/>
+          </a:lnRef>
+          <a:fillRef idx="0">
+            <a:schemeClr val="accent1"/>
+          </a:fillRef>
+          <a:effectRef idx="0">
+            <a:schemeClr val="accent1"/>
+          </a:effectRef>
+          <a:fontRef idx="minor">
+            <a:schemeClr val="tx1"/>
+          </a:fontRef>
+        </p:style>
+      </p:cxnSp>
+      <p:sp>
+        <p:nvSpPr>
+          <p:cNvPr id="49" name="TextBox 48">
+            <a:extLst>
+              <a:ext uri="{FF2B5EF4-FFF2-40B4-BE49-F238E27FC236}">
+                <a16:creationId xmlns:a16="http://schemas.microsoft.com/office/drawing/2014/main" id="{677E1D20-611B-FB7E-1B73-E2B017A4AF1E}"/>
+              </a:ext>
+            </a:extLst>
+          </p:cNvPr>
+          <p:cNvSpPr txBox="1"/>
+          <p:nvPr/>
+        </p:nvSpPr>
+        <p:spPr>
+          <a:xfrm>
+            <a:off x="8961012" y="3421875"/>
+            <a:ext cx="1501565" cy="307777"/>
+          </a:xfrm>
+          <a:prstGeom prst="rect">
+            <a:avLst/>
+          </a:prstGeom>
+          <a:noFill/>
+        </p:spPr>
+        <p:txBody>
+          <a:bodyPr wrap="none" rtlCol="0">
+            <a:spAutoFit/>
+          </a:bodyPr>
+          <a:lstStyle/>
+          <a:p>
+            <a:r>
+              <a:rPr lang="en-BE" sz="1400" dirty="0">
+                <a:solidFill>
+                  <a:schemeClr val="accent1"/>
+                </a:solidFill>
+              </a:rPr>
+              <a:t>Power </a:t>
+            </a:r>
+            <a:r>
+              <a:rPr lang="de-DE" sz="1400" dirty="0" err="1">
+                <a:solidFill>
+                  <a:schemeClr val="accent1"/>
+                </a:solidFill>
+              </a:rPr>
+              <a:t>Automate</a:t>
+            </a:r>
+            <a:endParaRPr lang="en-BE" sz="1400" dirty="0">
+              <a:solidFill>
+                <a:schemeClr val="accent1"/>
+              </a:solidFill>
+            </a:endParaRPr>
+          </a:p>
+        </p:txBody>
+      </p:sp>
+      <p:cxnSp>
+        <p:nvCxnSpPr>
+          <p:cNvPr id="51" name="Connector: Elbow 50">
+            <a:extLst>
+              <a:ext uri="{FF2B5EF4-FFF2-40B4-BE49-F238E27FC236}">
+                <a16:creationId xmlns:a16="http://schemas.microsoft.com/office/drawing/2014/main" id="{3B6D93DD-072B-D52C-263E-C28682478C6C}"/>
+              </a:ext>
+            </a:extLst>
+          </p:cNvPr>
+          <p:cNvCxnSpPr>
+            <a:cxnSpLocks/>
+            <a:stCxn id="37" idx="0"/>
+            <a:endCxn id="4" idx="0"/>
+          </p:cNvCxnSpPr>
+          <p:nvPr/>
+        </p:nvCxnSpPr>
+        <p:spPr>
+          <a:xfrm rot="16200000" flipV="1">
+            <a:off x="5261172" y="-1587267"/>
+            <a:ext cx="520954" cy="8380295"/>
+          </a:xfrm>
+          <a:prstGeom prst="bentConnector3">
+            <a:avLst>
+              <a:gd name="adj1" fmla="val 171059"/>
+            </a:avLst>
+          </a:prstGeom>
+          <a:ln>
+            <a:tailEnd type="triangle"/>
+          </a:ln>
+        </p:spPr>
+        <p:style>
+          <a:lnRef idx="1">
+            <a:schemeClr val="accent1"/>
+          </a:lnRef>
+          <a:fillRef idx="0">
+            <a:schemeClr val="accent1"/>
+          </a:fillRef>
+          <a:effectRef idx="0">
+            <a:schemeClr val="accent1"/>
+          </a:effectRef>
+          <a:fontRef idx="minor">
+            <a:schemeClr val="tx1"/>
+          </a:fontRef>
+        </p:style>
+      </p:cxnSp>
+      <p:sp>
+        <p:nvSpPr>
+          <p:cNvPr id="56" name="TextBox 55">
+            <a:extLst>
+              <a:ext uri="{FF2B5EF4-FFF2-40B4-BE49-F238E27FC236}">
+                <a16:creationId xmlns:a16="http://schemas.microsoft.com/office/drawing/2014/main" id="{55A37951-913B-B2BB-A873-864F5B407CAE}"/>
+              </a:ext>
+            </a:extLst>
+          </p:cNvPr>
+          <p:cNvSpPr txBox="1"/>
+          <p:nvPr/>
+        </p:nvSpPr>
+        <p:spPr>
+          <a:xfrm>
+            <a:off x="4404863" y="1617656"/>
+            <a:ext cx="1872500" cy="276999"/>
+          </a:xfrm>
+          <a:prstGeom prst="rect">
+            <a:avLst/>
+          </a:prstGeom>
+          <a:noFill/>
+        </p:spPr>
+        <p:txBody>
+          <a:bodyPr wrap="none" rtlCol="0">
+            <a:spAutoFit/>
+          </a:bodyPr>
+          <a:lstStyle/>
+          <a:p>
+            <a:r>
+              <a:rPr lang="de-DE" sz="1200" dirty="0"/>
+              <a:t>Update Business Partner </a:t>
+            </a:r>
+            <a:endParaRPr lang="en-BE" sz="1200" dirty="0"/>
+          </a:p>
+        </p:txBody>
+      </p:sp>
+      <p:pic>
+        <p:nvPicPr>
+          <p:cNvPr id="59" name="Picture 58">
+            <a:extLst>
+              <a:ext uri="{FF2B5EF4-FFF2-40B4-BE49-F238E27FC236}">
+                <a16:creationId xmlns:a16="http://schemas.microsoft.com/office/drawing/2014/main" id="{4CA78CB7-EAE4-9747-AC68-92788DF6E889}"/>
+              </a:ext>
+            </a:extLst>
+          </p:cNvPr>
+          <p:cNvPicPr>
+            <a:picLocks noChangeAspect="1"/>
+          </p:cNvPicPr>
+          <p:nvPr/>
+        </p:nvPicPr>
+        <p:blipFill>
+          <a:blip r:embed="rId11"/>
+          <a:stretch>
+            <a:fillRect/>
+          </a:stretch>
+        </p:blipFill>
+        <p:spPr>
+          <a:xfrm>
+            <a:off x="8161297" y="2265443"/>
+            <a:ext cx="419122" cy="438173"/>
+          </a:xfrm>
+          <a:prstGeom prst="flowChartConnector">
+            <a:avLst/>
+          </a:prstGeom>
+        </p:spPr>
+      </p:pic>
+      <p:sp>
+        <p:nvSpPr>
+          <p:cNvPr id="60" name="Arc 59">
+            <a:extLst>
+              <a:ext uri="{FF2B5EF4-FFF2-40B4-BE49-F238E27FC236}">
+                <a16:creationId xmlns:a16="http://schemas.microsoft.com/office/drawing/2014/main" id="{739E6E22-929D-4383-1188-8915EA135E65}"/>
+              </a:ext>
+            </a:extLst>
+          </p:cNvPr>
+          <p:cNvSpPr/>
+          <p:nvPr/>
+        </p:nvSpPr>
+        <p:spPr>
+          <a:xfrm rot="16200000" flipV="1">
+            <a:off x="8262734" y="2634364"/>
+            <a:ext cx="662192" cy="464916"/>
+          </a:xfrm>
+          <a:prstGeom prst="arc">
+            <a:avLst>
+              <a:gd name="adj1" fmla="val 10902076"/>
+              <a:gd name="adj2" fmla="val 6"/>
+            </a:avLst>
+          </a:prstGeom>
+          <a:ln>
+            <a:solidFill>
+              <a:schemeClr val="bg1">
+                <a:lumMod val="50000"/>
+              </a:schemeClr>
+            </a:solidFill>
+            <a:prstDash val="dash"/>
+            <a:headEnd type="none" w="med" len="med"/>
+            <a:tailEnd type="triangle" w="med" len="med"/>
+          </a:ln>
+        </p:spPr>
+        <p:style>
+          <a:lnRef idx="1">
+            <a:schemeClr val="accent1"/>
+          </a:lnRef>
+          <a:fillRef idx="0">
+            <a:schemeClr val="accent1"/>
+          </a:fillRef>
+          <a:effectRef idx="0">
+            <a:schemeClr val="accent1"/>
+          </a:effectRef>
+          <a:fontRef idx="minor">
+            <a:schemeClr val="tx1"/>
+          </a:fontRef>
+        </p:style>
+        <p:txBody>
+          <a:bodyPr rtlCol="0" anchor="ctr"/>
+          <a:lstStyle/>
+          <a:p>
+            <a:pPr algn="ctr"/>
+            <a:endParaRPr lang="de-DE"/>
+          </a:p>
+        </p:txBody>
+      </p:sp>
+      <p:sp>
+        <p:nvSpPr>
+          <p:cNvPr id="62" name="Arc 61">
+            <a:extLst>
+              <a:ext uri="{FF2B5EF4-FFF2-40B4-BE49-F238E27FC236}">
+                <a16:creationId xmlns:a16="http://schemas.microsoft.com/office/drawing/2014/main" id="{5D66A1F6-481B-6469-8B9F-24795DED03A1}"/>
+              </a:ext>
+            </a:extLst>
+          </p:cNvPr>
+          <p:cNvSpPr/>
+          <p:nvPr/>
+        </p:nvSpPr>
+        <p:spPr>
+          <a:xfrm rot="5400000" flipV="1">
+            <a:off x="7806775" y="2677958"/>
+            <a:ext cx="621469" cy="418453"/>
+          </a:xfrm>
+          <a:prstGeom prst="arc">
+            <a:avLst>
+              <a:gd name="adj1" fmla="val 10902076"/>
+              <a:gd name="adj2" fmla="val 6"/>
+            </a:avLst>
+          </a:prstGeom>
+          <a:ln>
+            <a:solidFill>
+              <a:schemeClr val="bg1">
+                <a:lumMod val="50000"/>
+              </a:schemeClr>
+            </a:solidFill>
+            <a:prstDash val="dash"/>
+            <a:headEnd type="none" w="med" len="med"/>
+            <a:tailEnd type="triangle" w="med" len="med"/>
+          </a:ln>
+        </p:spPr>
+        <p:style>
+          <a:lnRef idx="1">
+            <a:schemeClr val="accent1"/>
+          </a:lnRef>
+          <a:fillRef idx="0">
+            <a:schemeClr val="accent1"/>
+          </a:fillRef>
+          <a:effectRef idx="0">
+            <a:schemeClr val="accent1"/>
+          </a:effectRef>
+          <a:fontRef idx="minor">
+            <a:schemeClr val="tx1"/>
+          </a:fontRef>
+        </p:style>
+        <p:txBody>
+          <a:bodyPr rtlCol="0" anchor="ctr"/>
+          <a:lstStyle/>
+          <a:p>
+            <a:pPr algn="ctr"/>
+            <a:endParaRPr lang="de-DE"/>
+          </a:p>
+        </p:txBody>
+      </p:sp>
+      <p:sp>
+        <p:nvSpPr>
+          <p:cNvPr id="64" name="TextBox 63">
+            <a:extLst>
+              <a:ext uri="{FF2B5EF4-FFF2-40B4-BE49-F238E27FC236}">
+                <a16:creationId xmlns:a16="http://schemas.microsoft.com/office/drawing/2014/main" id="{9A3406F1-AA90-1023-F1AA-9A13CBC5C54B}"/>
+              </a:ext>
+            </a:extLst>
+          </p:cNvPr>
+          <p:cNvSpPr txBox="1"/>
+          <p:nvPr/>
+        </p:nvSpPr>
+        <p:spPr>
+          <a:xfrm>
+            <a:off x="7917515" y="2680581"/>
+            <a:ext cx="936090" cy="276999"/>
+          </a:xfrm>
+          <a:prstGeom prst="rect">
+            <a:avLst/>
+          </a:prstGeom>
+          <a:noFill/>
+        </p:spPr>
+        <p:txBody>
+          <a:bodyPr wrap="none" rtlCol="0">
+            <a:spAutoFit/>
+          </a:bodyPr>
+          <a:lstStyle/>
+          <a:p>
+            <a:r>
+              <a:rPr lang="de-DE" sz="1200" dirty="0">
+                <a:solidFill>
+                  <a:schemeClr val="bg1">
+                    <a:lumMod val="50000"/>
+                  </a:schemeClr>
+                </a:solidFill>
+              </a:rPr>
+              <a:t>Data Alerts</a:t>
+            </a:r>
+            <a:endParaRPr lang="en-BE" sz="1200" dirty="0">
+              <a:solidFill>
+                <a:schemeClr val="bg1">
+                  <a:lumMod val="50000"/>
+                </a:schemeClr>
+              </a:solidFill>
+            </a:endParaRPr>
+          </a:p>
+        </p:txBody>
+      </p:sp>
+      <p:pic>
+        <p:nvPicPr>
+          <p:cNvPr id="80" name="Graphic 79">
+            <a:extLst>
+              <a:ext uri="{FF2B5EF4-FFF2-40B4-BE49-F238E27FC236}">
+                <a16:creationId xmlns:a16="http://schemas.microsoft.com/office/drawing/2014/main" id="{CECB8342-7AA5-34E1-2442-84416533F2E6}"/>
+              </a:ext>
+            </a:extLst>
+          </p:cNvPr>
+          <p:cNvPicPr>
+            <a:picLocks noChangeAspect="1"/>
+          </p:cNvPicPr>
+          <p:nvPr/>
+        </p:nvPicPr>
+        <p:blipFill>
+          <a:blip r:embed="rId12">
+            <a:extLst>
+              <a:ext uri="{28A0092B-C50C-407E-A947-70E740481C1C}">
+                <a14:useLocalDpi xmlns:a14="http://schemas.microsoft.com/office/drawing/2010/main" val="0"/>
+              </a:ext>
+              <a:ext uri="{96DAC541-7B7A-43D3-8B79-37D633B846F1}">
+                <asvg:svgBlip xmlns:asvg="http://schemas.microsoft.com/office/drawing/2016/SVG/main" r:embed="rId13"/>
+              </a:ext>
+            </a:extLst>
+          </a:blip>
+          <a:stretch>
+            <a:fillRect/>
+          </a:stretch>
+        </p:blipFill>
+        <p:spPr>
+          <a:xfrm>
+            <a:off x="1506596" y="4200633"/>
+            <a:ext cx="568314" cy="520955"/>
+          </a:xfrm>
+          <a:prstGeom prst="rect">
+            <a:avLst/>
+          </a:prstGeom>
+        </p:spPr>
+      </p:pic>
+      <p:sp>
+        <p:nvSpPr>
+          <p:cNvPr id="5" name="Rectangle 4">
+            <a:extLst>
+              <a:ext uri="{FF2B5EF4-FFF2-40B4-BE49-F238E27FC236}">
+                <a16:creationId xmlns:a16="http://schemas.microsoft.com/office/drawing/2014/main" id="{4F4BE785-B950-FE65-951D-C8EDC5393369}"/>
+              </a:ext>
+            </a:extLst>
+          </p:cNvPr>
+          <p:cNvSpPr/>
+          <p:nvPr/>
+        </p:nvSpPr>
+        <p:spPr bwMode="auto">
+          <a:xfrm>
+            <a:off x="2033045" y="3713942"/>
+            <a:ext cx="825213" cy="401989"/>
+          </a:xfrm>
+          <a:prstGeom prst="rect">
+            <a:avLst/>
+          </a:prstGeom>
+          <a:noFill/>
+          <a:ln w="28575">
+            <a:solidFill>
+              <a:srgbClr val="FF0000"/>
+            </a:solidFill>
+            <a:headEnd type="none" w="med" len="med"/>
+            <a:tailEnd type="none" w="med" len="med"/>
+          </a:ln>
+          <a:effectLst/>
+        </p:spPr>
+        <p:style>
+          <a:lnRef idx="1">
+            <a:schemeClr val="accent2"/>
+          </a:lnRef>
+          <a:fillRef idx="3">
+            <a:schemeClr val="accent2"/>
+          </a:fillRef>
+          <a:effectRef idx="2">
+            <a:schemeClr val="accent2"/>
+          </a:effectRef>
+          <a:fontRef idx="minor">
+            <a:schemeClr val="lt1"/>
+          </a:fontRef>
+        </p:style>
+        <p:txBody>
+          <a:bodyPr rot="0" spcFirstLastPara="0" vertOverflow="overflow" horzOverflow="overflow" vert="horz" wrap="square" lIns="182880" tIns="146304" rIns="182880" bIns="146304" numCol="1" spcCol="0" rtlCol="0" fromWordArt="0" anchor="t" anchorCtr="0" forceAA="0" compatLnSpc="1">
+            <a:prstTxWarp prst="textNoShape">
+              <a:avLst/>
+            </a:prstTxWarp>
+            <a:noAutofit/>
+          </a:bodyPr>
+          <a:lstStyle/>
+          <a:p>
+            <a:pPr algn="l" defTabSz="932472" fontAlgn="base">
+              <a:spcBef>
+                <a:spcPct val="0"/>
+              </a:spcBef>
+              <a:spcAft>
+                <a:spcPct val="0"/>
+              </a:spcAft>
+            </a:pPr>
+            <a:endParaRPr lang="en-DE" sz="2000" dirty="0" err="1">
+              <a:solidFill>
+                <a:srgbClr val="FFFFFF"/>
+              </a:solidFill>
+              <a:ea typeface="Segoe UI" pitchFamily="34" charset="0"/>
+              <a:cs typeface="Segoe UI" pitchFamily="34" charset="0"/>
+            </a:endParaRPr>
+          </a:p>
+        </p:txBody>
+      </p:sp>
+    </p:spTree>
+    <p:extLst>
+      <p:ext uri="{BB962C8B-B14F-4D97-AF65-F5344CB8AC3E}">
+        <p14:creationId xmlns:p14="http://schemas.microsoft.com/office/powerpoint/2010/main" val="177521163"/>
+      </p:ext>
+    </p:extLst>
+  </p:cSld>
+  <p:clrMapOvr>
+    <a:masterClrMapping/>
+  </p:clrMapOvr>
+  <p:timing>
+    <p:tnLst>
+      <p:par>
+        <p:cTn id="1" dur="indefinite" restart="never" nodeType="tmRoot">
+          <p:childTnLst>
+            <p:seq concurrent="1" nextAc="seek">
+              <p:cTn id="2" dur="indefinite" nodeType="mainSeq">
+                <p:childTnLst>
+                  <p:par>
+                    <p:cTn id="3" fill="hold">
+                      <p:stCondLst>
+                        <p:cond delay="indefinite"/>
+                        <p:cond evt="onBegin" delay="0">
+                          <p:tn val="2"/>
+                        </p:cond>
+                      </p:stCondLst>
+                      <p:childTnLst>
+                        <p:par>
+                          <p:cTn id="4" fill="hold">
+                            <p:stCondLst>
+                              <p:cond delay="0"/>
+                            </p:stCondLst>
+                            <p:childTnLst>
+                              <p:par>
+                                <p:cTn id="5" presetID="1" presetClass="entr" presetSubtype="0" fill="hold" nodeType="withEffect">
+                                  <p:stCondLst>
+                                    <p:cond delay="0"/>
+                                  </p:stCondLst>
+                                  <p:childTnLst>
+                                    <p:set>
+                                      <p:cBhvr>
+                                        <p:cTn id="6" dur="1" fill="hold">
+                                          <p:stCondLst>
+                                            <p:cond delay="0"/>
+                                          </p:stCondLst>
+                                        </p:cTn>
+                                        <p:tgtEl>
+                                          <p:spTgt spid="15"/>
+                                        </p:tgtEl>
+                                        <p:attrNameLst>
+                                          <p:attrName>style.visibility</p:attrName>
+                                        </p:attrNameLst>
+                                      </p:cBhvr>
+                                      <p:to>
+                                        <p:strVal val="visible"/>
+                                      </p:to>
+                                    </p:set>
+                                  </p:childTnLst>
+                                </p:cTn>
+                              </p:par>
+                            </p:childTnLst>
+                          </p:cTn>
+                        </p:par>
+                      </p:childTnLst>
+                    </p:cTn>
+                  </p:par>
+                </p:childTnLst>
+              </p:cTn>
+              <p:prevCondLst>
+                <p:cond evt="onPrev" delay="0">
+                  <p:tgtEl>
+                    <p:sldTgt/>
+                  </p:tgtEl>
+                </p:cond>
+              </p:prevCondLst>
+              <p:nextCondLst>
+                <p:cond evt="onNext" delay="0">
+                  <p:tgtEl>
+                    <p:sldTgt/>
+                  </p:tgtEl>
+                </p:cond>
+              </p:nextCondLst>
+            </p:seq>
+          </p:childTnLst>
+        </p:cTn>
+      </p:par>
+    </p:tnLst>
+  </p:timing>
+</p:sld>
+</file>
+
+<file path=ppt/slides/slide7.xml><?xml version="1.0" encoding="utf-8"?>
+<p:sld xmlns:a="http://schemas.openxmlformats.org/drawingml/2006/main" xmlns:r="http://schemas.openxmlformats.org/officeDocument/2006/relationships" xmlns:p="http://schemas.openxmlformats.org/presentationml/2006/main">
+  <p:cSld>
+    <p:spTree>
+      <p:nvGrpSpPr>
+        <p:cNvPr id="1" name=""/>
+        <p:cNvGrpSpPr/>
+        <p:nvPr/>
+      </p:nvGrpSpPr>
+      <p:grpSpPr>
+        <a:xfrm>
+          <a:off x="0" y="0"/>
+          <a:ext cx="0" cy="0"/>
+          <a:chOff x="0" y="0"/>
+          <a:chExt cx="0" cy="0"/>
+        </a:xfrm>
+      </p:grpSpPr>
       <p:sp>
         <p:nvSpPr>
           <p:cNvPr id="2" name="Title 1">
@@ -18465,7 +20381,7 @@
 </p:sld>
 </file>
 
-<file path=ppt/slides/slide7.xml><?xml version="1.0" encoding="utf-8"?>
+<file path=ppt/slides/slide8.xml><?xml version="1.0" encoding="utf-8"?>
 <p:sld xmlns:a="http://schemas.openxmlformats.org/drawingml/2006/main" xmlns:r="http://schemas.openxmlformats.org/officeDocument/2006/relationships" xmlns:p="http://schemas.openxmlformats.org/presentationml/2006/main">
   <p:cSld>
     <p:spTree>
@@ -18803,7 +20719,7 @@
 </p:sld>
 </file>
 
-<file path=ppt/slides/slide8.xml><?xml version="1.0" encoding="utf-8"?>
+<file path=ppt/slides/slide9.xml><?xml version="1.0" encoding="utf-8"?>
 <p:sld xmlns:a="http://schemas.openxmlformats.org/drawingml/2006/main" xmlns:r="http://schemas.openxmlformats.org/officeDocument/2006/relationships" xmlns:p="http://schemas.openxmlformats.org/presentationml/2006/main">
   <p:cSld>
     <p:spTree>
@@ -19186,310 +21102,6 @@
     <p:extLst>
       <p:ext uri="{BB962C8B-B14F-4D97-AF65-F5344CB8AC3E}">
         <p14:creationId xmlns:p14="http://schemas.microsoft.com/office/powerpoint/2010/main" val="2290896173"/>
-      </p:ext>
-    </p:extLst>
-  </p:cSld>
-  <p:clrMapOvr>
-    <a:masterClrMapping/>
-  </p:clrMapOvr>
-</p:sld>
-</file>
-
-<file path=ppt/slides/slide9.xml><?xml version="1.0" encoding="utf-8"?>
-<p:sld xmlns:a="http://schemas.openxmlformats.org/drawingml/2006/main" xmlns:r="http://schemas.openxmlformats.org/officeDocument/2006/relationships" xmlns:p="http://schemas.openxmlformats.org/presentationml/2006/main">
-  <p:cSld>
-    <p:spTree>
-      <p:nvGrpSpPr>
-        <p:cNvPr id="1" name=""/>
-        <p:cNvGrpSpPr/>
-        <p:nvPr/>
-      </p:nvGrpSpPr>
-      <p:grpSpPr>
-        <a:xfrm>
-          <a:off x="0" y="0"/>
-          <a:ext cx="0" cy="0"/>
-          <a:chOff x="0" y="0"/>
-          <a:chExt cx="0" cy="0"/>
-        </a:xfrm>
-      </p:grpSpPr>
-      <p:sp>
-        <p:nvSpPr>
-          <p:cNvPr id="2" name="Title 1">
-            <a:extLst>
-              <a:ext uri="{FF2B5EF4-FFF2-40B4-BE49-F238E27FC236}">
-                <a16:creationId xmlns:a16="http://schemas.microsoft.com/office/drawing/2014/main" id="{14C11569-7A70-8106-28E3-FAD01463ADD7}"/>
-              </a:ext>
-            </a:extLst>
-          </p:cNvPr>
-          <p:cNvSpPr>
-            <a:spLocks noGrp="1"/>
-          </p:cNvSpPr>
-          <p:nvPr>
-            <p:ph type="title"/>
-          </p:nvPr>
-        </p:nvSpPr>
-        <p:spPr>
-          <a:xfrm>
-            <a:off x="588263" y="457200"/>
-            <a:ext cx="11018520" cy="1107996"/>
-          </a:xfrm>
-        </p:spPr>
-        <p:txBody>
-          <a:bodyPr/>
-          <a:lstStyle/>
-          <a:p>
-            <a:r>
-              <a:rPr lang="de-DE" dirty="0" err="1"/>
-              <a:t>Verify</a:t>
-            </a:r>
-            <a:r>
-              <a:rPr lang="de-DE" dirty="0"/>
-              <a:t> Business Partner </a:t>
-            </a:r>
-            <a:r>
-              <a:rPr lang="de-DE" dirty="0" err="1"/>
-              <a:t>Role</a:t>
-            </a:r>
-            <a:r>
-              <a:rPr lang="de-DE" dirty="0"/>
-              <a:t> </a:t>
-            </a:r>
-            <a:r>
-              <a:rPr lang="de-DE" dirty="0" err="1"/>
-              <a:t>before</a:t>
-            </a:r>
-            <a:r>
-              <a:rPr lang="de-DE" dirty="0"/>
-              <a:t> </a:t>
-            </a:r>
-            <a:r>
-              <a:rPr lang="de-DE" dirty="0" err="1"/>
-              <a:t>updating</a:t>
-            </a:r>
-            <a:r>
-              <a:rPr lang="de-DE" dirty="0"/>
-              <a:t> </a:t>
-            </a:r>
-            <a:r>
-              <a:rPr lang="de-DE" dirty="0" err="1"/>
-              <a:t>from</a:t>
-            </a:r>
-            <a:r>
-              <a:rPr lang="de-DE" dirty="0"/>
-              <a:t> PowerBI</a:t>
-            </a:r>
-            <a:endParaRPr lang="en-DE" dirty="0"/>
-          </a:p>
-        </p:txBody>
-      </p:sp>
-      <p:pic>
-        <p:nvPicPr>
-          <p:cNvPr id="5" name="Picture 4">
-            <a:extLst>
-              <a:ext uri="{FF2B5EF4-FFF2-40B4-BE49-F238E27FC236}">
-                <a16:creationId xmlns:a16="http://schemas.microsoft.com/office/drawing/2014/main" id="{B6C56BA8-275F-54FF-FA2D-10A35B3CA153}"/>
-              </a:ext>
-            </a:extLst>
-          </p:cNvPr>
-          <p:cNvPicPr>
-            <a:picLocks noChangeAspect="1"/>
-          </p:cNvPicPr>
-          <p:nvPr/>
-        </p:nvPicPr>
-        <p:blipFill>
-          <a:blip r:embed="rId2"/>
-          <a:stretch>
-            <a:fillRect/>
-          </a:stretch>
-        </p:blipFill>
-        <p:spPr>
-          <a:xfrm>
-            <a:off x="1506071" y="2989042"/>
-            <a:ext cx="3708750" cy="1604389"/>
-          </a:xfrm>
-          <a:prstGeom prst="rect">
-            <a:avLst/>
-          </a:prstGeom>
-        </p:spPr>
-      </p:pic>
-      <p:pic>
-        <p:nvPicPr>
-          <p:cNvPr id="7" name="Picture 6">
-            <a:extLst>
-              <a:ext uri="{FF2B5EF4-FFF2-40B4-BE49-F238E27FC236}">
-                <a16:creationId xmlns:a16="http://schemas.microsoft.com/office/drawing/2014/main" id="{0CA2AA64-70C7-A7D0-AFF3-A27CFB2A0804}"/>
-              </a:ext>
-            </a:extLst>
-          </p:cNvPr>
-          <p:cNvPicPr>
-            <a:picLocks noChangeAspect="1"/>
-          </p:cNvPicPr>
-          <p:nvPr/>
-        </p:nvPicPr>
-        <p:blipFill>
-          <a:blip r:embed="rId3"/>
-          <a:stretch>
-            <a:fillRect/>
-          </a:stretch>
-        </p:blipFill>
-        <p:spPr>
-          <a:xfrm>
-            <a:off x="6351889" y="2975196"/>
-            <a:ext cx="3317256" cy="1628593"/>
-          </a:xfrm>
-          <a:prstGeom prst="rect">
-            <a:avLst/>
-          </a:prstGeom>
-        </p:spPr>
-      </p:pic>
-      <p:sp>
-        <p:nvSpPr>
-          <p:cNvPr id="8" name="Arrow: Chevron 7">
-            <a:extLst>
-              <a:ext uri="{FF2B5EF4-FFF2-40B4-BE49-F238E27FC236}">
-                <a16:creationId xmlns:a16="http://schemas.microsoft.com/office/drawing/2014/main" id="{48D43098-84D3-0335-08C8-84962E57EF0B}"/>
-              </a:ext>
-            </a:extLst>
-          </p:cNvPr>
-          <p:cNvSpPr/>
-          <p:nvPr/>
-        </p:nvSpPr>
-        <p:spPr bwMode="auto">
-          <a:xfrm>
-            <a:off x="5661518" y="3500438"/>
-            <a:ext cx="357188" cy="553998"/>
-          </a:xfrm>
-          <a:prstGeom prst="chevron">
-            <a:avLst/>
-          </a:prstGeom>
-          <a:solidFill>
-            <a:schemeClr val="bg1">
-              <a:lumMod val="50000"/>
-            </a:schemeClr>
-          </a:solidFill>
-          <a:ln>
-            <a:noFill/>
-            <a:headEnd type="none" w="med" len="med"/>
-            <a:tailEnd type="none" w="med" len="med"/>
-          </a:ln>
-          <a:effectLst/>
-        </p:spPr>
-        <p:style>
-          <a:lnRef idx="1">
-            <a:schemeClr val="accent2"/>
-          </a:lnRef>
-          <a:fillRef idx="3">
-            <a:schemeClr val="accent2"/>
-          </a:fillRef>
-          <a:effectRef idx="2">
-            <a:schemeClr val="accent2"/>
-          </a:effectRef>
-          <a:fontRef idx="minor">
-            <a:schemeClr val="lt1"/>
-          </a:fontRef>
-        </p:style>
-        <p:txBody>
-          <a:bodyPr rot="0" spcFirstLastPara="0" vertOverflow="overflow" horzOverflow="overflow" vert="horz" wrap="square" lIns="182880" tIns="146304" rIns="182880" bIns="146304" numCol="1" spcCol="0" rtlCol="0" fromWordArt="0" anchor="t" anchorCtr="0" forceAA="0" compatLnSpc="1">
-            <a:prstTxWarp prst="textNoShape">
-              <a:avLst/>
-            </a:prstTxWarp>
-            <a:noAutofit/>
-          </a:bodyPr>
-          <a:lstStyle/>
-          <a:p>
-            <a:pPr algn="l" defTabSz="932472" fontAlgn="base">
-              <a:spcBef>
-                <a:spcPct val="0"/>
-              </a:spcBef>
-              <a:spcAft>
-                <a:spcPct val="0"/>
-              </a:spcAft>
-            </a:pPr>
-            <a:endParaRPr lang="en-DE" sz="2000" dirty="0" err="1">
-              <a:solidFill>
-                <a:srgbClr val="FFFFFF"/>
-              </a:solidFill>
-              <a:ea typeface="Segoe UI" pitchFamily="34" charset="0"/>
-              <a:cs typeface="Segoe UI" pitchFamily="34" charset="0"/>
-            </a:endParaRPr>
-          </a:p>
-        </p:txBody>
-      </p:sp>
-      <p:sp>
-        <p:nvSpPr>
-          <p:cNvPr id="9" name="Rectangle 8">
-            <a:extLst>
-              <a:ext uri="{FF2B5EF4-FFF2-40B4-BE49-F238E27FC236}">
-                <a16:creationId xmlns:a16="http://schemas.microsoft.com/office/drawing/2014/main" id="{ADC7885C-E5E8-FC8B-2CA5-ADF1FEBDE96E}"/>
-              </a:ext>
-            </a:extLst>
-          </p:cNvPr>
-          <p:cNvSpPr/>
-          <p:nvPr/>
-        </p:nvSpPr>
-        <p:spPr bwMode="auto">
-          <a:xfrm>
-            <a:off x="8909387" y="4403912"/>
-            <a:ext cx="604404" cy="189519"/>
-          </a:xfrm>
-          <a:prstGeom prst="rect">
-            <a:avLst/>
-          </a:prstGeom>
-          <a:noFill/>
-          <a:ln w="38100">
-            <a:solidFill>
-              <a:srgbClr val="FF0000"/>
-            </a:solidFill>
-            <a:headEnd type="none" w="med" len="med"/>
-            <a:tailEnd type="none" w="med" len="med"/>
-          </a:ln>
-          <a:effectLst/>
-        </p:spPr>
-        <p:style>
-          <a:lnRef idx="1">
-            <a:schemeClr val="accent2"/>
-          </a:lnRef>
-          <a:fillRef idx="3">
-            <a:schemeClr val="accent2"/>
-          </a:fillRef>
-          <a:effectRef idx="2">
-            <a:schemeClr val="accent2"/>
-          </a:effectRef>
-          <a:fontRef idx="minor">
-            <a:schemeClr val="lt1"/>
-          </a:fontRef>
-        </p:style>
-        <p:txBody>
-          <a:bodyPr rot="0" spcFirstLastPara="0" vertOverflow="overflow" horzOverflow="overflow" vert="horz" wrap="square" lIns="182880" tIns="146304" rIns="182880" bIns="146304" numCol="1" spcCol="0" rtlCol="0" fromWordArt="0" anchor="t" anchorCtr="0" forceAA="0" compatLnSpc="1">
-            <a:prstTxWarp prst="textNoShape">
-              <a:avLst/>
-            </a:prstTxWarp>
-            <a:noAutofit/>
-          </a:bodyPr>
-          <a:lstStyle/>
-          <a:p>
-            <a:pPr algn="l" defTabSz="932472" fontAlgn="base">
-              <a:spcBef>
-                <a:spcPct val="0"/>
-              </a:spcBef>
-              <a:spcAft>
-                <a:spcPct val="0"/>
-              </a:spcAft>
-            </a:pPr>
-            <a:endParaRPr lang="en-DE" sz="2000" dirty="0" err="1">
-              <a:solidFill>
-                <a:srgbClr val="FFFFFF"/>
-              </a:solidFill>
-              <a:ea typeface="Segoe UI" pitchFamily="34" charset="0"/>
-              <a:cs typeface="Segoe UI" pitchFamily="34" charset="0"/>
-            </a:endParaRPr>
-          </a:p>
-        </p:txBody>
-      </p:sp>
-    </p:spTree>
-    <p:extLst>
-      <p:ext uri="{BB962C8B-B14F-4D97-AF65-F5344CB8AC3E}">
-        <p14:creationId xmlns:p14="http://schemas.microsoft.com/office/powerpoint/2010/main" val="1415010808"/>
       </p:ext>
     </p:extLst>
   </p:cSld>

</xml_diff>

<commit_message>
Updated Pictures to CDC Adapter
</commit_message>
<xml_diff>
--- a/SAP-Data-MicroHack.pptx
+++ b/SAP-Data-MicroHack.pptx
@@ -121,23 +121,31 @@
 </p:presentation>
 </file>
 
+<file path=ppt/revisionInfo.xml><?xml version="1.0" encoding="utf-8"?>
+<p1510:revInfo xmlns:a="http://schemas.openxmlformats.org/drawingml/2006/main" xmlns:r="http://schemas.openxmlformats.org/officeDocument/2006/relationships" xmlns:p1510="http://schemas.microsoft.com/office/powerpoint/2015/10/main">
+  <p1510:revLst>
+    <p1510:client id="{98050DC5-B303-4F96-AB6E-BA2B392BF9DF}" v="1" dt="2022-12-22T08:09:53.696"/>
+  </p1510:revLst>
+</p1510:revInfo>
+</file>
+
 <file path=ppt/changesInfos/changesInfo1.xml><?xml version="1.0" encoding="utf-8"?>
 <pc:chgInfo xmlns:a="http://schemas.openxmlformats.org/drawingml/2006/main" xmlns:r="http://schemas.openxmlformats.org/officeDocument/2006/relationships" xmlns:ac="http://schemas.microsoft.com/office/drawing/2013/main/command" xmlns:pc="http://schemas.microsoft.com/office/powerpoint/2013/main/command">
   <pc:docChgLst>
     <pc:chgData name="Bart Delanghe" userId="8297ddc9-6bb9-4c3c-b668-c882a139d54a" providerId="ADAL" clId="{98050DC5-B303-4F96-AB6E-BA2B392BF9DF}"/>
     <pc:docChg chg="modSld">
-      <pc:chgData name="Bart Delanghe" userId="8297ddc9-6bb9-4c3c-b668-c882a139d54a" providerId="ADAL" clId="{98050DC5-B303-4F96-AB6E-BA2B392BF9DF}" dt="2022-12-22T07:48:53.093" v="10" actId="20577"/>
+      <pc:chgData name="Bart Delanghe" userId="8297ddc9-6bb9-4c3c-b668-c882a139d54a" providerId="ADAL" clId="{98050DC5-B303-4F96-AB6E-BA2B392BF9DF}" dt="2022-12-22T08:17:47.055" v="18" actId="20577"/>
       <pc:docMkLst>
         <pc:docMk/>
       </pc:docMkLst>
       <pc:sldChg chg="modSp mod">
-        <pc:chgData name="Bart Delanghe" userId="8297ddc9-6bb9-4c3c-b668-c882a139d54a" providerId="ADAL" clId="{98050DC5-B303-4F96-AB6E-BA2B392BF9DF}" dt="2022-12-22T07:48:53.093" v="10" actId="20577"/>
+        <pc:chgData name="Bart Delanghe" userId="8297ddc9-6bb9-4c3c-b668-c882a139d54a" providerId="ADAL" clId="{98050DC5-B303-4F96-AB6E-BA2B392BF9DF}" dt="2022-12-22T08:17:47.055" v="18" actId="20577"/>
         <pc:sldMkLst>
           <pc:docMk/>
           <pc:sldMk cId="3120669869" sldId="259"/>
         </pc:sldMkLst>
         <pc:spChg chg="mod">
-          <ac:chgData name="Bart Delanghe" userId="8297ddc9-6bb9-4c3c-b668-c882a139d54a" providerId="ADAL" clId="{98050DC5-B303-4F96-AB6E-BA2B392BF9DF}" dt="2022-12-22T07:48:53.093" v="10" actId="20577"/>
+          <ac:chgData name="Bart Delanghe" userId="8297ddc9-6bb9-4c3c-b668-c882a139d54a" providerId="ADAL" clId="{98050DC5-B303-4F96-AB6E-BA2B392BF9DF}" dt="2022-12-22T08:17:47.055" v="18" actId="20577"/>
           <ac:spMkLst>
             <pc:docMk/>
             <pc:sldMk cId="3120669869" sldId="259"/>
@@ -15460,7 +15468,7 @@
               <a:t>CDS View / </a:t>
             </a:r>
             <a:r>
-              <a:rPr lang="en-US" sz="1200" dirty="0"/>
+              <a:rPr lang="en-US" sz="1200"/>
               <a:t>SAP CDC </a:t>
             </a:r>
             <a:r>
@@ -15506,12 +15514,8 @@
               <a:rPr lang="en-BE" sz="1200" dirty="0"/>
             </a:br>
             <a:r>
-              <a:rPr lang="en-BE" sz="1200" dirty="0" err="1"/>
-              <a:t>oData</a:t>
-            </a:r>
-            <a:r>
               <a:rPr lang="en-BE" sz="1200" dirty="0"/>
-              <a:t> / SAP ECC Adapter</a:t>
+              <a:t>oData / SAP ECC Adapter</a:t>
             </a:r>
           </a:p>
         </p:txBody>
@@ -16054,15 +16058,7 @@
           <a:p>
             <a:r>
               <a:rPr lang="en-BE" sz="2000" dirty="0"/>
-              <a:t>Sales Order Items – SAP ECC Adapter (</a:t>
-            </a:r>
-            <a:r>
-              <a:rPr lang="en-BE" sz="2000" dirty="0" err="1"/>
-              <a:t>oData</a:t>
-            </a:r>
-            <a:r>
-              <a:rPr lang="en-BE" sz="2000" dirty="0"/>
-              <a:t>)</a:t>
+              <a:t>Sales Order Items – SAP ECC Adapter (oData)</a:t>
             </a:r>
           </a:p>
           <a:p>

</xml_diff>